<commit_message>
adding lecture files for week 3 part 4-8
</commit_message>
<xml_diff>
--- a/course1 Neural Networks and Deep Learning/week3 Shallow neural networks/4-C1W3L04 Activation functions.pptx
+++ b/course1 Neural Networks and Deep Learning/week3 Shallow neural networks/4-C1W3L04 Activation functions.pptx
@@ -4,6 +4,9 @@
   <p:sldMasterIdLst>
     <p:sldMasterId id="2147483648" r:id="rId1"/>
   </p:sldMasterIdLst>
+  <p:notesMasterIdLst>
+    <p:notesMasterId r:id="rId5"/>
+  </p:notesMasterIdLst>
   <p:sldIdLst>
     <p:sldId id="257" r:id="rId2"/>
     <p:sldId id="256" r:id="rId3"/>
@@ -153,7 +156,7 @@
     </inkml:brush>
   </inkml:definitions>
   <inkml:trace contextRef="#ctx0" brushRef="#br0">3563 15117 0,'18'0'47,"17"0"-31,0 0-16,18 0 0,35 0 16,-35 0-1,0 0-15,88-18 0,-70 18 16,70 18-1,-70-18-15,-1 0 0,-17 17 16,0-17-16,17 18 16,-34-18-16,-1 0 15,-53 0 1</inkml:trace>
-  <inkml:trace contextRef="#ctx0" brushRef="#br0" timeOffset="338.3321">4286 14834 0,'0'36'15,"0"-19"1,53 19-1,-18-36-15,18 17 0,0-17 16,0 18-16,53-18 16,-53 17-16,0 1 0,17 17 15,-34-17-15,-19 17 16,1 1-16,-18-1 16,0 0-16,-35-17 15,17 17-15,-52 0 16,34 1-16,1-36 0,0 17 15,-1-17-15,-17 18 16,36-18-16,-1 0 16,1 0-16</inkml:trace>
+  <inkml:trace contextRef="#ctx0" brushRef="#br0" timeOffset="338.332">4286 14834 0,'0'36'15,"0"-19"1,53 19-1,-18-36-15,18 17 0,0-17 16,0 18-16,53-18 16,-53 17-16,0 1 0,17 17 15,-34-17-15,-19 17 16,1 1-16,-18-1 16,0 0-16,-35-17 15,17 17-15,-52 0 16,34 1-16,1-36 0,0 17 15,-1-17-15,-17 18 16,36-18-16,-1 0 16,1 0-16</inkml:trace>
   <inkml:trace contextRef="#ctx0" brushRef="#br0" timeOffset="1040.318">3845 18115 0,'-17'0'16,"17"18"-16,17-18 16,1 0-16,0 0 0,17 17 15,0-17-15,0 0 16,18 0-16,0 0 0,18 0 15,-18 0-15,17 0 0,1 0 16,-1 0-16,1 0 0,-1 0 16,36 0-16,-70 0 15,34 18-15,-35-18 16,-17 0-16,0 0 16,-18-18-1,-36 1 1</inkml:trace>
   <inkml:trace contextRef="#ctx0" brushRef="#br0" timeOffset="1334.8186">4551 17833 0,'17'18'15,"36"-1"1,-17 1-16,52 35 15,18-18 1,-71 0-16,53 18 16,-53-35-16,18 35 15,-35-36-15,0 1 16,-18 0-16,-89 17 16,54-17-1,-18-1-15,0 1 0,-52 35 16,52-18-16,-18 18 15,53-35-15,1-1 16</inkml:trace>
   <inkml:trace contextRef="#ctx0" brushRef="#br0" timeOffset="2203.1539">8502 15663 0,'18'0'31,"17"0"-15,-17 18-16,34 0 15,-16-18 1,34 17-16,-34 1 16,69 0-16,-52-18 15,0 0-15,53 0 16,-18 0 0,-70 0-16,35 0 15,-36 0-15,-34-18 31,-1 18-31,-35 0 16,18-18-16</inkml:trace>
@@ -176,7 +179,7 @@
   <inkml:trace contextRef="#ctx0" brushRef="#br0" timeOffset="16271.7354">32667 2028 0,'36'-17'16,"34"17"0,-35 0-16,-17 0 15,35 17-15,-35 1 16,-36 17 0,18-17-16,-35 17 15,17-35-15,18 18 16,0 0-1,0-1-15,18 1 16,-1-18-16,1 18 16,0-18-16,-1 0 15,1 0-15</inkml:trace>
   <inkml:trace contextRef="#ctx0" brushRef="#br0" timeOffset="16494.0426">32791 2170 0,'70'0'16,"1"0"-16,-54 0 16,19 0-16,-1 0 15,-17 0-15,-36 0 16</inkml:trace>
   <inkml:trace contextRef="#ctx0" brushRef="#br0" timeOffset="17512.5812">28381 4374 0,'18'18'47,"35"0"-47,-18 17 16,35 0-16,-34 1 15,52 16 1,-71-16-16,36 17 15,-35-18-15,-18 18 16,0-35-16,-18 17 0,-17-18 16,17 1-16,-34 0 15,34-1-15,-17 19 16,17-36-16,18 17 0,0 1 16</inkml:trace>
-  <inkml:trace contextRef="#ctx0" brushRef="#br0" timeOffset="18352.1147">29104 4621 0,'0'-17'32,"18"17"-17,-1 0 1,1-18-16,35 18 15,-35 0-15,17 18 0,18-1 16,-36 1-16,1 0 16,0-1-16,-18 36 15,-18-35 1,18 0-16,-35 34 16,17-16-16,1-19 0,17 1 15,-18 0-15,18-1 16,18 1-16,17 0 15,0-18 1,-17 0-16,-1 0 16,1 0-1</inkml:trace>
+  <inkml:trace contextRef="#ctx0" brushRef="#br0" timeOffset="18352.1146">29104 4621 0,'0'-17'32,"18"17"-17,-1 0 1,1-18-16,35 18 15,-35 0-15,17 18 0,18-1 16,-36 1-16,1 0 16,0-1-16,-18 36 15,-18-35 1,18 0-16,-35 34 16,17-16-16,1-19 0,17 1 15,-18 0-15,18-1 16,18 1-16,17 0 15,0-18 1,-17 0-16,-1 0 16,1 0-1</inkml:trace>
   <inkml:trace contextRef="#ctx0" brushRef="#br0" timeOffset="18486.5984">29245 4851 0,'124'-18'16,"-54"0"-1,1 1-15,-36 17 16</inkml:trace>
   <inkml:trace contextRef="#ctx0" brushRef="#br0" timeOffset="27522.2665">8608 15593 0,'-18'0'0,"36"-18"32,35-17-32,35-36 15,-35 36-15,106-88 16,-71 70-16,18-36 15,141-87 1,-124 70-16,0 0 0,142-70 16,-141 88-1,-19 17-15,36-35 0,-88 71 16,-17 18 0,-54 34-1</inkml:trace>
   <inkml:trace contextRef="#ctx0" brushRef="#br0" timeOffset="27794.3517">9737 15381 0,'35'-18'15,"-17"1"-15,52-36 16,-35 18-16,18-18 16,88-88-16,-70 70 15,17 1-15,89-72 16,-89 54-16,0 18 0,71-36 16,-89 53-1,-17 18-15,18-1 16,-54 36-16</inkml:trace>
@@ -193,25 +196,25 @@
   <inkml:trace contextRef="#ctx0" brushRef="#br0" timeOffset="31566.1862">15169 14146 0,'36'18'31,"-19"0"-31,36 35 16,18 35-1,-18 18 1,-18-53-16,-17 17 0,35 89 16,-53-89-16,17 19 15,-17 52-15,-17-88 16,-1 17-16,-17-17 0,17 0 16,-53 18-16,54-36 15,-18 0-15,17-17 16,0-1-16,18 19 15,-17-19-15</inkml:trace>
   <inkml:trace contextRef="#ctx0" brushRef="#br0" timeOffset="32589.2145">8714 18468 0,'-18'18'16,"36"-18"0,17-18-16,0-17 15,18 17-15,71-53 16,-54 36-16,107-71 16,-72 36-16,125-89 15,-107 71-15,124-89 16,-123 89-16,87-53 15,-123 106-15,18-18 16,-53 53-16,-35 0 16</inkml:trace>
   <inkml:trace contextRef="#ctx0" brushRef="#br0" timeOffset="32828.341">10054 18397 0,'88'-70'16,"53"-18"0,-70 17-16,105-52 15,-87 34-15,122-69 16,-105 69-16,-18 19 15,1-1-15,16 1 16,-69 52-16</inkml:trace>
-  <inkml:trace contextRef="#ctx0" brushRef="#br0" timeOffset="33010.4217">10601 18627 0,'18'17'15,"70"-34"1,-35-1-16,0-17 16,17-18-16,1 0 0,88-88 15,-71 70-15,53-52 16,-88 88-16,0-18 16</inkml:trace>
+  <inkml:trace contextRef="#ctx0" brushRef="#br0" timeOffset="33010.4216">10601 18627 0,'18'17'15,"70"-34"1,-35-1-16,0-17 16,17-18-16,1 0 0,88-88 15,-71 70-15,53-52 16,-88 88-16,0-18 16</inkml:trace>
   <inkml:trace contextRef="#ctx0" brushRef="#br0" timeOffset="33144.3681">11218 18415 0,'18'0'0,"53"-18"15,-19-17-15,37-35 16,-19 17-16,-17 17 16,18-52-16</inkml:trace>
-  <inkml:trace contextRef="#ctx0" brushRef="#br0" timeOffset="33890.1099">12435 17939 0,'-17'-36'16,"-1"19"-16,-35-1 15,36 1-15,-36 17 16,35 17-16,-53 36 16,54-18-1,-1 18-15,18 0 0,0 18 16,0-36 0,18-17-16,35 17 15,-18-35-15,0 0 0,36-35 16,-36 17-16,0-17 15,-35 17-15,36-35 16,-36 36-16,0-19 16,0 19-16,17 17 15,-17 35 1,18 0-16,0 71 16,-1-53-16,1-18 0,0 18 15,-1 0-15,-17 18 16,0-36-16,0 0 0,-17 0 15,-1-17-15,-35 35 16,18-35-16,-1-18 16,1 0-16,0 0 0,-36-18 15,54 18-15,-19-18 16,1-17-16,35 17 16,0-17-16</inkml:trace>
+  <inkml:trace contextRef="#ctx0" brushRef="#br0" timeOffset="33890.1098">12435 17939 0,'-17'-36'16,"-1"19"-16,-35-1 15,36 1-15,-36 17 16,35 17-16,-53 36 16,54-18-1,-1 18-15,18 0 0,0 18 16,0-36 0,18-17-16,35 17 15,-18-35-15,0 0 0,36-35 16,-36 17-16,0-17 15,-35 17-15,36-35 16,-36 36-16,0-19 16,0 19-16,17 17 15,-17 35 1,18 0-16,0 71 16,-1-53-16,1-18 0,0 18 15,-1 0-15,-17 18 16,0-36-16,0 0 0,-17 0 15,-1-17-15,-35 35 16,18-35-16,-1-18 16,1 0-16,0 0 0,-36-18 15,54 18-15,-19-18 16,1-17-16,35 17 16,0-17-16</inkml:trace>
   <inkml:trace contextRef="#ctx0" brushRef="#br0" timeOffset="34184.9493">13194 17392 0,'-53'0'16,"0"106"0,18 17-1,52 142 1,-17-177-16,18-17 0,0-1 16,52 18-16,-34-52 15,34 17-15,-52-36 16,35 1-1</inkml:trace>
-  <inkml:trace contextRef="#ctx0" brushRef="#br0" timeOffset="34802.6258">13564 17657 0,'-17'0'16,"17"-18"-1,53 18 1,52 0 0,-52 18-1,-35-1-15,0 36 16,-18-18-16,-18 54 15,0-54-15,1 18 16,-1 0-16,18-18 0,-18 18 16,18-18-16,36 0 15,-1-17-15,18 0 16,-18-18-16,36 0 16,-54 0-16,19 0 15,-19 0-15,-17-18 16,0 0-1</inkml:trace>
+  <inkml:trace contextRef="#ctx0" brushRef="#br0" timeOffset="34802.6257">13564 17657 0,'-17'0'16,"17"-18"-1,53 18 1,52 0 0,-52 18-1,-35-1-15,0 36 16,-18-18-16,-18 54 15,0-54-15,1 18 16,-1 0-16,18-18 0,-18 18 16,18-18-16,36 0 15,-1-17-15,18 0 16,-18-18-16,36 0 16,-54 0-16,19 0 15,-19 0-15,-17-18 16,0 0-1</inkml:trace>
   <inkml:trace contextRef="#ctx0" brushRef="#br0" timeOffset="34930.0404">13741 17939 0,'53'0'15,"-18"0"-15,53-18 16,-53 18-16,1-18 0,-1 18 15</inkml:trace>
   <inkml:trace contextRef="#ctx0" brushRef="#br0" timeOffset="35180.3492">14164 17321 0,'35'0'16,"-17"0"-16,35-17 16,-35-1-16,34 0 15,-34 1 1,0 17-16,-1-18 15</inkml:trace>
-  <inkml:trace contextRef="#ctx0" brushRef="#br0" timeOffset="35374.2253">14235 17339 0,'-18'18'16,"36"17"-1,-18-17-15,17 35 16,1-18-16,-18 0 0,18 0 15,-18-17-15,35 35 16,-18-35-16,1-1 16,0-17-16,-1 0 0,19 0 15,-19-17 1,1-1-16</inkml:trace>
-  <inkml:trace contextRef="#ctx0" brushRef="#br0" timeOffset="35641.2431">14570 17321 0,'17'0'16,"1"0"0,17 36-1,-17-1-15,-36 0 16,18-17-16,-17 0 15,17-1-15,0 1 16,35-18 15,-17 17-31,17-17 0,18-17 16,-36 17 0,1-18-16</inkml:trace>
-  <inkml:trace contextRef="#ctx0" brushRef="#br0" timeOffset="35968.8957">14834 17233 0,'18'0'31,"0"18"-31,-1-18 16,36 35 0,-35-17-16,17-1 0,0 36 15,-17-35-15,-18 17 16,0 1-16,0-1 15,-18-18-15,-17 36 16,17-35-16,1 0 16</inkml:trace>
-  <inkml:trace contextRef="#ctx0" brushRef="#br0" timeOffset="38433.7689">14799 17180 0,'-18'0'15,"1"0"1,-1 0-16,0 0 16,1 0-1,-1 0 1,36 0 78,-1 0-79,1 18 1,35-36-16,-18 18 15,18-17-15,-35 17 16,17 0-16,-17 0 16,-1 0-16,-17 17 31,0 1-15,0 17-1,0-17-15,18-1 0,-18 19 16,0-19-1,0 1-15,0 35 16,0-35-16,0 17 0,0 0 16,0 0-16,0 1 15,0-1-15,0-17 16,0-1-16,0 1 16,18-18-1,-18 18 1,0-1 15,-18-17-15,-17 0-1,17 0-15,-17-17 16,17 17-16,-17-18 16,17 18-16,1-18 15,34 1 16,1 17-31</inkml:trace>
-  <inkml:trace contextRef="#ctx0" brushRef="#br0" timeOffset="38873.5946">15275 17145 0,'0'-18'16,"-17"18"-1,17 18 17,17 0-17,19 52 1,-19-35-16,18 1 0,1 70 16,-19-36-1,1 18-15,0 1 0,-1 16 16,-17 54-16,0-88 15,0 35-15,-17-71 16,-1 0-16,-35 36 16,35-54-16,1 1 15,-1 0-15,1-1 0,-1-17 16,0 0-16</inkml:trace>
+  <inkml:trace contextRef="#ctx0" brushRef="#br0" timeOffset="35374.2252">14235 17339 0,'-18'18'16,"36"17"-1,-18-17-15,17 35 16,1-18-16,-18 0 0,18 0 15,-18-17-15,35 35 16,-18-35-16,1-1 16,0-17-16,-1 0 0,19 0 15,-19-17 1,1-1-16</inkml:trace>
+  <inkml:trace contextRef="#ctx0" brushRef="#br0" timeOffset="35641.243">14570 17321 0,'17'0'16,"1"0"0,17 36-1,-17-1-15,-36 0 16,18-17-16,-17 0 15,17-1-15,0 1 16,35-18 15,-17 17-31,17-17 0,18-17 16,-36 17 0,1-18-16</inkml:trace>
+  <inkml:trace contextRef="#ctx0" brushRef="#br0" timeOffset="35968.8956">14834 17233 0,'18'0'31,"0"18"-31,-1-18 16,36 35 0,-35-17-16,17-1 0,0 36 15,-17-35-15,-18 17 16,0 1-16,0-1 15,-18-18-15,-17 36 16,17-35-16,1 0 16</inkml:trace>
+  <inkml:trace contextRef="#ctx0" brushRef="#br0" timeOffset="38433.7688">14799 17180 0,'-18'0'15,"1"0"1,-1 0-16,0 0 16,1 0-1,-1 0 1,36 0 78,-1 0-79,1 18 1,35-36-16,-18 18 15,18-17-15,-35 17 16,17 0-16,-17 0 16,-1 0-16,-17 17 31,0 1-15,0 17-1,0-17-15,18-1 0,-18 19 16,0-19-1,0 1-15,0 35 16,0-35-16,0 17 0,0 0 16,0 0-16,0 1 15,0-1-15,0-17 16,0-1-16,0 1 16,18-18-1,-18 18 1,0-1 15,-18-17-15,-17 0-1,17 0-15,-17-17 16,17 17-16,-17-18 16,17 18-16,1-18 15,34 1 16,1 17-31</inkml:trace>
+  <inkml:trace contextRef="#ctx0" brushRef="#br0" timeOffset="38873.5945">15275 17145 0,'0'-18'16,"-17"18"-1,17 18 17,17 0-17,19 52 1,-19-35-16,18 1 0,1 70 16,-19-36-1,1 18-15,0 1 0,-1 16 16,-17 54-16,0-88 15,0 35-15,-17-71 16,-1 0-16,-35 36 16,35-54-16,1 1 15,-1 0-15,1-1 0,-1-17 16,0 0-16</inkml:trace>
   <inkml:trace contextRef="#ctx0" brushRef="#br0" timeOffset="44232.1147">25435 1923 0,'18'0'0,"35"17"15,-18 1-15,36-18 16,70 18-16,-53-1 16,53-17-16,-88 0 15</inkml:trace>
-  <inkml:trace contextRef="#ctx0" brushRef="#br0" timeOffset="44733.6296">24853 1852 0,'-17'71'16,"17"-36"-16,0 53 16,0-35-1,-18 0-15</inkml:trace>
-  <inkml:trace contextRef="#ctx0" brushRef="#br0" timeOffset="47074.7687">21220 6350 0,'17'0'47,"-17"18"-47,18 35 15,-18-18-15,0 0 16,18 71 0,-18 17-16,0-52 15,0 17-15,-18 106 16,0 53-16,18-123 15,-17 158-15,17-141 16,0 0-16,0 106 16,0-124-16,0 1 15,0 123-15,0-141 16,0 105-16,0-122 16,0-1-16,0 71 15,0-107-15,0 37 16,0-54-16,0 18 15,0-36 1</inkml:trace>
+  <inkml:trace contextRef="#ctx0" brushRef="#br0" timeOffset="44733.6295">24853 1852 0,'-17'71'16,"17"-36"-16,0 53 16,0-35-1,-18 0-15</inkml:trace>
+  <inkml:trace contextRef="#ctx0" brushRef="#br0" timeOffset="47074.7686">21220 6350 0,'17'0'47,"-17"18"-47,18 35 15,-18-18-15,0 0 16,18 71 0,-18 17-16,0-52 15,0 17-15,-18 106 16,0 53-16,18-123 15,-17 158-15,17-141 16,0 0-16,0 106 16,0-124-16,0 1 15,0 123-15,0-141 16,0 105-16,0-122 16,0-1-16,0 71 15,0-107-15,0 37 16,0-54-16,0 18 15,0-36 1</inkml:trace>
   <inkml:trace contextRef="#ctx0" brushRef="#br0" timeOffset="48578.0963">17410 7973 0,'17'0'32,"1"17"-32,0-17 15,17 0 1,18 0-16,-36 0 16,19 0-16,17 0 15,17 0-15,-35 0 16,54 0-1,-37 0-15,1 0 0,0 0 0,53 0 16,-35 0-16,52 0 16,-35 0-1,-17 0-15,-1 0 16,19 0-16,-1 0 0,106 0 16,-88 0-16,88-17 15,-88 17-15,123 0 16,-123 0-16,123 0 15,-123 0-15,123 17 16,-105-17-16,123 18 16,-124-18-16,124 0 15,-124 0 1,124 0-16,-123 0 16,123 0-16,-124 0 15,107 0 1,-107 18-16,124-18 15,-141 0-15,141 0 16,-141 0-16,123 0 16,-106 0-16,89 17 15,-106-17-15,0 18 0,17 0 16,89-1-16,-106-17 16,88 0-1,-124 0-15,19 0 0,-19 0 16,-17 0-16,18-17 15,-54 17-15,1 0 0,-18-18 16,-18 18-16</inkml:trace>
   <inkml:trace contextRef="#ctx0" brushRef="#br0" timeOffset="49484.3039">21290 6385 0,'0'-17'63,"0"-1"-48,0 0-15,0 1 0,0-1 16,-17-35-16,17 36 16,0-54-16,0 36 15,0-53 1,0 52-16,17-17 15,-17 36-15,0-19 16,0 19-16</inkml:trace>
   <inkml:trace contextRef="#ctx0" brushRef="#br0" timeOffset="50367.9382">21184 9578 0,'0'18'63,"18"-1"-48,-18 1-15,0 17 16,0-17-16,0 52 16,0-34-16,0 34 15,0-35-15,0 36 16,0-36-16,0 1 15,0-1-15,18-18 16,-18 1-16,0 0 31,0-36-15</inkml:trace>
-  <inkml:trace contextRef="#ctx0" brushRef="#br0" timeOffset="55435.2624">18221 9490 0,'18'0'47,"-1"0"-32,1 0 1,0 0-16,-1 0 16,1 0-16,-1 0 15,1 0-15,0 0 0,17 0 16,-17 0-16,-1 0 15,19 0 1,-19 0-16,18 0 0,1 0 16,-1 0-16,0 0 15,-17 0-15,35 0 16,-18 0-16,0 0 16,1 0-16,17 0 15,-36 0-15,36 0 16,-35 0-1,-1 0-15,36 0 16,0-18 0,-17 18-16,16-18 0,-16 18 15,-1-17 1,0 17-16,1-18 16,-19 18-16,19 0 15,-1-17-15,0-1 16,0 18-16,-17-18 0,53 1 15,-19-1 1,-34 0-16,17 1 16,18-1-16,-35 0 15,17 1-15,0-1 16,-17 18-16,0-17 0,-1-1 16,1 18-16,17-35 15,-17 35-15,17-18 16,-17 0-16,0 18 0,-1-17 15,36-19-15,-18 19 16,18-19-16,-35 19 16,35-18-16,-36 17 15,36-17 1,-35-1-16,17 1 16,-17 17-16,35-17 15,-36 18-15,19-19 16,-19 19-16,19-19 15,-1 19-15,0-36 16,-17 35-16,17-17 16,-17 17-16,17-17 15,-17 17-15,-1-17 16,1 17 0,0 1-16,-18-1 0,17 18 15,1-18-15,0 1 0,-18-1 0,35-17 16,-18 17-1,1-17 1,0 17-16,-1 1 0,19-19 16,-36 19-16,17-1 0,19-17 15,-36 17 1,17 1-16,1-1 16,-1 0-16,1 1 0,0-19 15,-1 19 1,1-1-1,0 1-15,-1-1 16,-17 0-16,36-17 16,-19 17-16,1 1 0,0-19 15,-1 19-15,1-19 16,-1 19-16,19-1 16,-36 1-16,17-1 15,1 0-15,-18 1 16,35-19-16,-17 19 15,0-19-15,-1 19 16,18-36 0,-17 35-16,-18 1 0,18-1 15,-1 0-15,1 1 16,0-19 0,-1 19-16,1-1 15,17-35-15,-17 36 0,-18-1 16,35-35-1,-35 35-15,35-17 16,-17 17-16,-18 1 0,35-18 16,-17 17-16,0 0 15,-1 1-15,19-19 16,-19 19-16,1-1 16,17-17-16,-17 17 15,17-17-15,-17 35 16,-1-18-16,19-17 15,-19 35-15,18-18 16,1 1 0,-19-1-16,19 0 15,-19 18-15,1-17 0,0 17 16,-1-18-16,1 1 16,-1 17-16,1 0 0,0-18 15,17 0-15,-17 18 16,35-17-1,-18-1-15,-17 0 0,52 1 16,-35-1-16,1 0 16,-1 18-16,0-17 15,-17 17-15,17-18 16,-17 18-16,17 0 16,-17-18-16,17 18 0,18-17 15,-36 17-15,19 0 16,-19-18-16,19 18 15,-1-17-15,-17 17 0,17 0 0,35-18 16,-52 18 0,17 0-16,18-18 15,-35 18-15,35-17 16,-18 17-16,-17 0 0,35-18 16,0 18-1,-36 0-15,18 0 16,-17 0-16,53 0 15,-36 0-15,18-18 16,-35 18-16,17 0 0,18 0 16,-18 0-16,36 0 15,-36 0-15,35 0 16,-52 0 0,35-17-16,-18 17 15,-17 0-15,17 0 16,-17 0-16,-1 17 15,1-17-15,35 18 16,-35-18-16,17 0 0,18 18 16,-18-18-16,-17 0 15,17 0-15,18 0 16,-35 0-16,52 0 16,-17 0-1,18 0-15,-89 0 31</inkml:trace>
+  <inkml:trace contextRef="#ctx0" brushRef="#br0" timeOffset="55435.2623">18221 9490 0,'18'0'47,"-1"0"-32,1 0 1,0 0-16,-1 0 16,1 0-16,-1 0 15,1 0-15,0 0 0,17 0 16,-17 0-16,-1 0 15,19 0 1,-19 0-16,18 0 0,1 0 16,-1 0-16,0 0 15,-17 0-15,35 0 16,-18 0-16,0 0 16,1 0-16,17 0 15,-36 0-15,36 0 16,-35 0-1,-1 0-15,36 0 16,0-18 0,-17 18-16,16-18 0,-16 18 15,-1-17 1,0 17-16,1-18 16,-19 18-16,19 0 15,-1-17-15,0-1 16,0 18-16,-17-18 0,53 1 15,-19-1 1,-34 0-16,17 1 16,18-1-16,-35 0 15,17 1-15,0-1 16,-17 18-16,0-17 0,-1-1 16,1 18-16,17-35 15,-17 35-15,17-18 16,-17 0-16,0 18 0,-1-17 15,36-19-15,-18 19 16,18-19-16,-35 19 16,35-18-16,-36 17 15,36-17 1,-35-1-16,17 1 16,-17 17-16,35-17 15,-36 18-15,19-19 16,-19 19-16,19-19 15,-1 19-15,0-36 16,-17 35-16,17-17 16,-17 17-16,17-17 15,-17 17-15,-1-17 16,1 17 0,0 1-16,-18-1 0,17 18 15,1-18-15,0 1 0,-18-1 0,35-17 16,-18 17-1,1-17 1,0 17-16,-1 1 0,19-19 16,-36 19-16,17-1 0,19-17 15,-36 17 1,17 1-16,1-1 16,-1 0-16,1 1 0,0-19 15,-1 19 1,1-1-1,0 1-15,-1-1 16,-17 0-16,36-17 16,-19 17-16,1 1 0,0-19 15,-1 19-15,1-19 16,-1 19-16,19-1 16,-36 1-16,17-1 15,1 0-15,-18 1 16,35-19-16,-17 19 15,0-19-15,-1 19 16,18-36 0,-17 35-16,-18 1 0,18-1 15,-1 0-15,1 1 16,0-19 0,-1 19-16,1-1 15,17-35-15,-17 36 0,-18-1 16,35-35-1,-35 35-15,35-17 16,-17 17-16,-18 1 0,35-18 16,-17 17-16,0 0 15,-1 1-15,19-19 16,-19 19-16,1-1 16,17-17-16,-17 17 15,17-17-15,-17 35 16,-1-18-16,19-17 15,-19 35-15,18-18 16,1 1 0,-19-1-16,19 0 15,-19 18-15,1-17 0,0 17 16,-1-18-16,1 1 16,-1 17-16,1 0 0,0-18 15,17 0-15,-17 18 16,35-17-1,-18-1-15,-17 0 0,52 1 16,-35-1-16,1 0 16,-1 18-16,0-17 15,-17 17-15,17-18 16,-17 18-16,17 0 16,-17-18-16,17 18 0,18-17 15,-36 17-15,19 0 16,-19-18-16,19 18 15,-1-17-15,-17 17 0,17 0 0,35-18 16,-52 18 0,17 0-16,18-18 15,-35 18-15,35-17 16,-18 17-16,-17 0 0,35-18 16,0 18-1,-36 0-15,18 0 16,-17 0-16,53 0 15,-36 0-15,18-18 16,-35 18-16,17 0 0,18 0 16,-18 0-16,36 0 15,-36 0-15,35 0 16,-52 0 0,35-17-16,-18 17 15,-17 0-15,17 0 16,-17 0-16,-1 17 15,1-17-15,35 18 16,-35-18-16,17 0 0,18 18 16,-18-18-16,-17 0 15,17 0-15,18 0 16,-35 0-16,52 0 16,-17 0-1,18 0-15,-89 0 31</inkml:trace>
   <inkml:trace contextRef="#ctx0" brushRef="#br0" timeOffset="56646.0133">24571 7814 0,'0'-18'16,"18"36"31,-1 0-47,36 17 15,-35-17-15,52 17 16,-34-17-1,-1-1-15,-17 1 0,-1-1 0,1 19 16,-18-19 0,-18 1-16,1 0 0,-36 35 15,17-36-15,1 1 16,0-1-16,17 1 0,-17 0 16,17 17-1</inkml:trace>
   <inkml:trace contextRef="#ctx0" brushRef="#br0" timeOffset="56991.3468">24747 8431 0,'18'0'16,"17"0"-16,18 0 16,-35 18-16,17-18 15,0 18-15,-17-18 0,17 35 16,-35-17-16,0 35 16,0-18-16,-35 35 15,17-34-15,-17 34 16,35-35-16,0 1 15,0-19-15,0 1 16,18 0-16,17-18 16,-17 0-16,-1-18 15,-17 0-15</inkml:trace>
   <inkml:trace contextRef="#ctx0" brushRef="#br0" timeOffset="57148.3913">24906 8819 0,'71'-17'15,"-18"17"-15,17-18 16,-35 18-16,-17 0 0,17-17 16</inkml:trace>
@@ -219,23 +222,23 @@
   <inkml:trace contextRef="#ctx0" brushRef="#br0" timeOffset="58415.3069">20796 5398 0,'-35'-18'16,"-18"36"-1,18-1-15,17 18 16,18-17-16,0 0 16,18-18-16,17 17 15,-17-17 1,-1-17-16,1 17 0,0-18 15,-1-17-15,1 17 16,-18 1-16,18 34 47,-1 1-31,1-1-16,35 1 15,-36 0-15,1-18 16</inkml:trace>
   <inkml:trace contextRef="#ctx0" brushRef="#br0" timeOffset="59238.8427">23848 5803 0,'17'-35'0,"1"0"15,0-1 1,-36 1-1,0 17 1,-17 18 0,-18 0-16,36 18 15,-36 35 1,35 0 0,18-18-16,0 0 15,0-17-15,18 17 16,-1-17-16,19-18 15,-19 18-15,1-18 0,17-18 16,-35 0 0,18 1-16,-18-1 0,0 0 15,0-17 1,-18 35-16,36 0 31,17 35-15,-17-17-16,17 17 15,0-35-15,-17 18 16,17 17 0,-17-35-16,-1 18 0,19 0 15,-19-18-15</inkml:trace>
   <inkml:trace contextRef="#ctx0" brushRef="#br0" timeOffset="59450.1235">24236 5768 0,'17'0'0,"19"0"16,-1 0-16,0 0 15,1 0-15,-19 0 16</inkml:trace>
-  <inkml:trace contextRef="#ctx0" brushRef="#br0" timeOffset="59571.2273">24324 5874 0,'35'17'16,"-17"-17"-16,17 0 15,18-17-15,-35 17 16</inkml:trace>
+  <inkml:trace contextRef="#ctx0" brushRef="#br0" timeOffset="59571.2272">24324 5874 0,'35'17'16,"-17"-17"-16,17 0 15,18-17-15,-35 17 16</inkml:trace>
   <inkml:trace contextRef="#ctx0" brushRef="#br0" timeOffset="59810.6908">24730 5786 0,'53'0'0,"-18"0"16,18-18-16,-18 18 16,0 0-1,-17-18-15,0 18 0,-1-17 16,-17-1-1,-17 0-15</inkml:trace>
   <inkml:trace contextRef="#ctx0" brushRef="#br0" timeOffset="59983.2322">24836 5503 0,'0'36'15,"0"17"1,17-18-16,-17 0 0,0 18 15,18 35-15,-1-53 0,-17 1 16,18 34 0,0-34-16,-1-19 15,-17 1-15</inkml:trace>
   <inkml:trace contextRef="#ctx0" brushRef="#br0" timeOffset="60361.7541">25171 5821 0,'-18'0'0,"0"0"16,1 0-16,-1 35 16,18-17-16,0 35 15,0-36-15,18 19 16,-1-19-1,1-17-15,0 0 16,-1 0-16,1-17 16,0 17-16,-18-18 0,17-17 15,-17 17 1,0 0-16,-17 1 0,17-1 16,-18 18-1,36 18 1,-1-1-1,-17 1-15,36 17 16,-19-17-16,-17 0 16,18-18-16,-1 17 0,1-17 15,0 0-15</inkml:trace>
   <inkml:trace contextRef="#ctx0" brushRef="#br0" timeOffset="60766.5696">25418 5980 0,'0'35'15,"0"-17"1,0-1 0,0-34-1,17-1 1,-17 0-16,0 1 0,18-36 16,-18 17-1,18 19-15,-1-1 16,1 18-16,-1 18 15,-17-1 1,18 19-16,0-19 16,-1 19-1,-17-19-15,18 1 0,0 0 16,-1-1-16</inkml:trace>
-  <inkml:trace contextRef="#ctx0" brushRef="#br0" timeOffset="61211.1993">25682 5556 0,'18'0'0,"0"36"16,-18-1-1,17-18-15,-17 72 16,18-36-16,-18 35 16,0-35-16,17-18 0,-17 18 15,0-35-15,-17-18 16,17 17-16,0-34 15,17-1 1,1-17 0,0 17-16,-1 18 15,1-18-15,0 1 16,-1 17-16,-17 17 0,18-17 16,-18 18-16,18 17 15,-1 1-15,-17-19 0,18 1 16,-1 17-1,1-17-15,0-18 16,-1 0-16</inkml:trace>
+  <inkml:trace contextRef="#ctx0" brushRef="#br0" timeOffset="61211.1992">25682 5556 0,'18'0'0,"0"36"16,-18-1-1,17-18-15,-17 72 16,18-36-16,-18 35 16,0-35-16,17-18 0,-17 18 15,0-35-15,-17-18 16,17 17-16,0-34 15,17-1 1,1-17 0,0 17-16,-1 18 15,1-18-15,0 1 16,-1 17-16,-17 17 0,18-17 16,-18 18-16,18 17 15,-1 1-15,-17-19 0,18 1 16,-1 17-1,1-17-15,0-18 16,-1 0-16</inkml:trace>
   <inkml:trace contextRef="#ctx0" brushRef="#br0" timeOffset="62757.9179">26229 5539 0,'-18'17'31,"1"19"-15,17-1-16,-18 0 0,18 53 15,0-35-15,0 35 16,0-52 0,18 17-16,17 0 15,-17-18-15,17-18 0,0 1 16,-17 0-16,0-18 16</inkml:trace>
-  <inkml:trace contextRef="#ctx0" brushRef="#br0" timeOffset="63080.7117">26441 5768 0,'35'0'15,"-17"0"-15,-1 0 16,36 18-16,-35-18 15,35 35 1,-36-18-16,-17 1 0,0 17 16,0-17-16,0 0 0,-35 17 15,35-17 1,-18 35-16,18-36 16,0 18-1,18-35-15,0 18 16,-1-18-16,19 0 15,-19 0-15,19-18 16,-36 1-16</inkml:trace>
+  <inkml:trace contextRef="#ctx0" brushRef="#br0" timeOffset="63080.7116">26441 5768 0,'35'0'15,"-17"0"-15,-1 0 16,36 18-16,-35-18 15,35 35 1,-36-18-16,-17 1 0,0 17 16,0-17-16,0 0 0,-35 17 15,35-17 1,-18 35-16,18-36 16,0 18-1,18-35-15,0 18 16,-1-18-16,19 0 15,-19 0-15,19-18 16,-36 1-16</inkml:trace>
   <inkml:trace contextRef="#ctx0" brushRef="#br0" timeOffset="63252.863">26547 5997 0,'35'18'15,"-18"-18"-15,1 0 16,0 0-16,17 0 16,-17 0-16,-1 0 0,19 0 15,-36-18 1</inkml:trace>
   <inkml:trace contextRef="#ctx0" brushRef="#br0" timeOffset="63525.955">26723 5468 0,'18'0'16,"-1"0"-16,36 18 15,-35 17-15,17 0 0,36 53 16,-54-35-16,1 18 16,0-18-16,-1 0 15,1 0-15,-18 35 16,0-53-16,-18 36 16,-17-54-16,-18 36 15</inkml:trace>
   <inkml:trace contextRef="#ctx0" brushRef="#br0" timeOffset="64236.9817">21008 6297 0,'18'0'15,"34"0"1,1 0-1,0 0-15,0 0 0,18 0 0,52 0 16,-70 0-16,53 0 16,-71 0-1,-17 0-15,0 18 16</inkml:trace>
   <inkml:trace contextRef="#ctx0" brushRef="#br0" timeOffset="64626.0568">20585 6050 0,'0'18'0,"0"-1"16,-18 1-16,36 53 16,-18-18-16,35 35 15,-17-35-15,-1 0 16,36 35-16</inkml:trace>
   <inkml:trace contextRef="#ctx0" brushRef="#br0" timeOffset="65422.1668">20990 9578 0,'-17'0'15,"-1"0"1,36 0 0,52 18 15,-35-18-31,71 0 16,-53 0-16,-17-18 0,52 18 15,-53 0 1,-17 0-16,-1 0 0</inkml:trace>
   <inkml:trace contextRef="#ctx0" brushRef="#br0" timeOffset="84096.6051">20108 9648 0,'-17'0'31,"34"0"16,1 0-31,0 0-16,17 18 15,-17-18 1,-1 0-16,1 0 0,17-18 16</inkml:trace>
-  <inkml:trace contextRef="#ctx0" brushRef="#br0" timeOffset="84713.7275">20602 9366 0,'-17'0'0,"17"18"47,0 52-31,0-34-16,0 52 15,0-35 1,0-18-16,0 36 15,17-36-15,-17-17 0,18 17 16,-18-17 0</inkml:trace>
+  <inkml:trace contextRef="#ctx0" brushRef="#br0" timeOffset="84713.7274">20602 9366 0,'-17'0'0,"17"18"47,0 52-31,0-34-16,0 52 15,0-35 1,0-18-16,0 36 15,17-36-15,-17-17 0,18 17 16,-18-17 0</inkml:trace>
   <inkml:trace contextRef="#ctx0" brushRef="#br0" timeOffset="143663.2129">27693 5874 0,'18'0'0,"-1"0"16,19 0-16,-19 0 0,54-18 16,-36 18-16,36 0 15,-54-18 1</inkml:trace>
-  <inkml:trace contextRef="#ctx0" brushRef="#br0" timeOffset="143789.8012">27799 5997 0,'18'0'16,"17"0"-16,-18 0 15,36-17 1,-35-1-16</inkml:trace>
+  <inkml:trace contextRef="#ctx0" brushRef="#br0" timeOffset="143789.8011">27799 5997 0,'18'0'16,"17"0"-16,-18 0 15,36-17 1,-35-1-16</inkml:trace>
   <inkml:trace contextRef="#ctx0" brushRef="#br0" timeOffset="146282.187">28698 5609 0,'18'0'15,"0"0"1,-1 0-16,1-17 0,0 17 16,-1-18-16,1 18 15,-18-18-15,18 1 0,-18-1 16,0 0-16,-18 1 16,18-1-16,-18 0 0,-35 18 15,18 0 1,0 0-16,-18 36 0,35-1 15,-17 18 1,35-18-16,18 18 16,-18-18-16,53 18 15,-18-35-15,53 0 16,-35-18-16,35 0 16,-53 0-16,18-18 15,-35 0-15</inkml:trace>
   <inkml:trace contextRef="#ctx0" brushRef="#br0" timeOffset="148128.2792">29157 5221 0,'0'0'0,"18"0"47,-1 0-47,1 0 16,0 0-16,-1 18 16,1-1-1,-18 19-15,-18-1 16,1-17-16,-1 17 15,18-17-15,0-1 16,18 1 0,17-18-1,-17 0 1</inkml:trace>
   <inkml:trace contextRef="#ctx0" brushRef="#br0" timeOffset="148273.0972">29122 5345 0,'35'0'0,"18"-18"15,-18 18-15,36-18 16,-1 18 0,-52 0-16,0 0 15</inkml:trace>
@@ -249,21 +252,21 @@
   <inkml:trace contextRef="#ctx0" brushRef="#br0" timeOffset="151342.2337">29122 6332 0,'0'-17'0,"53"17"16,17-18-1,-34 18-15,34 18 16,-35-1 0,-17 1-1,-36 17-15,1-17 0,-36 35 16,18-18 0,17-35-16,18 18 0,0-1 15,18 1 1,17-18-1,-18 0-15,1 0 0,0-18 16,-1 18-16,-34-17 16</inkml:trace>
   <inkml:trace contextRef="#ctx0" brushRef="#br0" timeOffset="151477.1752">29157 6421 0,'0'0'0,"35"0"15,18 0-15,-17 0 16,34-18 0,-35 18-16,1 0 0</inkml:trace>
   <inkml:trace contextRef="#ctx0" brushRef="#br0" timeOffset="151748.6812">29669 6650 0,'35'0'15,"35"0"1,-34 0-16,17-18 16,-18 18-16,-17 0 15,-1-17-15,-17-1 16</inkml:trace>
-  <inkml:trace contextRef="#ctx0" brushRef="#br0" timeOffset="151899.6241">29774 6526 0,'18'71'15,"0"-36"-15,-1 36 16,1-36-16,0-17 0,-1 35 16,1-53-16,0 17 15</inkml:trace>
+  <inkml:trace contextRef="#ctx0" brushRef="#br0" timeOffset="151899.624">29774 6526 0,'18'71'15,"0"-36"-15,-1 36 16,1-36-16,0-17 0,-1 35 16,1-53-16,0 17 15</inkml:trace>
   <inkml:trace contextRef="#ctx0" brushRef="#br0" timeOffset="152488.7203">30198 6738 0,'53'-18'16,"17"1"-16,-34 17 15,16-18-15,-34 1 16,17-1-16,-17 0 16,-18-17-1,-18 35-15,-17-18 16,0 1-16,-36 17 16,36 17-16,0-17 0,-18 53 15,53-35-15,0 17 16,0 0-16,17-17 0,36 35 15,-17-53 1,17 18-16,35-1 16,-53-17-16,18 0 0,-35 0 15,17 0-15,-18-17 0</inkml:trace>
   <inkml:trace contextRef="#ctx0" brushRef="#br0" timeOffset="152895.3659">30674 6368 0,'18'0'16,"-1"0"-1,1 0 1,0 0-16,-1 0 16,1 0-16</inkml:trace>
-  <inkml:trace contextRef="#ctx0" brushRef="#br0" timeOffset="153266.1946">30833 6244 0,'35'0'16,"-17"0"-16,-1 0 0,19 0 15,17 18-15,-18-18 16,0 17-16,-17 1 16,-1 0-16,-17-1 15,-17 19 1,-1-36-16,0 17 0,-17 19 16,18-19-1,17 1-15,17-1 16,1 1-1,17-18 1,-17 0-16,-1 0 0,19 0 16,-19 0-16,-17-18 15,0 1 1,-35 17-16,17 0 16,1-18-16</inkml:trace>
-  <inkml:trace contextRef="#ctx0" brushRef="#br0" timeOffset="153410.9899">30921 6385 0,'18'0'0,"17"0"16,-17 0-16,52-17 16,-17 17-16,0-18 15,-35 18-15,-1 0 16</inkml:trace>
+  <inkml:trace contextRef="#ctx0" brushRef="#br0" timeOffset="153266.1945">30833 6244 0,'35'0'16,"-17"0"-16,-1 0 0,19 0 15,17 18-15,-18-18 16,0 17-16,-17 1 16,-1 0-16,-17-1 15,-17 19 1,-1-36-16,0 17 0,-17 19 16,18-19-1,17 1-15,17-1 16,1 1-1,17-18 1,-17 0-16,-1 0 0,19 0 16,-19 0-16,-17-18 15,0 1 1,-35 17-16,17 0 16,1-18-16</inkml:trace>
+  <inkml:trace contextRef="#ctx0" brushRef="#br0" timeOffset="153410.9898">30921 6385 0,'18'0'0,"17"0"16,-17 0-16,52-17 16,-17 17-16,0-18 15,-35 18-15,-1 0 16</inkml:trace>
   <inkml:trace contextRef="#ctx0" brushRef="#br0" timeOffset="164870.075">24324 2858 0,'-18'0'16,"18"17"15,36-17-15,-19 18-16,19-1 0,-1 1 15,0 0-15,53 35 16,-35-36-16,-17 1 0,16 17 15,1-17-15,18 17 16,-53-17-16,17-18 16,-18 0-16,1 0 15,-18-18 1</inkml:trace>
   <inkml:trace contextRef="#ctx0" brushRef="#br0" timeOffset="165122.8976">24765 2928 0,'53'18'15,"-35"-1"1,34 19-16,-16-19 16,-1 1-16,-17 17 0,35 18 15,-36-35-15,-17 35 16,0-18-16,-17 0 15,-19-17-15,-52 17 16,53-17-16,-36-1 16,36-17-1,17 18-15,1 0 16</inkml:trace>
   <inkml:trace contextRef="#ctx0" brushRef="#br0" timeOffset="169733.7384">21167 8008 0,'0'-18'15,"0"1"17,0-1-32,0 1 15,0-1 16,-18 18-15,0 18-16,18-1 16,0 1-16,0-1 0,0 36 15,18-35-15,0 0 16,17-1-16,-17 1 16,35-18-1,-18-18-15,-18 1 16,-17-1-16,-17-35 15,-1 18-15,1 17 16,-36-35-16,17 36 16,1-1-16,-18 18 15,18 18-15,17-18 0,1 53 16,-1-36 0,18 18-16,35 18 15,0-17-15,1-19 0,17 19 16,-18-19-1,0-17-15,18-17 16,-18 17-16,-35-18 0,18-17 16,-18 17-16,-35-17 15,0-1-15,-18 1 16,17 35-16,-34-17 16,52 17-16,-17 0 15,35 17-15,-18 18 16,36-17-1,-1 17-15,19-17 16,17 0 0,-18-18-16,18 0 15,-35 0-15,17 0 0,-18-18 16,-17 0-16,0-17 16,-17 17-16,-18-17 15,-1 0-15,-17 0 16,36 17-16,-36 18 15,35 0-15,-17 18 16,35-1-16,-18 1 16,36 0-16,17 17 15,0-18-15,36 1 16,-36 0-16,36-18 16,-54 0-16,19-18 15,-36 0 1,0 1-16,-18-1 15,-17-35-15,17 36 16,-35-19-16,36 36 16,-1 0-16,-17 0 15,17 18 1,18 0-16,18 17 16,17-17-1,-17-1-15,17-17 0,-17 0 16,-1 0-1,-17-17 1,-35-1 0,17 0-16,1 18 15</inkml:trace>
   <inkml:trace contextRef="#ctx0" brushRef="#br0" timeOffset="187675.5195">6597 3475 0,'0'18'16,"-18"-18"15,18-18 63,0-17-94,0 17 16,-17-35-1,17 18-15,0-1 0,-18-16 16,18 16-16,0-17 0,0 0 15,0 1-15,0-1 0,0 17 16,0-34-16,0 52 16,0 1-16,0-19 15,0 19-15,0-1 16,18 18 0,-1 0-1,36 0 1,0 0-16,0 0 15,88 18 1,-70-18-16,87 17 16,-87-17-16,17 0 0,18 0 15,-18 0 1,-70 0-16,0 0 0,-1 0 16,-34-17-1,-36 17 1,17 0-16,1 0 15</inkml:trace>
   <inkml:trace contextRef="#ctx0" brushRef="#br0" timeOffset="188241.2206">6279 3334 0,'18'17'32,"0"19"-17,35 17 1,-18-36-16,0 19 0,-17-19 16,35 36-1,-18-35-15,-17-18 0,17 17 16,-17-17-16,35 0 15,-36-17-15,54-19 16,-36 1-16,18 0 16,17-36-16,-52 54 0,17-36 15</inkml:trace>
-  <inkml:trace contextRef="#ctx0" brushRef="#br0" timeOffset="192285.0814">8184 2752 0,'0'0'0,"18"-18"16,-18 0-1,18 1-15,-18-1 16,-18 0-1,0 1-15,-17 17 16,-18 35 0,36-17-16,-19-1 0,19 19 0,-36 34 15,35-34-15,18 34 16,0-35 0,18-17-16,17 35 15,0-53-15,-17 18 16,17-18-16,-17-18 0,52-17 15,-52-1-15,17-17 16,-35 18-16,18-18 16,-18 36-16,0-1 15,0 0-15,0 36 16,0 17-16,0 1 16,18 16-16,17 90 15,0-90-15,-17 19 16,-1 0-16,1-19 0,0 37 15,-1-54-15,-17-17 16,0-1-16,0 1 0,-35 0 16,0-18-16,0 0 15,-1 0-15,1-18 16,0 0-16,-36-17 16,54 17-16,-1 18 0,0-17 15</inkml:trace>
+  <inkml:trace contextRef="#ctx0" brushRef="#br0" timeOffset="192285.0813">8184 2752 0,'0'0'0,"18"-18"16,-18 0-1,18 1-15,-18-1 16,-18 0-1,0 1-15,-17 17 16,-18 35 0,36-17-16,-19-1 0,19 19 0,-36 34 15,35-34-15,18 34 16,0-35 0,18-17-16,17 35 15,0-53-15,-17 18 16,17-18-16,-17-18 0,52-17 15,-52-1-15,17-17 16,-35 18-16,18-18 16,-18 36-16,0-1 15,0 0-15,0 36 16,0 17-16,0 1 16,18 16-16,17 90 15,0-90-15,-17 19 16,-1 0-16,1-19 0,0 37 15,-1-54-15,-17-17 16,0-1-16,0 1 0,-35 0 16,0-18-16,0 0 15,-1 0-15,1-18 16,0 0-16,-36-17 16,54 17-16,-1 18 0,0-17 15</inkml:trace>
   <inkml:trace contextRef="#ctx0" brushRef="#br0" timeOffset="192902.4651">8872 2487 0,'0'-18'16,"0"1"-1,-17-1-15,-1 1 16,0 17 0,1 0-1,17 17-15,-18 18 0,-17 71 16,35-53-16,0 88 15,0-88 1,0 0-16,18 0 0,-1 0 16,1-18-16,17 18 15,0-35-15,-17-1 16,0 1-16,-1-18 0,1 0 0,0 0 16,-1 0-16,1-18 0,-1 1 15</inkml:trace>
   <inkml:trace contextRef="#ctx0" brushRef="#br0" timeOffset="193274.5389">9190 2663 0,'18'0'16,"-1"0"0,1 0-16,-1 0 0,36 0 15,-17 18 1,-36 0-16,0-1 0,-18 54 16,-35 0-1,35-36-15,-17 18 16,18-36-16,-1 19 0,18-1 15,0-17-15,18 17 16,-1-18 0,1-17-16,35 18 0,-18-18 15,0-18-15,1 18 16,-19-17-16,1 17 16,-18-18-16,0 1 15</inkml:trace>
-  <inkml:trace contextRef="#ctx0" brushRef="#br0" timeOffset="193435.9819">9102 2840 0,'53'0'16,"-18"0"-16,35 0 15,-34 0 1,34 0-16,-34 0 15,-19 0-15</inkml:trace>
-  <inkml:trace contextRef="#ctx0" brushRef="#br0" timeOffset="194530.9266">9560 2399 0,'18'0'16,"-18"-18"-16,18 18 0,17 0 15,-18 0-15,19-17 16,-19 17-16,19 0 16,-19 0-16,1 0 0,0 0 15</inkml:trace>
+  <inkml:trace contextRef="#ctx0" brushRef="#br0" timeOffset="193435.9818">9102 2840 0,'53'0'16,"-18"0"-16,35 0 15,-34 0 1,34 0-16,-34 0 15,-19 0-15</inkml:trace>
+  <inkml:trace contextRef="#ctx0" brushRef="#br0" timeOffset="194530.9265">9560 2399 0,'18'0'16,"-18"-18"-16,18 18 0,17 0 15,-18 0-15,19-17 16,-19 17-16,19 0 16,-19 0-16,1 0 0,0 0 15</inkml:trace>
   <inkml:trace contextRef="#ctx0" brushRef="#br0" timeOffset="194739.721">9648 2399 0,'0'35'15,"0"0"1,0 18-1,0-35-15,0 17 0,18 1 16,0-19-16,-1 1 16,19-1-1,-19-17-15</inkml:trace>
   <inkml:trace contextRef="#ctx0" brushRef="#br0" timeOffset="194919.7462">9860 2505 0,'0'17'16,"0"19"0,0-1-16,0-17 15,35-18 1,-17 0-16</inkml:trace>
   <inkml:trace contextRef="#ctx0" brushRef="#br0" timeOffset="195220.0908">9984 2364 0,'17'0'15,"1"0"-15,17 0 16,-17 0-16,-1 17 0,19 1 16,-19 0-1,1 34 1,-18-34-16,0 0 0,0-1 16,0 1-16,-18 0 0,1-1 15,-1 1 1,0-18-16,1 0 0,-1 0 15,18-18 1,18 1 0</inkml:trace>
@@ -274,19 +277,19 @@
   <inkml:trace contextRef="#ctx0" brushRef="#br0" timeOffset="196671.1972">11906 2469 0,'0'53'16,"0"36"-1,0-19-15,18 36 16,0-35-16,-1-19 16,1 1-16,-1 0 0,1 0 15,0-18-15,-1 18 16,1-35-16</inkml:trace>
   <inkml:trace contextRef="#ctx0" brushRef="#br0" timeOffset="197261.5749">12294 2858 0,'-53'17'16,"36"1"-16,-19-1 15,19 19-15,-1-19 16,18 19-16,0-19 0,0 19 16,18-19-16,-1 1 0,19-1 0,17 1 15,-18-18 1,0-18-16,18 1 16,-18-36-1,-17 35-15,-18-17 0,0 0 16,-18 17-16,1 0 15,-1 1-15,1 17 16,-1 0-16,0 35 16,1-17-16,34 35 15,-17-36-15,53 19 16,-35-19-16,52 1 16,-34-1-16,-1-17 15,-17 0-15,-1 0 16,-34 0-1,17-17 1,0-1-16,-18 1 16,18-1-1,0 0-15,18 18 0,-18-35 16,0 17 0,17 18-16,1 0 15,-1 0 1,19 0-1,-19 0-15,1 18 0,0 0 16,-1-18-16,19 53 16,-19-36-16,-17 1 15,18-18-15,-1 17 0,1 1 0,-18 0 16,18-18-16,-1 0 16</inkml:trace>
   <inkml:trace contextRef="#ctx0" brushRef="#br0" timeOffset="197913.012">12947 2399 0,'0'53'16,"0"-18"-16,18 89 15,-1-1 1,1-70-16,-18 70 16,0-70-16,0 0 15,18-17-15,-18-1 16,17-35-16,-17-35 16,18 17-1,-18-17-15,17 17 0,1 0 16,17-17-16,-17 35 15,0 0-15,17 18 16,-17 17-16,-1-17 16,1 17-16,-1-17 0,1 34 15,0-16 1,-18-19-16,0 1 0,0 0 16,0-36-1</inkml:trace>
-  <inkml:trace contextRef="#ctx0" brushRef="#br0" timeOffset="198607.8716">13705 2399 0,'-17'0'0,"-1"18"16,18-1-16,-17 54 15,-1-18-15,18 17 16,0-17-16,0 53 15,35 0-15,-17-53 16,-1-18-16,54 18 16,-36-18-16,1-35 15,-19 0-15</inkml:trace>
+  <inkml:trace contextRef="#ctx0" brushRef="#br0" timeOffset="198607.8715">13705 2399 0,'-17'0'0,"-1"18"16,18-1-16,-17 54 15,-1-18-15,18 17 16,0-17-16,0 53 15,35 0-15,-17-53 16,-1-18-16,54 18 16,-36-18-16,1-35 15,-19 0-15</inkml:trace>
   <inkml:trace contextRef="#ctx0" brushRef="#br0" timeOffset="198912.4829">13988 2663 0,'17'0'15,"36"0"1,-35 18-16,17 0 16,-17-18-16,-18 17 0,0 19 15,0-19-15,-18 19 16,18-19-16,-35 36 15,35-35 1,-18 17-16,18-17 16,18-1-16,-18 1 15,17-18-15,19 18 16,-19-1-16,1-17 0,0 18 16,-1-18-1</inkml:trace>
   <inkml:trace contextRef="#ctx0" brushRef="#br0" timeOffset="199063.7091">14005 2875 0,'36'-17'16,"-1"17"-16,-18 0 0,36 0 15,-17 0-15,34-18 16,-52 18-16,17-18 15</inkml:trace>
-  <inkml:trace contextRef="#ctx0" brushRef="#br0" timeOffset="199287.3464">14305 2364 0,'18'0'15,"-1"0"-15,19 0 0,17-18 16,-36 18-16,36-18 16,-35 18-1</inkml:trace>
+  <inkml:trace contextRef="#ctx0" brushRef="#br0" timeOffset="199287.3463">14305 2364 0,'18'0'15,"-1"0"-15,19 0 0,17-18 16,-36 18-16,36-18 16,-35 18-1</inkml:trace>
   <inkml:trace contextRef="#ctx0" brushRef="#br0" timeOffset="199462.5822">14358 2399 0,'0'35'16,"18"36"-16,-1-36 15,19 18 1,-1-18-1,0-35-15,0 35 16,1-35 0,-19 0-16</inkml:trace>
   <inkml:trace contextRef="#ctx0" brushRef="#br0" timeOffset="199647.0698">14658 2434 0,'0'35'16,"0"-17"0,0 17-16,0-17 15,18 17 1,-1-17-16,1 0 0,-1-18 16,1-18-1</inkml:trace>
   <inkml:trace contextRef="#ctx0" brushRef="#br0" timeOffset="199963.8559">14834 2346 0,'18'0'0,"-18"-18"15,18 18-15,-1 0 16,1 0-16,-18 18 15,18-18-15,-18 18 0,17 35 16,1-36-16,-18 18 16,0-17-16,0 17 0,0 1 15,0-19 1,0 1-16,0 0 0,-18-18 31,1 0 0,17-18-15,0 0 0</inkml:trace>
   <inkml:trace contextRef="#ctx0" brushRef="#br0" timeOffset="200575.4579">15169 2328 0,'0'-17'15,"18"34"16,0 19-15,-1-19-16,36 36 16,-35-18-16,17 71 15,-17-53-15,-1 53 16,1-35-16,-18 52 16,0-70-16,0 0 15,-35 53 1,17-71-16,1 0 0,-19 36 15,19-54 1,-1 19-16</inkml:trace>
-  <inkml:trace contextRef="#ctx0" brushRef="#br0" timeOffset="211043.4695">6526 10001 0,'0'18'16,"0"52"0,0-17-16,0 0 0,18 71 15,-18-71-15,18 0 16,-18 0-16,17 35 16,1-53-1,17-35-15,-17 0 16,-18-18-16</inkml:trace>
-  <inkml:trace contextRef="#ctx0" brushRef="#br0" timeOffset="211341.879">6350 10248 0,'-18'0'0,"36"0"32,0-35-17,17 17-15,18-35 16,-36 18-16,19-18 16,-19 18-16,1 17 0,-18 1 15,18-1-15,-18 0 0,17 36 31,1 35-15,0-18-16,-1-17 0,1 17 16,0-17-16</inkml:trace>
+  <inkml:trace contextRef="#ctx0" brushRef="#br0" timeOffset="211043.4694">6526 10001 0,'0'18'16,"0"52"0,0-17-16,0 0 0,18 71 15,-18-71-15,18 0 16,-18 0-16,17 35 16,1-53-1,17-35-15,-17 0 16,-18-18-16</inkml:trace>
+  <inkml:trace contextRef="#ctx0" brushRef="#br0" timeOffset="211341.8789">6350 10248 0,'-18'0'0,"36"0"32,0-35-17,17 17-15,18-35 16,-36 18-16,19-18 16,-19 18-16,1 17 0,-18 1 15,18-1-15,-18 0 0,17 36 31,1 35-15,0-18-16,-1-17 0,1 17 16,0-17-16</inkml:trace>
   <inkml:trace contextRef="#ctx0" brushRef="#br0" timeOffset="232664.2438">21184 7973 0,'-17'0'0,"17"17"15,0 1-15,-18 0 16,36-1 15,-1-17-15</inkml:trace>
   <inkml:trace contextRef="#ctx0" brushRef="#br0" timeOffset="234129.0472">25823 3034 0,'18'-18'0,"-18"1"16,-18 17-1,1 0-15,-1 0 16,0 0 0,1 0-16,-18 17 15,17 1-15,0 0 0,18-1 16,-17 18 0,34-35-16,-17 18 15,18-18-15,0 18 0,-1-18 16,1 0-16,-1-18 0,19 0 15,-19 1-15,-17-1 16,18-17-16,-36 17 16,18 1-16,-35-1 15,-18 0 1,18 18-16,0 18 0,-1 0 16,-34 17-16,34 0 15,19 0-15,17-17 0,-18 17 16,36 1-1,17-19-15,0 1 0,1-18 16,34-35 0,-34-1-16,-1-17 15,-18 36-15,1-18 0,-36-18 16,1 35-16,-1 0 16,-17 1-1,0-1-15,-1 18 0,-17 35 16,36-17-16,-1 0 15,0-1-15,18 1 0,18 17 16,0-17 0,-1-18-16,54 0 0,-36 0 15,1 0-15,-1-35 16,-18 17-16,1 18 16,-18-35-16,0 17 15,0 0-15,-35 1 16,0-1-16,17 18 0,-17 0 15,17 18 1,0-18-16,1 35 16,17-17-16,17-18 15,1 17-15,0 1 0,-1-18 16,19 0-16,16 0 16,-34 0-16,0 0 15,-18-18 1,-18 18-1,0 0 1,1 0-16,-1 0 16,36 0-16,-1 0 15,19 0 1</inkml:trace>
-  <inkml:trace contextRef="#ctx0" brushRef="#br0" timeOffset="264492.0687">10107 5750 0,'0'-17'31,"0"-1"-15,0-17-1,0 17-15,18-35 16,-18 18-16,35-53 16,-17 35-16,17-53 15,-17 53-15,17-53 16,-18 71-16,1-36 15,-18 36 1,35 0-16,-17 17 16,-18 1-1,18 17-15,35 0 16,-36 0-16,19 0 16,16-18-16,37 18 15,-19 18-15,1-18 16,-1 0-16,1 0 0,17 0 15,71-18-15,-71 0 16,35 1-16,-87-1 16,-1 18-16,-17-18 15</inkml:trace>
+  <inkml:trace contextRef="#ctx0" brushRef="#br0" timeOffset="264492.0686">10107 5750 0,'0'-17'31,"0"-1"-15,0-17-1,0 17-15,18-35 16,-18 18-16,35-53 16,-17 35-16,17-53 15,-17 53-15,17-53 16,-18 71-16,1-36 15,-18 36 1,35 0-16,-17 17 16,-18 1-1,18 17-15,35 0 16,-36 0-16,19 0 16,16-18-16,37 18 15,-19 18-15,1-18 16,-1 0-16,1 0 0,17 0 15,71-18-15,-71 0 16,35 1-16,-87-1 16,-1 18-16,-17-18 15</inkml:trace>
   <inkml:trace contextRef="#ctx0" brushRef="#br0" timeOffset="264993.379">9843 5398 0,'0'17'0,"0"18"16,17-17-16,-17 53 16,18-18-1,-18-18-15,35 71 16,-17-71-16,-1 0 0,36 18 15,-17-35-15,-1-1 16,18-17-16,0 0 0,0 0 16,70-17-1,-70-1-15,18 18 16,-36 0-16</inkml:trace>
   <inkml:trace contextRef="#ctx0" brushRef="#br0" timeOffset="266354.7593">12700 8026 0,'18'0'47,"17"0"-31,0 17-16,18-17 15,53 0 1,-53-17-16,0 17 0,17 0 16,-34 0-16,-1 17 0,-17-17 15</inkml:trace>
   <inkml:trace contextRef="#ctx0" brushRef="#br0" timeOffset="269619.482">11994 8908 0,'-17'17'15,"17"1"-15,0 17 0,0 0 16,0 36 0,17-18-16,19 18 15,-19-54-15,36 1 16,-17-18-16,16-18 16,-34 1-16,17-54 15,-17 18-15,-18-18 16,0 36-16,0 0 15,18 17-15,-18 36 16,17 0-16,19 87 16,-19-34-16,1 0 15,35 87-15,-36-87 16,1-1-16,0 1 0,-18 35 16,0-53-16,0 17 15,-18-52 1,-17-18-16,-18 18 0,18-36 15,-1 18-15,-34-53 16,34 18-16,19-1 16,-1-17-16,18-35 15,0 53-15,18 0 16,-1-1-16</inkml:trace>
@@ -296,13 +299,13 @@
   <inkml:trace contextRef="#ctx0" brushRef="#br0" timeOffset="270830.2002">13529 9013 0,'-35'53'15,"-1"0"-15,36 0 16,18-35-16,88 52 15,-18-70 1,-53 0 0,54-17-16,-54-1 0,0-17 15,-17 17-15,-18-17 16,0-18-16,-18 18 16,-17-1-16,-36 1 15,36 35-15,0-17 0,-36 34 16,54-17-1,-1 18-15,0 17 16,36-17-16,-18-1 0</inkml:trace>
   <inkml:trace contextRef="#ctx0" brushRef="#br0" timeOffset="271025.4396">14111 9225 0,'-18'53'16,"-34"18"-1,34-36 1,18-17 0</inkml:trace>
   <inkml:trace contextRef="#ctx0" brushRef="#br0" timeOffset="271259.1393">14376 8996 0,'0'0'0,"0"17"0,17 36 16,-17-17-16,18 17 16,0-18-16,17 0 15,-17-17 1,17-1-16,-18-17 16</inkml:trace>
-  <inkml:trace contextRef="#ctx0" brushRef="#br0" timeOffset="271709.3277">14658 8872 0,'35'-35'16,"18"0"0,-18 35-1,-35 35 1,0-17-16,0 35 15,-17-36-15,17 19 16,0-19-16,0 18 16,17-17-16,1 0 0,0 35 15,-1-53-15,19 35 16,-19-35 0,1 18-16,0-18 0,-1 17 15,1 1-15,-18 0 16,0-1-1,0 1 1,0-1-16,17 19 16,1-19-16,17 19 15,-17-19-15,0 19 32,-18-19-32,-36-17 15,19 18-15,-54-1 16,36-17-16,-36 0 15,36 18-15,-36-18 16,36 18-16</inkml:trace>
+  <inkml:trace contextRef="#ctx0" brushRef="#br0" timeOffset="271709.3276">14658 8872 0,'35'-35'16,"18"0"0,-18 35-1,-35 35 1,0-17-16,0 35 15,-17-36-15,17 19 16,0-19-16,0 18 16,17-17-16,1 0 0,0 35 15,-1-53-15,19 35 16,-19-35 0,1 18-16,0-18 0,-1 17 15,1 1-15,-18 0 16,0-1-1,0 1 1,0-1-16,17 19 16,1-19-16,17 19 15,-17-19-15,0 19 32,-18-19-32,-36-17 15,19 18-15,-54-1 16,36-17-16,-36 0 15,36 18-15,-36-18 16,36 18-16</inkml:trace>
   <inkml:trace contextRef="#ctx0" brushRef="#br0" timeOffset="272631.338">12030 10742 0,'0'0'0,"-18"18"0,18 17 16,0 0-16,0 36 15,0-54-15,18 36 16,-1-35-16,36-18 15,-35 0-15,35-35 16,-18-1 0,0-16-16,-17 16 15,0 1-15,-18 17 16,17 18-16,1 36 16,0 34-1,-18-17-15,17 53 16,-17-53-16,0 35 15,-17-35-15,-19 18 16,19-54-16,-36 18 16,35-35-16,0 0 15,-17-17-15,18-18 16,17-1-16,-18 1 0,18-18 16</inkml:trace>
   <inkml:trace contextRef="#ctx0" brushRef="#br0" timeOffset="272921.3358">11942 10407 0,'0'-18'31,"17"1"-31,1-1 15,17-35-15,0 18 16,-35 17-16,18 1 0,0-1 16,-1 36 15,-17 34-31,18 1 16,0-17-16,-18-19 15,17 19-15,1-19 16,-1 1-16</inkml:trace>
-  <inkml:trace contextRef="#ctx0" brushRef="#br0" timeOffset="276425.3007">11501 10513 0,'0'-18'16,"-18"18"15,0 0-15,-35 35-16,36-35 15,-1 18-15,-17 0 0,0 17 16,17-35-16,0 35 15,18-17 1,0 0-16,0-1 16,53 36-16,0-35 15,-18-1-15,1-17 16,-19 18-16,36 0 16,-35-1-16,-1-17 15,-17 18-15,0 0 16,-17-1-16</inkml:trace>
-  <inkml:trace contextRef="#ctx0" brushRef="#br0" timeOffset="276581.8479">11324 11024 0,'18'0'0,"-1"18"15,1-18-15,17 18 16,-17-18-16,0 17 16</inkml:trace>
+  <inkml:trace contextRef="#ctx0" brushRef="#br0" timeOffset="276425.3006">11501 10513 0,'0'-18'16,"-18"18"15,0 0-15,-35 35-16,36-35 15,-1 18-15,-17 0 0,0 17 16,17-35-16,0 35 15,18-17 1,0 0-16,0-1 16,53 36-16,0-35 15,-18-1-15,1-17 16,-19 18-16,36 0 16,-35-1-16,-1-17 15,-17 18-15,0 0 16,-17-1-16</inkml:trace>
+  <inkml:trace contextRef="#ctx0" brushRef="#br0" timeOffset="276581.8478">11324 11024 0,'18'0'0,"-1"18"15,1-18-15,17 18 16,-17-18-16,0 17 16</inkml:trace>
   <inkml:trace contextRef="#ctx0" brushRef="#br0" timeOffset="277188.8754">13018 10460 0,'-53'18'0,"35"-1"0,-17 1 16,-54 17-1,54-17-15,18-1 0,-1 1 16,0-18-16,18 18 16,0-1-16,18 1 15,35 0 1,-36-1-16,19-17 0,-1 18 0,0-18 16,-17 17-16,17-17 15,-17 18-15,0-18 0,-1 18 16,-17-1-16,-17 1 15</inkml:trace>
-  <inkml:trace contextRef="#ctx0" brushRef="#br0" timeOffset="277565.6412">12771 10866 0,'17'0'16,"18"17"0,18 18-1,-17-35-15,-1 18 16,-17-18-16,35 18 15,-36-1-15</inkml:trace>
+  <inkml:trace contextRef="#ctx0" brushRef="#br0" timeOffset="277565.6411">12771 10866 0,'17'0'16,"18"17"0,18 18-1,-17-35-15,-1 18 16,-17-18-16,35 18 15,-36-1-15</inkml:trace>
   <inkml:trace contextRef="#ctx0" brushRef="#br0" timeOffset="278210.6104">13511 10495 0,'0'-17'15,"18"34"1,-18 1-16,0 17 16,18 36-16,-18-18 15,17-1-15,1 72 16,0-36-16,-1-70 15,1 17-15,17 0 16,-17-17-16</inkml:trace>
   <inkml:trace contextRef="#ctx0" brushRef="#br0" timeOffset="279006.7697">10601 10566 0,'-18'0'0,"1"0"15,-19 0-15,1 17 16,18 19-16,-1-19 16,0 19-16,18 16 0,0-16 0,36 70 15,-19-54 1,54 19-16,-36-53 16,18-1-16,53-17 15,0-35-15,-71 0 16,18-1-16,-18-52 15,-35 35-15,-18 18 16,1-18-16,-19 18 0,-16 0 16,-19 17-16,18 0 0,-17 1 15,-36 34-15,53 19 16,18-19-16</inkml:trace>
   <inkml:trace contextRef="#ctx0" brushRef="#br0" timeOffset="280901.7835">10372 12100 0,'-18'0'15,"36"0"1,35-17 0,-36 17-16,19 0 15,-1 0-15,-18 0 16,19 0-16,17 17 0,-36-17 16,1 0-16,0-17 15</inkml:trace>
@@ -316,13 +319,13 @@
   <inkml:trace contextRef="#ctx0" brushRef="#br0" timeOffset="292768.3917">12700 4798 0,'-18'0'16,"-17"35"-1,0-17-15,17-1 0,1 19 16,-1-1 0,18-17-16,18-1 0,-1-17 15,36 18 1,-35-18-16,17 0 0,0-35 15,-17 35-15,0-18 16,-18 36 15,0 34-31,0-16 16,0-1-16,17 18 0,1 17 16,-1-34-16,-17-1 15,18-17-15,-18 17 16,0 0-16,0-17 15,-18 0-15,1-18 16,-54-18 0,36 0-16,-36 1 15,36-1-15,-18-17 16,36-1-16,17 1 16,0 17-16</inkml:trace>
   <inkml:trace contextRef="#ctx0" brushRef="#br0" timeOffset="293257.7686">12982 4833 0,'18'35'16,"-18"1"-16,0-1 15,0-17-15,18-1 16,-18-34 15,0-19-15,0 19-16,0-36 16,0 35-16,0 0 15,17 18-15,-17 18 16,18 0-16,-1 17 15,1-17-15,-18-1 16,18 1-16,-1-18 16,-17-18-1,0 1 1,0-1-16,18 0 16,-18 1-16,0-1 15,18 0-15,-1 18 16,1 0-16,0 18 0,-1 0 15,1-1 1,-1 1-16,1 17 16,0-17-16,17 0 15,-17-1-15,17-17 16,-17-17 0</inkml:trace>
   <inkml:trace contextRef="#ctx0" brushRef="#br0" timeOffset="293493.1155">13423 4851 0,'-35'17'0,"35"1"16,-18 0-16,36 17 15,0-17 1,17-1-16,0-17 0,-17 0 16,35 0-1,-18-17-15,-17-1 0,-18 0 16,0 1-1,0-1-15,-36-17 0,1 17 16,0 18 0,17 0-16,-17 0 15</inkml:trace>
-  <inkml:trace contextRef="#ctx0" brushRef="#br0" timeOffset="293637.6228">13723 4886 0,'18'35'16,"-18"1"-1,17-19-15,-17 1 0,18-1 16</inkml:trace>
-  <inkml:trace contextRef="#ctx0" brushRef="#br0" timeOffset="293753.8467">13705 4745 0,'18'0'31,"17"18"-31</inkml:trace>
-  <inkml:trace contextRef="#ctx0" brushRef="#br0" timeOffset="294115.3179">13899 4921 0,'0'53'16,"18"-35"0,17-18-1,-17 0-15,35-35 16,0-36-1,-53 18-15,17 18 0,1-18 16,-18 18-16,0-18 0,0-53 16,-18 53-16,1 0 15,-18-53-15,17 71 16,0 17-16,-17 18 16,17 0-16,1 36 15,17 16-15,-18 1 0,18 71 16,18-71-16,35 70 15,-18-70-15,0-18 16,0 18-16,18-17 0,18 17 16,-36-36-16,1 18 15</inkml:trace>
+  <inkml:trace contextRef="#ctx0" brushRef="#br0" timeOffset="293637.6227">13723 4886 0,'18'35'16,"-18"1"-1,17-19-15,-17 1 0,18-1 16</inkml:trace>
+  <inkml:trace contextRef="#ctx0" brushRef="#br0" timeOffset="293753.8466">13705 4745 0,'18'0'31,"17"18"-31</inkml:trace>
+  <inkml:trace contextRef="#ctx0" brushRef="#br0" timeOffset="294115.3178">13899 4921 0,'0'53'16,"18"-35"0,17-18-1,-17 0-15,35-35 16,0-36-1,-53 18-15,17 18 0,1-18 16,-18 18-16,0-18 0,0-53 16,-18 53-16,1 0 15,-18-53-15,17 71 16,0 17-16,-17 18 16,17 0-16,1 36 15,17 16-15,-18 1 0,18 71 16,18-71-16,35 70 15,-18-70-15,0-18 16,0 18-16,18-17 0,18 17 16,-36-36-16,1 18 15</inkml:trace>
   <inkml:trace contextRef="#ctx0" brushRef="#br0" timeOffset="295177.8893">12100 5856 0,'0'-18'16,"18"1"-1,-18-18-15,0 17 16,-35 18 0,17 0-16,0 0 15,-17 53-15,0-36 16,17 19-16,1 17 15,17-36-15,0 1 16,35 0-16,-18-18 16,1 17-16,0-17 15,-1-17-15,1-1 0,0 0 0,-1 1 16,1-1-16,-18 0 16,0 1-1,0 34 1,18 54-16,17 35 15,-18-71-15,19 18 16,-19-18-16,1 18 16,-18-18-16,-18-17 0,1 0 15,-36-1 1,18-17-16,-1-17 0,-17 17 16,-17-53-16,35 35 15,-1-17-15,19 17 16</inkml:trace>
-  <inkml:trace contextRef="#ctx0" brushRef="#br0" timeOffset="296146.2467">12947 5574 0,'-18'0'15,"1"18"1,17 52-1,0-17-15,0-18 16,0 71 0,0-71-16,17 18 0,1-17 15,17-1-15,-17 0 0,35 0 16,-18-35 0,0 18-16,18-36 0</inkml:trace>
+  <inkml:trace contextRef="#ctx0" brushRef="#br0" timeOffset="296146.2466">12947 5574 0,'-18'0'15,"1"18"1,17 52-1,0-17-15,0-18 16,0 71 0,0-71-16,17 18 0,1-17 15,17-1-15,-17 0 0,35 0 16,-18-35 0,0 18-16,18-36 0</inkml:trace>
   <inkml:trace contextRef="#ctx0" brushRef="#br0" timeOffset="296445.3959">13300 5680 0,'35'0'16,"18"0"-1,-18 0-15,18 0 16,-18 35-16,-35-17 16,0-1-16,0 19 0,0 34 15,-17-52-15,17 17 16,-18 36-16,18-36 16,18 0-1,-1-17-15,36-1 16,-35 1-16,17-18 15,-17-18-15,0 1 16</inkml:trace>
-  <inkml:trace contextRef="#ctx0" brushRef="#br0" timeOffset="296578.8408">13370 5944 0,'18'0'0,"35"0"16,-18 0-16,53-17 15,-35-1-15,18 0 16</inkml:trace>
+  <inkml:trace contextRef="#ctx0" brushRef="#br0" timeOffset="296578.8407">13370 5944 0,'18'0'0,"35"0"16,-18 0-16,53-17 15,-35-1-15,18 0 16</inkml:trace>
   <inkml:trace contextRef="#ctx0" brushRef="#br0" timeOffset="297006.8246">13635 5433 0,'18'0'31,"34"0"-15,-16-18-16,17 18 15,-18 0-15,-17 0 16,-1-17-16</inkml:trace>
   <inkml:trace contextRef="#ctx0" brushRef="#br0" timeOffset="297240.869">13705 5433 0,'-17'53'15,"-1"0"-15,18 0 16,0-18-16,35 0 15,-17-17-15,0-1 16,-1 1-16,19 0 16,-19-18-16,1-18 0,17 18 15,-17-35 1</inkml:trace>
   <inkml:trace contextRef="#ctx0" brushRef="#br0" timeOffset="297525.3541">13882 5486 0,'35'0'16,"-17"0"-16,17 17 16,-17-17-1,17 18-15,-17-18 16,-18 18-16,0-1 15,-18 19 1,0-19-16,18 1 0,-17-18 16,17 35-1,17-35-15,1 18 16,0-18-16,-1 0 0,18 0 16,-17 0-16,0-18 15</inkml:trace>
@@ -332,14 +335,14 @@
   <inkml:trace contextRef="#ctx0" brushRef="#br0" timeOffset="298959.4388">15028 5838 0,'53'18'16,"0"-18"-1,0 0 1,-35 0-16,-1 0 0,1 18 16</inkml:trace>
   <inkml:trace contextRef="#ctx0" brushRef="#br0" timeOffset="299720.4816">16122 5592 0,'0'-18'15,"-35"18"-15,-1 0 16,-34 35-16,17-17 15,18 17-15,-54 53 16,54-52-16,18-1 0,-1 18 16,36-18-1,-18 0-15,52 1 16,-16-19-16,17 1 16,-18-18-16,18 0 15,-36-18-15,-17 1 16,0-1-16,-35-17 15,0 17-15,17 0 0,-17 18 16,17-17 0</inkml:trace>
   <inkml:trace contextRef="#ctx0" brushRef="#br0" timeOffset="299988.3052">16387 5256 0,'-18'0'0,"0"36"15,1-1-15,17 0 0,-18 18 16,18 18-16,0-18 0,0 17 15,18-17-15,17 71 16,-17-72-16,17-16 16,-18 17-16,54-18 15,-36-17-15,-17-18 16</inkml:trace>
-  <inkml:trace contextRef="#ctx0" brushRef="#br0" timeOffset="300310.6084">16722 5539 0,'53'17'0,"-18"1"15,-17-18-15,34 18 16,-16-1-16,-36 1 15,0 17-15,0 18 16,-18-18-16,-17 53 16,17-52-16,18-1 15,0-17-15,35 17 16,-17-35 0,17 0-1,-17 0-15,0-18 0,-18 1 16,-18-1-1</inkml:trace>
+  <inkml:trace contextRef="#ctx0" brushRef="#br0" timeOffset="300310.6083">16722 5539 0,'53'17'0,"-18"1"15,-17-18-15,34 18 16,-16-1-16,-36 1 15,0 17-15,0 18 16,-18-18-16,-17 53 16,17-52-16,18-1 15,0-17-15,35 17 16,-17-35 0,17 0-1,-17 0-15,0-18 0,-18 1 16,-18-1-1</inkml:trace>
   <inkml:trace contextRef="#ctx0" brushRef="#br0" timeOffset="300433.0599">16775 5803 0,'17'0'16,"1"0"-16,35-17 15,-18 17-15,18-18 16,-18 0-16,-17 1 0,0 17 15</inkml:trace>
   <inkml:trace contextRef="#ctx0" brushRef="#br0" timeOffset="300649.7215">17057 5203 0,'35'0'15,"0"-17"-15,-17 17 0,17-18 16,1 18 0,-19 0-16,-17-17 15</inkml:trace>
-  <inkml:trace contextRef="#ctx0" brushRef="#br0" timeOffset="300828.3479">17110 5203 0,'17'36'16,"-17"-19"-16,0 36 16,18-35-16,-18 17 0,0-17 15,18 17-15,-18-17 16,17-1-16,1 1 15,0-18-15,-1-18 16</inkml:trace>
+  <inkml:trace contextRef="#ctx0" brushRef="#br0" timeOffset="300828.3478">17110 5203 0,'17'36'16,"-17"-19"-16,0 36 16,18-35-16,-18 17 0,0-17 15,18 17-15,-18-17 16,17-1-16,1 1 15,0-18-15,-1-18 16</inkml:trace>
   <inkml:trace contextRef="#ctx0" brushRef="#br0" timeOffset="301069.0327">17321 5292 0,'18'0'16,"-18"17"-16,18-17 0,-18 18 16,17 0-16,-17-1 15,0 1-15,0 17 16,0-17 0,18-1-1,0-17 1,-1 0-16,1 0 15,0-17-15</inkml:trace>
   <inkml:trace contextRef="#ctx0" brushRef="#br0" timeOffset="301395.3859">17480 5256 0,'18'0'0,"-1"0"16,19-17 0,-19 17-16,-17 17 15,18 1 1,-18 0 0,0-1-16,0 36 15,0-35-15,0 0 0,0 17 16,0 0-1,0-17-15,0-1 0,0 1 16,0-36 15,-18 1-15</inkml:trace>
-  <inkml:trace contextRef="#ctx0" brushRef="#br0" timeOffset="301762.6468">17674 4992 0,'18'0'16,"-1"35"-1,1-17-15,-18 17 16,53 36-16,-35-36 16,-1 0-16,36 53 15,-35-52-15,-18 17 0,17 70 16,-17-70-1,0 70-15,0-70 16,0 0-16,0-18 0,-17 36 16,17-36-16,-18 18 15,1-17 1,-19-1-16,19-18 0,-19-17 16</inkml:trace>
-  <inkml:trace contextRef="#ctx0" brushRef="#br0" timeOffset="306595.6083">5927 4921 0,'-18'0'16,"18"-17"-1,-18 17-15,18-18 16,18 18 15,35-18-15,-35 1-16,35-1 15,-36 0-15,18 18 0,-17-17 16,0-1 0</inkml:trace>
+  <inkml:trace contextRef="#ctx0" brushRef="#br0" timeOffset="301762.6467">17674 4992 0,'18'0'16,"-1"35"-1,1-17-15,-18 17 16,53 36-16,-35-36 16,-1 0-16,36 53 15,-35-52-15,-18 17 0,17 70 16,-17-70-1,0 70-15,0-70 16,0 0-16,0-18 0,-17 36 16,17-36-16,-18 18 15,1-17 1,-19-1-16,19-18 0,-19-17 16</inkml:trace>
+  <inkml:trace contextRef="#ctx0" brushRef="#br0" timeOffset="306595.6082">5927 4921 0,'-18'0'16,"18"-17"-1,-18 17-15,18-18 16,18 18 15,35-18-15,-35 1-16,35-1 15,-36 0-15,18 18 0,-17-17 16,0-1 0</inkml:trace>
   <inkml:trace contextRef="#ctx0" brushRef="#br0" timeOffset="306778.5891">5927 4621 0,'17'53'16,"1"0"0,17 18-16,-17-18 15,0 17-15,-1-17 16,18 0 0,-17-18-16,17 1 15,-17-36-15</inkml:trace>
   <inkml:trace contextRef="#ctx0" brushRef="#br0" timeOffset="307223.4127">6174 4886 0,'-18'18'16,"0"35"-1,18-18 1,0-18-16,36 1 15,17-18-15,-36 0 16,18 0-16,-17 0 16,0-18-16,-18 1 15,-18-1-15,0 1 16,1 17 0,34 17 15,1-17-16,0 0-15,-1 0 16,19-35 0,-36 17-1,0 1-15,17-1 16,-17 0-16,0 1 0,18 17 16,-18-18-16,18 18 15,-1 0-15,1 18 16,-1-1-1,1 19-15,0-19 16,-1 1-16,1 0 0,0-18 16</inkml:trace>
   <inkml:trace contextRef="#ctx0" brushRef="#br0" timeOffset="307596.6055">6385 4463 0,'36'70'16,"-19"-52"-16,1 17 15,35 53 1,-36-52-16,1-1 0,0 0 15,-1-17-15,1 17 0,0-17 16,-1-18 0,-17-18-1,0 0 1,0 1 0,18 17-16,17-18 15,-17 18-15,17 18 16,-17-1-16,17 19 15,-17-19-15,-1 1 0,1 0 16,-18-1 0,18-17-16</inkml:trace>
@@ -349,42 +352,42 @@
   <inkml:trace contextRef="#ctx0" brushRef="#br0" timeOffset="309414.7395">6456 6456 0,'17'35'0,"36"89"15,-17-71 1,17 35-16,-18-53 16,-17 0-16,34 1 15,-52-19-15,18-17 0,0 18 16,-18-36-1,17-17 1,-17 17-16,18 1 16,0 34-1,-1 19 1,-17-19-16,36 1 16,-19-18-16,1 17 15,-1-34 1</inkml:trace>
   <inkml:trace contextRef="#ctx0" brushRef="#br0" timeOffset="309899.0684">5891 8908 0,'18'0'16,"0"0"0,-1-18-16,36-17 15,-35 17-15,17 0 16,-17 1-16,-1 17 0,1-18 0,0-17 16</inkml:trace>
   <inkml:trace contextRef="#ctx0" brushRef="#br0" timeOffset="310053.7828">5980 8661 0,'17'70'0,"-17"-34"16,18 16-16,17 37 16,0-36-1,1-18-15,-1-18 0,18 1 16,-35-18-16,-1 0 15</inkml:trace>
-  <inkml:trace contextRef="#ctx0" brushRef="#br0" timeOffset="310356.0227">6244 8890 0,'0'18'0,"0"-1"15,-17 1-15,17 0 16,0-1-16,17 1 15,1-1-15,-1-17 0,1 0 16,0-17-16,-1 17 16,-17-18-1,0 1-15,0-1 16,0 0-16,0 1 16,18 34 15,-18 1-16,0 0-15,18-1 16,-1-17-16,1 0 16,0 0-1</inkml:trace>
+  <inkml:trace contextRef="#ctx0" brushRef="#br0" timeOffset="310356.0226">6244 8890 0,'0'18'0,"0"-1"15,-17 1-15,17 0 16,0-1-16,17 1 15,1-1-15,-1-17 0,1 0 16,0-17-16,-1 17 16,-17-18-1,0 1-15,0-1 16,0 0-16,0 1 16,18 34 15,-18 1-16,0 0-15,18-1 16,-1-17-16,1 0 16,0 0-1</inkml:trace>
   <inkml:trace contextRef="#ctx0" brushRef="#br0" timeOffset="310656.8821">6385 8537 0,'36'71'15,"-1"-18"1,-18 0-16,72 70 16,-54-70-1,-17-18-15,-18-17 0,17 0 16,-17-36 15,0 0-31,0-17 16,0 17-16,0 36 31,18 0-15,0-18-16,-1 17 15</inkml:trace>
   <inkml:trace contextRef="#ctx0" brushRef="#br0" timeOffset="311222.3085">6438 8943 0,'0'0'0,"0"18"31,0-36 0,0 0-15,0 1-16,18-1 16,-18 0-16,17 18 15,1-17-15,0 17 16,-1 0-16,1 0 0,17 35 15,-17-17 1,0-1-16,-1 1 16,1-18-16,0 0 0</inkml:trace>
   <inkml:trace contextRef="#ctx0" brushRef="#br0" timeOffset="311955.9314">8925 6720 0,'-35'-17'16,"17"17"-16,1 17 0,-1 1 15,0 0-15,18 17 16,0-17-16,18-1 16,35 1-1,0 0-15,-35-18 16,17 0-16,-18 0 0,1 17 16,0-17-1,-36 18 1,0-18-1,1 0-15,-1 0 0,1 0 16,-1-18-16</inkml:trace>
   <inkml:trace contextRef="#ctx0" brushRef="#br0" timeOffset="312151.0622">9190 6844 0,'18'0'16,"-18"-18"-1,0-17-15,-18 17 16,0-17-16,18 17 16,-17-34-1,17 34-15</inkml:trace>
   <inkml:trace contextRef="#ctx0" brushRef="#br0" timeOffset="313502.4485">9437 6597 0,'17'-18'15,"-34"18"95,-1 0-110,1-17 15,-1 17-15,-17 0 0,17 0 16,-53 0-16,19 0 16,16 0-16,-17 0 0,18 0 15,0 17-15,-18 1 16,18-18-16,-36 53 16,53-35-16,1-1 0,-19 18 15,36-17-15,0 0 16,0-1-16,18 1 0,0 17 15,-1-17-15,19 17 16,-1-17 0,-17-18-16,17 17 0,18 1 15,-18-18 1,-17 0-16,35 0 0,-18 0 16,0-35-1,-17 35-15,17-35 16,-35-1-16,0 1 15,0 0-15,-18-18 16,1 35-16,-1-17 16,1 17-16,-19 1 15,19 34 1</inkml:trace>
-  <inkml:trace contextRef="#ctx0" brushRef="#br0" timeOffset="314964.2678">9366 6562 0,'0'-18'15,"18"18"1,0 0 0,17 0-1,-18 0-15,19 18 16,-1-18-16,0 0 15,-17 17-15,0 1 16,-1 0-16,-34-1 16</inkml:trace>
+  <inkml:trace contextRef="#ctx0" brushRef="#br0" timeOffset="314964.2677">9366 6562 0,'0'-18'15,"18"18"1,0 0 0,17 0-1,-18 0-15,19 18 16,-1-18-16,0 0 15,-17 17-15,0 1 16,-1 0-16,-34-1 16</inkml:trace>
   <inkml:trace contextRef="#ctx0" brushRef="#br0" timeOffset="321310.9451">12524 14270 0,'17'0'62,"19"0"-46,-19 0-16,1 0 0,17-18 16,0 18-16,-17 0 15,-18-17-15,18 17 16,-36 0-1,0 0-15</inkml:trace>
   <inkml:trace contextRef="#ctx0" brushRef="#br0" timeOffset="321560.2634">12506 14288 0,'0'17'16,"0"1"-1,-18 17-15,18 36 16,-17-36-16,17 0 16,0 18-16,0-18 15,17-17-15,-17 0 0,18 17 16,0-17-16,17-1 16,-17-17-16,17 18 15,-18-18 1,1 0-16,0 0 15,-1-18-15</inkml:trace>
   <inkml:trace contextRef="#ctx0" brushRef="#br0" timeOffset="321848.9951">12735 14429 0,'0'17'16,"0"19"-1,0-19 1,0 1-16,0 35 15,0-36-15,0 1 0,0 0 16,0-1 0</inkml:trace>
   <inkml:trace contextRef="#ctx0" brushRef="#br0" timeOffset="322262.0281">12894 14252 0,'18'-17'16,"-1"17"-1,1 17 1,0-17-16,-18 18 15,0 0 1,0-1-16,0 18 16,0-17-1,0 0-15,17 35 16,-17-18-16,0 0 0,18-17 16,-18 17-16,18-17 15,-18 17-15,0-17 0,0-1 0,0 1 16,0 0-16,0 17 15,-18-35-15,18 17 16,-18-17-16,1 0 16,-1 0-16,0 0 15,1-17 1,-1 17-16</inkml:trace>
-  <inkml:trace contextRef="#ctx0" brushRef="#br0" timeOffset="323000.2787">12453 17286 0,'18'0'31,"-1"0"-15,1 0-16,0 0 0,17-18 16,-17 18-1,-1 0-15,1 0 16</inkml:trace>
+  <inkml:trace contextRef="#ctx0" brushRef="#br0" timeOffset="323000.2786">12453 17286 0,'18'0'31,"-1"0"-15,1 0-16,0 0 0,17-18 16,-17 18-1,-1 0-15,1 0 16</inkml:trace>
   <inkml:trace contextRef="#ctx0" brushRef="#br0" timeOffset="323272.5336">12506 17304 0,'0'35'16,"-18"18"-1,18-18-15,0 18 16,0-35-16,18 35 15,-18-36-15,18 1 16,-1-18-16,-17 18 0,18-18 16,0 0-16,-1 0 15,1 17 1,-1-17 0</inkml:trace>
   <inkml:trace contextRef="#ctx0" brushRef="#br0" timeOffset="323790.7412">12682 17339 0,'18'0'31,"0"0"-15,-1 18-16,1-1 15,0 1 1,-36 0-1,18 17-15,-18-35 16,1 18-16,17-1 16,0 1-1,17-18 1,1 0 0,0 17-16,-1-17 15</inkml:trace>
-  <inkml:trace contextRef="#ctx0" brushRef="#br0" timeOffset="324247.2427">12823 17198 0,'18'0'31,"0"-18"-31,17 18 0,-17 0 16,-1-17 0,1 17-16,0 0 15,-18 17-15,17 1 16,-17 0-1,-17 17 1,17 0-16,0 0 16,0 1-16,17-19 0,-17 19 15,0-1-15,18 18 16,-18-36-16,18 1 0,-18 0 16,0 17-16,0-17 15,0-1-15,-18 1 16,0-18-1,1-18 1,-1 18-16,18-17 16,-18 17-1,1 0-15,-1 17 0,0 1 16</inkml:trace>
+  <inkml:trace contextRef="#ctx0" brushRef="#br0" timeOffset="324247.2426">12823 17198 0,'18'0'31,"0"-18"-31,17 18 0,-17 0 16,-1-17 0,1 17-16,0 0 15,-18 17-15,17 1 16,-17 0-1,-17 17 1,17 0-16,0 0 16,0 1-16,17-19 0,-17 19 15,0-1-15,18 18 16,-18-36-16,18 1 0,-18 0 16,0 17-16,0-17 15,0-1-15,-18 1 16,0-18-1,1-18 1,-1 18-16,18-17 16,-18 17-1,1 0-15,-1 17 0,0 1 16</inkml:trace>
   <inkml:trace contextRef="#ctx0" brushRef="#br0" timeOffset="325441.9208">8326 2311 0,'-18'-18'15,"36"0"1,-1 1 0,1 17-1,17-18-15,-17 18 16,-1-17-16,1 17 15</inkml:trace>
   <inkml:trace contextRef="#ctx0" brushRef="#br0" timeOffset="325647.0241">8290 2311 0,'0'35'15,"-17"-17"-15,17-1 0,0 36 16,0-35-16,0 35 16,0-36-16,17 1 15,1 0 1,0-1-16,-1-17 0,1 18 16,-1-18-16,1 0 0,0 0 15</inkml:trace>
   <inkml:trace contextRef="#ctx0" brushRef="#br0" timeOffset="325847.2271">8467 2364 0,'0'17'16,"0"1"-16,0 35 15,17-36-15,-17 1 0,18 0 16,-18-1-16,18 1 16</inkml:trace>
-  <inkml:trace contextRef="#ctx0" brushRef="#br0" timeOffset="326181.678">8590 2275 0,'18'0'0,"-1"-17"16,1 17 0,0 0-16,-1 0 15,1 17-15,-18 1 0,0 17 16,18 18-1,-18-35-15,0 0 16,0 17-16,0 0 16,0-17-16,0-1 15,0 1 1,-18-18-16,0 0 31,1 0-31,-1 18 16,0-18-1</inkml:trace>
+  <inkml:trace contextRef="#ctx0" brushRef="#br0" timeOffset="326181.6779">8590 2275 0,'18'0'0,"-1"-17"16,1 17 0,0 0-16,-1 0 15,1 17-15,-18 1 0,0 17 16,18 18-1,-18-35-15,0 0 16,0 17-16,0 0 16,0-17-16,0-1 15,0 1 1,-18-18-16,0 0 31,1 0-31,-1 18 16,0-18-1</inkml:trace>
   <inkml:trace contextRef="#ctx0" brushRef="#br0" timeOffset="327338.7153">12294 5415 0,'-17'18'15,"34"-18"17,1 0-17,0 0-15,35 0 16,-36 0-1,18 0-15,-35 17 16</inkml:trace>
   <inkml:trace contextRef="#ctx0" brushRef="#br0" timeOffset="327566.8816">12312 5486 0,'0'17'31,"0"1"-15,-18 0-16,18 35 16,0-18-16,-17 18 15,17-18-15,0-17 16,0-1-16,17 1 0,1 17 16,0-17-16,17-18 15,0 0-15,0 0 16,-17 0-16,0 0 15,-18-18 1</inkml:trace>
-  <inkml:trace contextRef="#ctx0" brushRef="#br0" timeOffset="328767.3008">12488 5556 0,'18'0'47,"0"0"-47,-1 0 0,19 0 15,-19 0 1,1 0-16,-18 18 16,-18 17-16,1 0 15,-1-17-15,-17 17 16,35-17-1,-18 0-15,36-18 16,-1 0 0,19 0-16,-19 0 15,18 0 1,-17 17-16,0-17 16,-1 0-16</inkml:trace>
-  <inkml:trace contextRef="#ctx0" brushRef="#br0" timeOffset="329245.3781">12700 5468 0,'18'0'32,"-1"0"-17,1 0-15,-18 18 16,0-1 15,0 1-31,0 0 16,0-1-16,0 1 15,0 0-15,0-1 0,0 18 16,18 1 0,-18-19-16,0 1 15,0 0-15,17 35 16,-17-18-16,0-18 16,-17-17 30,-1 0-30,0 18 0,1-18-1,17 18 1,-18-18-16</inkml:trace>
+  <inkml:trace contextRef="#ctx0" brushRef="#br0" timeOffset="328767.3007">12488 5556 0,'18'0'47,"0"0"-47,-1 0 0,19 0 15,-19 0 1,1 0-16,-18 18 16,-18 17-16,1 0 15,-1-17-15,-17 17 16,35-17-1,-18 0-15,36-18 16,-1 0 0,19 0-16,-19 0 15,18 0 1,-17 17-16,0-17 16,-1 0-16</inkml:trace>
+  <inkml:trace contextRef="#ctx0" brushRef="#br0" timeOffset="329245.378">12700 5468 0,'18'0'32,"-1"0"-17,1 0-15,-18 18 16,0-1 15,0 1-31,0 0 16,0-1-16,0 1 15,0 0-15,0-1 0,0 18 16,18 1 0,-18-19-16,0 1 15,0 0-15,17 35 16,-17-18-16,0-18 16,-17-17 30,-1 0-30,0 18 0,1-18-1,17 18 1,-18-18-16</inkml:trace>
   <inkml:trace contextRef="#ctx0" brushRef="#br0" timeOffset="333684.0996">5980 10954 0,'-18'0'15,"36"-18"1,17 0 0,-17 18-16,17 0 15,-18-17-15,19 17 0,-19 0 16,19 0-16,-19 0 0,1 17 15</inkml:trace>
   <inkml:trace contextRef="#ctx0" brushRef="#br0" timeOffset="333878.6001">5944 11130 0,'0'53'16,"0"-18"-16,0 18 15,18-35-15,0 17 16,-18-17 0,17-1-16,19 1 15,-19-18-15,36 0 16,-35-18-16,-1 18 16</inkml:trace>
-  <inkml:trace contextRef="#ctx0" brushRef="#br0" timeOffset="334128.156">6332 11060 0,'0'-18'0,"0"36"16,0-1-16,0 19 15,18-1-15,-18 0 16,0 18 0,0-35-16,18-1 15,-18 1-15,17 0 16</inkml:trace>
+  <inkml:trace contextRef="#ctx0" brushRef="#br0" timeOffset="334128.1559">6332 11060 0,'0'-18'0,"0"36"16,0-1-16,0 19 15,18-1-15,-18 0 16,0 18 0,0-35-16,18-1 15,-18 1-15,17 0 16</inkml:trace>
   <inkml:trace contextRef="#ctx0" brushRef="#br0" timeOffset="334446.0753">6562 11007 0,'17'0'16,"1"-18"-16,0 18 16,-1 0-1,1 0-15,0-18 16,-1 18-16,1 18 0,-1 0 15,1 35-15,0-18 16,-1 18 0,1-18-16,0 36 15,-18-36-15,0 18 16,17-18-16,-17-17 16,0-1-16,-17-17 15,-1 0 1,0 0-16,1 0 0,-1-17 15,0 17-15,-34 0 16</inkml:trace>
   <inkml:trace contextRef="#ctx0" brushRef="#br0" timeOffset="334829.3053">5927 10971 0,'17'0'15,"-17"18"-15,-17 35 16,17-35-1,0 17-15,0 35 0,0-34 16,0 17-16</inkml:trace>
   <inkml:trace contextRef="#ctx0" brushRef="#br0" timeOffset="336870.2725">9031 8079 0,'18'0'0,"17"-18"16,-17 18-16,35-18 15,-36 18 1,1 0-16,0 0 0,-18-17 16,17 17-16</inkml:trace>
-  <inkml:trace contextRef="#ctx0" brushRef="#br0" timeOffset="337043.4529">9049 8079 0,'0'88'16,"0"-18"-1,17-34-15,1 17 16,0 17-16,-18-52 16,35 17-16,-17-17 15,-1-18-15,1 0 16</inkml:trace>
+  <inkml:trace contextRef="#ctx0" brushRef="#br0" timeOffset="337043.4528">9049 8079 0,'0'88'16,"0"-18"-1,17-34-15,1 17 16,0 17-16,-18-52 16,35 17-16,-17-17 15,-1-18-15,1 0 16</inkml:trace>
   <inkml:trace contextRef="#ctx0" brushRef="#br0" timeOffset="337321.2968">9366 8114 0,'18'0'15,"0"0"1,-1 0-16,-17 18 0,0 17 16,0-18-16,0 19 15,0-1-15,-17-17 0,-1 17 16,18-17-16,0-1 16,18 1-1,-1-18 1,1 0-16,-1 0 0,19-18 15,-19 18-15,1 0 16</inkml:trace>
   <inkml:trace contextRef="#ctx0" brushRef="#br0" timeOffset="337676.5111">9596 8043 0,'35'-17'16,"-18"17"-16,1 0 15,17 0 1,-17-18-16,17 36 0,-17-18 16,17 17-1,-17 1-15,0 17 16,-18 1-16,0 16 15,17-34-15,-17 53 16,18-1 0,-18-35-16,0-17 0,0 0 15,0-1-15,0 1 16,0 0-16,-18-18 16,1 0-1,-1-18-15,-17 18 0,17-18 16,-17 18-16,-1 0 15</inkml:trace>
   <inkml:trace contextRef="#ctx0" brushRef="#br0" timeOffset="338200.2023">9278 8149 0,'18'0'32,"-1"0"-17,1-17-15,0 17 16,-1-18-16,1 18 16,-18 18 15,-18-18-16,18 17 1</inkml:trace>
-  <inkml:trace contextRef="#ctx0" brushRef="#br0" timeOffset="348694.1463">28222 1005 0,'18'0'0,"-18"-17"15,0 34 32,0 1-31,18 0-16,-18 17 15,0-17-15,0 17 0,0 35 16,0-52-16,0 53 16,-18-36-16,18 35 15,0-34-15,0-1 16,0 0-1,0-17-15,0 0 16,18-1-16,-1-17 31,-17-17 1,18 17-17,-18-18 1,17 18-1,-17-18-15</inkml:trace>
+  <inkml:trace contextRef="#ctx0" brushRef="#br0" timeOffset="348694.1462">28222 1005 0,'18'0'0,"-18"-17"15,0 34 32,0 1-31,18 0-16,-18 17 15,0-17-15,0 17 0,0 35 16,0-52-16,0 53 16,-18-36-16,18 35 15,0-34-15,0-1 16,0 0-1,0-17-15,0 0 16,18-1-16,-1-17 31,-17-17 1,18 17-17,-18-18 1,17 18-1,-17-18-15</inkml:trace>
   <inkml:trace contextRef="#ctx0" brushRef="#br0" timeOffset="349072.4642">28116 1358 0,'0'18'16,"18"35"-1,-18 0 1,18-36-16,-18 19 0,35 17 15,-17-36-15,-18 1 16,17-1-16,19-17 16,-19 0-16,18 0 15,1-17-15,17-18 16,-18-1-16,18-17 16,-36 36-16,1-1 15,-18 0-15,18 18 16,-36 18 15</inkml:trace>
-  <inkml:trace contextRef="#ctx0" brushRef="#br0" timeOffset="350534.7579">22684 3334 0,'0'-18'47,"0"36"-16,0-1-15,17-17-16,-17 53 15,18-17-15,-18 34 16,18-35-16,-18 1 15,0-1-15,0 36 16,0-36-16,0 0 0,0-17 16,17 17-1,-17-17-15,-17-36 47</inkml:trace>
+  <inkml:trace contextRef="#ctx0" brushRef="#br0" timeOffset="350534.7578">22684 3334 0,'0'-18'47,"0"36"-16,0-1-15,17-17-16,-17 53 15,18-17-15,-18 34 16,18-35-16,-18 1 15,0-1-15,0 36 16,0-36-16,0 0 0,0-17 16,17 17-1,-17-17-15,-17-36 47</inkml:trace>
   <inkml:trace contextRef="#ctx0" brushRef="#br0" timeOffset="350839.9724">22490 3669 0,'0'18'0,"17"-1"15,1 1-15,0 17 16,-1-17-16,36 35 16,-35-36-16,-1 1 15,1 0 1,0-18-16,-1 0 0,1 0 16,0 0-1,-1-36-15,1 19 16,-1-19-16,1 1 15,17 17-15,-35 1 16,36-1 0</inkml:trace>
   <inkml:trace contextRef="#ctx0" brushRef="#br0" timeOffset="351963.951">22348 4251 0,'18'0'16,"0"0"-1,-1 0-15,1 0 16,35 0-16,-35 0 16,17 0-16,0 18 15,0-18-15,1 0 0,52 17 16,-53-17-16,18 18 15,35-18-15,-17 0 16,-36 0-16,-17 0 16</inkml:trace>
   <inkml:trace contextRef="#ctx0" brushRef="#br0" timeOffset="352430.4398">22472 4339 0,'18'-17'15,"-1"17"1,1 0 0,0 0-16,17 0 15,-18 0-15,36 0 16,-35 0-1,17 0-15,53 0 16,-52 0-16,17 17 0,35-17 16,0 18-1,-35-18-15,-18 0 0,18 0 16,18 0-16,-18-18 16,-18 1-16,0 17 0,0-18 15,1 0 1,-19 18-16,1-17 0</inkml:trace>
@@ -392,30 +395,30 @@
   <inkml:trace contextRef="#ctx0" brushRef="#br0" timeOffset="353320.1604">23513 4322 0,'35'0'15,"35"0"-15,36-18 16,-17 0 0,-19 18-1,-35-17-15,54-1 16,-54 18-16,0-18 16,36 1-16,-1-19 15,-35 36-15,1-17 16,-1 17-16,18-18 15,-18 18-15,36-35 16,-18 35-16,-18-18 16,53-17-16,-35 17 0,35-35 15,-35 36 1,18-19-16,-36 19 16,53-18-1,-70 17-15,17 0 0,0-17 16,-17 17-16,0 1 15,-1-36-15,-17 35 16</inkml:trace>
   <inkml:trace contextRef="#ctx0" brushRef="#br0" timeOffset="355690.2845">24342 6791 0,'0'-18'0,"-18"18"16,18 18 30,0 35-30,0-35 0,0 17-16,0 53 15,0-35-15,-18 35 16,18-35-16,0-35 0,0 17 16,0 18-16,18-53 15,-18 18-15,0-1 16,18-34-1</inkml:trace>
   <inkml:trace contextRef="#ctx0" brushRef="#br0" timeOffset="356172.3874">24095 7003 0,'0'17'0,"0"-34"32,17-1-17,1 18-15,-18-18 0,18 1 16,-18-1-16,17 0 15,1 1 1,0-1 0,-1-17-16,1 17 15,17 1-15,-17-1 16,-1 0-16,1 1 16,-18-1-1,18 18 16,-18 18-15,17-1-16,-17 1 16,18-18-16,0 18 15,-1-1-15,1 1 16,0-18-16,-1 18 16,1-18-1,-18 17-15,0 1 16</inkml:trace>
-  <inkml:trace contextRef="#ctx0" brushRef="#br0" timeOffset="358025.0581">18327 8290 0,'-18'0'0,"18"-17"15,0 34 79,18 19-78,-18-1-1,17 18-15,-17-18 16,18 36-1,-18-36-15,0 35 0,0-17 16,0-35-16,18 17 16,-18-17-1,17-18 1,-17-18 0,0 1-1</inkml:trace>
+  <inkml:trace contextRef="#ctx0" brushRef="#br0" timeOffset="358025.058">18327 8290 0,'-18'0'0,"18"-17"15,0 34 79,18 19-78,-18-1-1,17 18-15,-17-18 16,18 36-1,-18-36-15,0 35 0,0-17 16,0-35-16,18 17 16,-18-17-1,17-18 1,-17-18 0,0 1-1</inkml:trace>
   <inkml:trace contextRef="#ctx0" brushRef="#br0" timeOffset="358302.9243">18168 8590 0,'18'18'0,"-1"-1"16,1 1-16,17 53 15,1-1 1,-19-35-16,18 18 0,-17-35 16,0-18-16,-1 18 15,1-36-15,35-17 16,-18-18 0,0 18-16,18-36 15,-35 36-15,0-1 0,-1 19 16,-17-1-16</inkml:trace>
   <inkml:trace contextRef="#ctx0" brushRef="#br0" timeOffset="360860.8641">22684 4233 0,'17'-17'16,"-34"17"31,-1 0-32,0 0 1,1 0-1,-1-18-15,0 18 16,-17 0-16,35 18 16,-17-18-16,34 0 15,18 0 1,-17 0-16,70-18 16,-35 18-16,-18 0 15,18 0-15,0 0 0,-17 0 16,69 18-16,-52-1 15,0-17-15,71 0 16,-71 0-16,0 0 0,17 0 16,-35-17-16,54 17 15,-72-18-15</inkml:trace>
-  <inkml:trace contextRef="#ctx0" brushRef="#br0" timeOffset="361355.8584">22878 4339 0,'17'0'0,"19"0"16,-19 0-16,54 0 15,-36 0 1,53-17-16,-35 17 16,35-18-1,-35 18-15,35-18 16,-35 1-16,0-1 0,0 18 0,0-18 15,0 1-15,0-1 16,-18 18-16,53-35 16,-35 35-16,0-18 0,53 1 15,-71-1-15,18 0 16,53-17-16,-35 17 16,-18 1-16,52-19 15,-69 36-15,-1-17 16,36-1-16,-54 0 15,1 18-15,17-17 16,-17-1-16,17 18 16,-17-17-16,-1-1 15</inkml:trace>
+  <inkml:trace contextRef="#ctx0" brushRef="#br0" timeOffset="361355.8583">22878 4339 0,'17'0'0,"19"0"16,-19 0-16,54 0 15,-36 0 1,53-17-16,-35 17 16,35-18-1,-35 18-15,35-18 16,-35 1-16,0-1 0,0 18 0,0-18 15,0 1-15,0-1 16,-18 18-16,53-35 16,-35 35-16,0-18 0,53 1 15,-71-1-15,18 0 16,53-17-16,-35 17 16,-18 1-16,52-19 15,-69 36-15,-1-17 16,36-1-16,-54 0 15,1 18-15,17-17 16,-17-1-16,17 18 16,-17-17-16,-1-1 15</inkml:trace>
   <inkml:trace contextRef="#ctx0" brushRef="#br0" timeOffset="361845.864">24377 4110 0,'18'0'15,"-1"-18"-15,1 18 0,0 0 16,-1 0 0,1 0-16,17 0 15,-17 0-15,-1-17 0,36-1 16,-35 18-16,17-18 15,0 1-15,-17-19 0,17 19 16,54-19-16,-54 1 16,35 0-16,-17 0 15,-17 17-15,34-17 16,-35 17-16,36-35 16,-36 36-16,18-36 15,-18 17-15,18-34 16,-35 35-16,35-36 15,-35 36-15,17-18 16,-35 35 0,35 0-16</inkml:trace>
   <inkml:trace contextRef="#ctx0" brushRef="#br0" timeOffset="379068.4152">21943 11307 0,'-18'0'15,"18"17"32,18 1-31,-18-1 0,17 1-1,-17 35 1,0-35-16,0 17 15,0 0 1,0 0-16,0-17 0,0 0 16,18 17-16,-18-17 15,0-1 1,0 1-16,18-18 16,-18 18-1,0-1 1,0 1-1,17-18 1,-17 18 31,0-1-31,0 1-1,18-1 1,-18 1-1,0 17 1,0-17-16,0 0 16,0-1-16,0 19 0,0-19 0,0 1 15,0 35 1,0-18-16,0 36 16,0-36-16,-18 0 0,18 53 15,-17-52-15,17 52 16,0-35-16,-18 35 15,18-53-15,-18 71 16,18-71 0,0 71-16,0-53 15,0-18-15,-17 18 0,17 53 16,0-35-16,-18 34 16,18-34-1,0-18-15,0 70 16,0-70-16,0 18 0,-17 52 15,17-17 1,0-53-16,0 0 0,17 18 16,-17 17-16,0-35 15,0 53 1,0-71-16,0 0 0,0 36 16,0-54-16,0 36 15,0-35-15,0-1 16</inkml:trace>
   <inkml:trace contextRef="#ctx0" brushRef="#br0" timeOffset="380303.8298">18803 14464 0,'18'0'47,"17"18"-32,-17-1 1,35 1 0,-1-18-16,-16 0 15,-1 0-15,18 17 0,53-17 16,-53 0-16,53-17 16,-36 17-1,-17 0-15,70 0 16,-70 0-16,71 0 15,-54 0-15,72-18 16,-90 18-16,19 0 16,0 0-16,70-17 15,-88 17-15,88-18 16,-88 18-16,0 0 0,70 0 16,-70 0-16,17-18 15,36 18-15,-35 0 16,-18 0-16,53 0 15,-1 0 1,19 0-16,-54 0 16,1 0-16,0 0 0,17 18 15,71-18-15,-89 0 16,18 0-16,0 0 0,1 0 16,105 18-1,-106-18-15,124 17 16,-107-17-16,125 18 15,-107-18-15,89 17 16,-106 1-16,70 0 16,-88-18-16,71 17 15,-88-17-15,70 0 16,-71 0-16,36 0 16,-71 0-16,1 0 15,-72 0 1</inkml:trace>
   <inkml:trace contextRef="#ctx0" brushRef="#br1" timeOffset="390235.4164">19191 14429 0,'18'0'110,"-1"0"-110,1 0 15,0 0 1,-1 0-16,19 17 16,-19-17-16,19 0 15,-19 0-15,36 18 16,-35-18-16,17-18 16,18 18-1,0-17-15,-36 17 16,1 0-16,17 0 0,-17 0 15,35 0-15,-35 0 16,17 0-16,0 0 16,-17 0-16,52 0 15,-34-18-15,-1 18 0,0 0 16,36 0 0,-36 0-16,0 0 15,1 0-15,-1 0 0,0 0 0,53 0 16,-52 0-1,-1 0-15,35-18 16,-52 18-16,17 0 0,1 18 16,-1-18-16,18 0 15,-18 0-15,0 0 0,1 0 16,-1-18-16,53 18 16,-53-17-16,1 17 15,17-18-15,-18 18 0,0 0 16,36-18-16,-36 18 15,0 0-15,36 0 16,-1 0 0,-34 0-16,17 0 0,-18 0 15,0 0-15,18 0 16,-35 0-16,-1 0 16,19 0-16,-19 0 15,1 0 1,-1 0-16,1 0 62,0 0-62,-1 0 16,1 18-16,0-18 0,17 0 16,-35-18-16,18 18 15,-1 0 1,-34 0 15,-1 0-15,0 0-16,-17-17 15</inkml:trace>
-  <inkml:trace contextRef="#ctx0" brushRef="#br1" timeOffset="391531.8448">19456 14482 0,'-18'-18'16,"0"0"-1,1 18 17,34 0-17,-17 18 1,18 0-16,17-18 0,1 0 16,-1 17-16,53-17 15,-35 18-15,0-18 16,70 0-16,-70-18 15,18 18-15,70 0 16,-53 0-16,0 0 0,89 0 16,-107 0-1,19 0-15,87 0 16,-106 0-16,107 0 16,-107 0-16,54 0 15,-71 0-15,35 0 16,-53 18-16,36-18 15,-36 0-15,18 0 16,-18 0-16,1 0 16,-19 0-16,1 0 15,-1 0 1,1 0 0,0 0-1,-1 0 1,-17-18-1,0 36 1,-35-18 0,-18-18-16,18 18 15,-18 0-15,-53-17 16,18 17-16,17-18 16,-105 0-16,88 18 15,0-17-15,-89-1 16,107 0-16,-89 1 15,106 17-15,-70-36 16,70 36-16,-53-17 16,71-1-16,-18 18 15,-53-17 1,18 17-16,35 0 16,17 17-16,1-17 0,-35 18 15,52-18-15,0 0 16,-17 17-16,35 1 15,-18-18 1,36 0-16,0 0 16,-1 0-1,36 18 1,-35-18-16,17 0 0,71 0 16,-35 17-16,-1-17 15,1 0-15,17 18 0,18-18 16,-18 18-16,18-18 0,0 0 15,88 0 1,-89 0-16,-34-18 0,17 18 16,-17 18-16,70-18 15,-88 17-15,0-17 0,-18 0 16,18 0-16,17 0 16,-52 0-16,17 0 15,-17 0-15,0 0 0,-1 0 16,-17 18-1,18-18 1,-18 18-16,17-18 16,1 0-16,0 0 15,-18-18 1,-18 18 15</inkml:trace>
+  <inkml:trace contextRef="#ctx0" brushRef="#br1" timeOffset="391531.8447">19456 14482 0,'-18'-18'16,"0"0"-1,1 18 17,34 0-17,-17 18 1,18 0-16,17-18 0,1 0 16,-1 17-16,53-17 15,-35 18-15,0-18 16,70 0-16,-70-18 15,18 18-15,70 0 16,-53 0-16,0 0 0,89 0 16,-107 0-1,19 0-15,87 0 16,-106 0-16,107 0 16,-107 0-16,54 0 15,-71 0-15,35 0 16,-53 18-16,36-18 15,-36 0-15,18 0 16,-18 0-16,1 0 16,-19 0-16,1 0 15,-1 0 1,1 0 0,0 0-1,-1 0 1,-17-18-1,0 36 1,-35-18 0,-18-18-16,18 18 15,-18 0-15,-53-17 16,18 17-16,17-18 16,-105 0-16,88 18 15,0-17-15,-89-1 16,107 0-16,-89 1 15,106 17-15,-70-36 16,70 36-16,-53-17 16,71-1-16,-18 18 15,-53-17 1,18 17-16,35 0 16,17 17-16,1-17 0,-35 18 15,52-18-15,0 0 16,-17 17-16,35 1 15,-18-18 1,36 0-16,0 0 16,-1 0-1,36 18 1,-35-18-16,17 0 0,71 0 16,-35 17-16,-1-17 15,1 0-15,17 18 0,18-18 16,-18 18-16,18-18 0,0 0 15,88 0 1,-89 0-16,-34-18 0,17 18 16,-17 18-16,70-18 15,-88 17-15,0-17 0,-18 0 16,18 0-16,17 0 16,-52 0-16,17 0 15,-17 0-15,0 0 0,-1 0 16,-17 18-1,18-18 1,-18 18-16,17-18 16,1 0-16,0 0 15,-18-18 1,-18 18 15</inkml:trace>
   <inkml:trace contextRef="#ctx0" brushRef="#br1" timeOffset="392632.5751">20655 14393 0,'-53'0'16,"18"0"-1,0 0-15,-18 18 16,35-18-16,-17 0 0,17 0 16,-17 18-16,-18-18 15,18 0-15,-1 17 16,19-17-16,-18 0 0,-18 0 16,17 0-16,1 0 15,17 0-15,-17-17 0,-53-1 16,53 18-1,-18 0-15,17-18 0,-34 18 16,-1 0 0,36 0-16,-18 0 15,18 0-15,-36 18 16,36-18-16,-35 0 16,34 0-16,-17-18 15,36 18-15,-19 0 16,19 0-1,34 0-15,1 0 16,0 0-16,17 0 0,71 0 16,-36 0-16,1 0 15,70 0 1,18-17-16,-89 17 16,19 17-16,-1-17 0,88 18 15,-70-18 1,0 18-16,105-18 0,-105 0 15,0 0-15,-18 0 0,89 17 16,-107-17 0,1 0-16,-1 0 0,71 0 15,-88 0-15,18-17 16,17 17-16,-53-18 16,-17 18-16,0 0 15,-18 18 1,-18-1-1,0-17-15,18-17 16,0-1 15,18 18-15,-18-18-16,18 18 0,-1 0 16,1 0-16,0 0 15,-1 0 1,-17 18-1,18-18-15,-36 0 63,1 0-63,-1 0 16,0 0-1,18 18-15,18-18 16,0 0-16,17 0 15,-17 0-15,-1 0 16,18 0 0,-17 0-16,0-18 0,-36 36 31,0-18-15</inkml:trace>
   <inkml:trace contextRef="#ctx0" brushRef="#br1" timeOffset="393694.3223">21837 14464 0,'18'-18'32,"-1"1"-17,1-1-15,0 0 16,-1 1-16,36-19 16,-35 1-16,35-18 15,-36 36-15,19-19 16,16-34-16,-16 34 15,-1 1-15,53-35 16,-53 34-16,18-17 0,0 18 16,0-18-16,35-35 15,-35 35-15,-17 18 16,17-18-16,-18 0 0,53-70 16,-53 70-1,18 0-15,-18-18 0,18 36 0,0-18 16,0 0-16,53-35 15,-53 53-15,-18-1 0,71-34 16,-71 34 0,18-16-16,35-19 15,-35 36-15,18-36 16,-36 36-16,36-36 16,-36 36-16,36-18 15,-36 18-15,18-18 16,-18 35-16,36-35 15,-36 36-15,35-36 16,-34 18-16,17-1 16,-18 19-16,-17-1 15,-18 0 1,17 18-16,-17-17 16,-17 17 15,-19 0-16,1 35 1</inkml:trace>
   <inkml:trace contextRef="#ctx0" brushRef="#br1" timeOffset="397147.3016">25382 11977 0,'0'-18'0,"0"1"15,-35-19-15,35 19 16,-53-1 0,36 18-16,-1 0 0,-53 35 15,36-17-15,-18 52 16,36-34-16,17-1 15,0 36 1,17-36-16,36 0 0,-18-17 16,1-1-16,34-34 15,-52 17-15,35-36 16,-36 1-16,-17-18 16,0 18-16,0 0 15,-17 17-15,-19-17 16,19 35-16,-1 17 15,1 1 1,17 53-16,17-36 16,18 35-16,-17-34 15,53 34 1,-54-52-16,54 17 16,-54-17-16,1-18 15</inkml:trace>
   <inkml:trace contextRef="#ctx0" brushRef="#br1" timeOffset="397327.739">25682 12012 0,'18'0'0,"17"-18"15,0 18-15,1 0 0,17-17 16,-36 17-16,1 17 15,-18 1 1</inkml:trace>
   <inkml:trace contextRef="#ctx0" brushRef="#br1" timeOffset="397437.4367">25700 12136 0,'18'17'16,"-1"-17"-1,1 18-15,35-18 16,17-18-1,-34 18-15,-19 0 0</inkml:trace>
-  <inkml:trace contextRef="#ctx0" brushRef="#br1" timeOffset="397909.3468">26141 12118 0,'0'70'16,"0"-17"-1,0-35-15,35 17 16,-17-35-16,-1-17 16,19-36-1,-36 17-15,17 1 0,-17 0 16,36-36-16,-36 36 15,17 17-15,1 18 16,-18 36 0,0-19-16,0 19 15,0-1-15,0-17 0,35 17 16,-35-18-16,18 1 16,-18-36-1,17 1 1,-17-1-1,36 1-15,-19-1 16,19 0-16,-19 18 16,1 0-16,0 18 15,-18 17 1,17-17-16,1 17 16,-18-17-16,35 17 15,-35-17-15</inkml:trace>
+  <inkml:trace contextRef="#ctx0" brushRef="#br1" timeOffset="397909.3467">26141 12118 0,'0'70'16,"0"-17"-1,0-35-15,35 17 16,-17-35-16,-1-17 16,19-36-1,-36 17-15,17 1 0,-17 0 16,36-36-16,-36 36 15,17 17-15,1 18 16,-18 36 0,0-19-16,0 19 15,0-1-15,0-17 0,35 17 16,-35-18-16,18 1 16,-18-36-1,17 1 1,-17-1-1,36 1-15,-19-1 16,19 0-16,-19 18 16,1 0-16,0 18 15,-18 17 1,17-17-16,1 17 16,-18-17-16,35 17 15,-35-17-15</inkml:trace>
   <inkml:trace contextRef="#ctx0" brushRef="#br1" timeOffset="398355.119">26723 12100 0,'-53'18'16,"18"17"-1,17 18-15,18-35 16,35 35-16,18-36 15,-35 1-15,17-18 16,18 0-16,-35 0 16,-1-18-16,-17 1 15,0-36 1,0 35-16,-17-17 16,-1 17-16,0 1 15,18-1-15,0 36 16,36-1-1,-19 1-15,1-18 16,17 17-16,1 1 16,-19-18-16,1 0 15,0 0-15,-36 0 16,36 0 31,-1 18-47,1-1 15,-1 1-15,1-18 0,35 35 16,-35-35 0,-1 18-16,19-18 15,-1 0-15</inkml:trace>
   <inkml:trace contextRef="#ctx0" brushRef="#br1" timeOffset="398509.7654">27182 12153 0,'-36'18'16,"1"17"-16,17-17 0,-17 35 16,35-36-16,-18 19 15,18-19-15,0 19 16,0-19-16</inkml:trace>
-  <inkml:trace contextRef="#ctx0" brushRef="#br1" timeOffset="398945.6559">27517 11765 0,'-36'35'16,"-17"54"-16,36 87 16,17-105-1,17-19-15,36 54 16,-35-70-16,53 34 15,-36-52-15,0-18 0</inkml:trace>
+  <inkml:trace contextRef="#ctx0" brushRef="#br1" timeOffset="398945.6558">27517 11765 0,'-36'35'16,"-17"54"-16,36 87 16,17-105-1,17-19-15,36 54 16,-35-70-16,53 34 15,-36-52-15,0-18 0</inkml:trace>
   <inkml:trace contextRef="#ctx0" brushRef="#br1" timeOffset="399234.5584">27799 12047 0,'-18'36'16,"18"-19"-16,0 19 0,18 34 16,0-35-1,17-17-15,35 17 16,-34-35-16,-1 0 0,0 0 16,18-17-16,-35-19 15,-1 19-15,-17-19 16,-17 1-16,-19-18 15,19 18-15,-18 17 0,17-17 16,-17 35-16,-1-18 16,19 18-16,-1 18 15</inkml:trace>
   <inkml:trace contextRef="#ctx0" brushRef="#br1" timeOffset="399394.8537">28222 12435 0,'0'53'16,"-17"-17"-1,17-1-15,-18-17 16,18-1 0</inkml:trace>
   <inkml:trace contextRef="#ctx0" brushRef="#br1" timeOffset="399706.2876">28487 12118 0,'17'0'15,"1"0"-15,0 0 0,17 18 16,-17-1-1,-1 1-15,1-1 0,0 1 0,-18 17 16,0 1 0,0-19-16,-18 1 0,18 17 0,-18 1 15,18-19 1,0 18-16,0-17 0,0 0 16,18-1-16,0 1 15,-1-18-15,18 18 16,-17-18-1,-18-18 1,-35 0-16</inkml:trace>
   <inkml:trace contextRef="#ctx0" brushRef="#br1" timeOffset="399847.0559">28504 12294 0,'36'0'0,"-1"0"16,18 0-16,-18 18 15,18-18-15,-35 0 16,35 0 0</inkml:trace>
   <inkml:trace contextRef="#ctx0" brushRef="#br1" timeOffset="400098.0602">28734 11783 0,'0'0'0,"17"35"15,36 18-15,-17 0 16,34 17 0,-17-17-16,-18 0 0,36 53 15,-36-53-15,-17 0 16,-1 53-16,-17-53 15,0 0-15,-35 17 16,18-35-16,-1 1 16,0-19-16</inkml:trace>
-  <inkml:trace contextRef="#ctx0" brushRef="#br0" timeOffset="406797.3029">24183 14358 0,'-18'-18'15,"18"1"-15,-17 17 16,-1-18-16,0 18 16,1-17-1,34 34 17,19 18-17,-1 1-15,0-19 0,0 1 16,36 35-16,-36-35 15,1 17-15,-1-18 16,-17 19-16,-1 17 0,-17 0 16,0-36-16,-53 18 15,36-17-15,-19 0 16,19-1-16,-1-17 16,0 18-16,-17-18 15,35 18-15,0-36 16</inkml:trace>
+  <inkml:trace contextRef="#ctx0" brushRef="#br0" timeOffset="406797.3028">24183 14358 0,'-18'-18'15,"18"1"-15,-17 17 16,-1-18-16,0 18 16,1-17-1,34 34 17,19 18-17,-1 1-15,0-19 0,0 1 16,36 35-16,-36-35 15,1 17-15,-1-18 16,-17 19-16,-1 17 0,-17 0 16,0-36-16,-53 18 15,36-17-15,-19 0 16,19-1-16,-1-17 16,0 18-16,-17-18 15,35 18-15,0-36 16</inkml:trace>
   <inkml:trace contextRef="#ctx0" brushRef="#br0" timeOffset="407102.4993">24624 14623 0,'35'0'0,"36"17"16,-54 1 0,19 0-16,-1-1 15,-35 54 1,0-54-16,-18 36 16,1-35-16,-1 35 15,18-35-15,0-1 16,0 1-16,35 17 15,-17-35 1,17 18-16,-17-36 16,-18 0-1</inkml:trace>
   <inkml:trace contextRef="#ctx0" brushRef="#br0" timeOffset="407231.8165">24606 14887 0,'71'0'0,"70"0"16,-53 0 0,-17 0-1</inkml:trace>
   <inkml:trace contextRef="#ctx0" brushRef="#br0" timeOffset="407903.7204">21731 11642 0,'0'-18'0,"18"0"16,-1-17-16,19-35 15,-1 34-15,18-52 16,-18 53-16,-17 0 15,-1-1-15,-17 1 0,18 17 16,-18 1-16,18 34 16,-18 36-1,17-35-15,19 52 16,-19-52-16,19 35 16,-19-35-1,18 17-15</inkml:trace>
@@ -423,7 +426,7 @@
   <inkml:trace contextRef="#ctx0" brushRef="#br0" timeOffset="410124.0475">23389 11448 0,'0'-18'15,"-17"36"1,17 17 0,0 0-16,-18 71 15,18-53-15,0 70 16,0-70-16,0 36 15,0-54-15,0 0 16,18 0 0,-18-17-16,17-18 15</inkml:trace>
   <inkml:trace contextRef="#ctx0" brushRef="#br0" timeOffset="410372.8053">23248 11836 0,'18'53'16,"-1"52"0,19-52-1,-1 18 1,-17-53-16,-1-1 0,1 1 15,35-18 1,-36-18-16,1 1 0,35-36 16,-35 35-16,17-35 15,-35 35 1,17-17-16</inkml:trace>
   <inkml:trace contextRef="#ctx0" brushRef="#br0" timeOffset="414689.3975">20108 13229 0,'18'-17'16,"0"-1"-16,-18 0 31,0 36 0,17 17-31,-17 0 16,0 71-16,18-53 16,-18 71-1,0-54-15,0 18 16,0-52-16,0 34 16,0-52-16,0 17 15,0-17-15,-18-18 31,1 0-15</inkml:trace>
-  <inkml:trace contextRef="#ctx0" brushRef="#br0" timeOffset="414932.641">19932 13705 0,'53'71'15,"-35"-36"-15,17 36 16,0-36-16,18 18 16,-35-53-16,17 18 15,-17-18-15,34 17 16,-16-34 0,-19-1-16,19 0 0,-1-17 15,-35 17 1,18 1-16,-1-1 0,-17 1 15,18-1-15</inkml:trace>
+  <inkml:trace contextRef="#ctx0" brushRef="#br0" timeOffset="414932.6409">19932 13705 0,'53'71'15,"-35"-36"-15,17 36 16,0-36-16,18 18 16,-35-53-16,17 18 15,-17-18-15,34 17 16,-16-34 0,-19-1-16,19 0 0,-1-17 15,-35 17 1,18 1-16,-1-1 0,-17 1 15,18-1-15</inkml:trace>
   <inkml:trace contextRef="#ctx0" brushRef="#br0" timeOffset="429553.8116">22137 14764 0,'0'17'31,"35"-17"-15,-17 0-16,17 18 15,18 0-15,0 17 16,-18-17-16,18 17 16,18 0-16,-18 0 15,-1 1-15,1-1 0,36 18 16,-54-18-16,0-17 0,18 17 16,-35-17-16,-1-18 15,-34 0 1,-1 0-1</inkml:trace>
   <inkml:trace contextRef="#ctx0" brushRef="#br0" timeOffset="429988.2682">22154 15064 0,'0'17'16,"0"1"-1,0 0-15,-17-36 47,17 0-47,-18-52 16,-17-1-16,17 18 15,-17-35-15,17 53 16,1-18 0,17 35-16,0 1 15,35-1 1,0 18-16,-17 0 0,52 18 15,-34-18 1,17 17-16,-18-17 0,0 0 16,18 0-16,18 18 15,-54-18-15,1 17 16</inkml:trace>
   <inkml:trace contextRef="#ctx0" brushRef="#br0" timeOffset="437567.7674">23407 15169 0,'17'0'16,"1"18"-16,0 0 0,-1-1 15,1 1 1,0 17-16,-18-17 16,0 17-1,0-17-15,-18-1 0,0 36 16,1-35-16,17 0 0,0 17 16,0-17-1,17-18-15,19 17 16,-19-17-16,19 0 15,-19 0-15,1-17 16</inkml:trace>
@@ -462,7 +465,7 @@
   <inkml:trace contextRef="#ctx0" brushRef="#br0" timeOffset="507040.281">27093 14129 0,'36'0'15,"-19"0"1,1 0-16,0-18 0,17 0 15,-35 1-15,17-1 16,1 1-16,-18-1 16,0 0-16,-18 1 0,1-36 15,17 35-15,-18 0 16,-17 1 0,17-1-16,1 18 15,-1 35-15,18 1 16,-18 34-16,18-17 15,18 0-15,0 35 16,-1-35-16,1 18 16,17-1-1,-35-52-15,18 0 16,-18-1-16,-18-34 16,1-19-1,17 1 1,-18 17-16,36-17 15,-18 18 1,17 17-16,1 0 16,-1 17-1,1 1-15,0-18 16,-1 17 0,-17 1-16,18 0 15,-18-1 1,0-34-1,0-1 1,0-17-16,18 0 16,-18-1-1,0 1-15,0 17 16,0 1-16,0-1 16,0 0-1,17 18 1</inkml:trace>
   <inkml:trace contextRef="#ctx0" brushRef="#br0" timeOffset="507582.865">27411 14411 0,'17'18'16,"19"-18"-1,-19 0-15,1-18 16,0 18-16,-18-18 16,0 1-1,-18 17 1,18 17-16,-18-17 16,18 18-16,0 0 15,0-1 1,18-17-1,0 0-15,-1 0 16,1 0-16,-18-17 0,18-1 16,-1 0-16,1-35 15,0 18-15,-1 0 16,1 0-16,-1-18 0,1-71 16,0 89-16,-18-18 15,0 18-15,0-1 0,-18 19 16,18-1-16,-18 36 15,18 35 1,-17-18 0,17 53-16,17-53 15,-17 1-15,18 17 0,17 35 16,18-35 0,-35-18-16,0-17 0,34-1 15,-34-17 1,0 0-16,-1-17 15,-17-1-15,-17 0 16,17 1 0</inkml:trace>
   <inkml:trace contextRef="#ctx0" brushRef="#br0" timeOffset="508733.835">27499 14340 0,'0'0'0,"18"-17"16,-1 17 0,-17-18-16,18 1 15,-18-1-15,0 0 16,0 1-1,-18 17 1,1 0-16,-1 0 16,0 0-16,1 0 15,-1 17-15,18 1 0,-18 17 16,36-17-16,-18 17 16,35-17-16,1-1 15,17 1-15,-36-18 16,36 18-1,-35-18-15,-1 0 16,1 0-16,-18-18 16</inkml:trace>
-  <inkml:trace contextRef="#ctx0" brushRef="#br0" timeOffset="509107.3577">28840 13864 0,'17'18'16,"-17"-1"0,0 19-16,0-1 0,0 18 15,0 35-15,0-35 16,0-18-16,0 1 0,53 34 15,-18-17 1,36-18 0,-18-35-16,-18 0 15,-17 0-15</inkml:trace>
+  <inkml:trace contextRef="#ctx0" brushRef="#br0" timeOffset="509107.3576">28840 13864 0,'17'18'16,"-17"-1"0,0 19-16,0-1 0,0 18 15,0 35-15,0-35 16,0-18-16,0 1 0,53 34 15,-18-17 1,36-18 0,-18-35-16,-18 0 15,-17 0-15</inkml:trace>
   <inkml:trace contextRef="#ctx0" brushRef="#br0" timeOffset="509262.4688">29228 14235 0,'0'35'0,"17"-17"16,-17-1-16,18 1 15,0-1-15,-1-17 16,1 0-16</inkml:trace>
   <inkml:trace contextRef="#ctx0" brushRef="#br0" timeOffset="509373.8241">29245 13988 0,'0'-18'0,"18"18"31,0 0-31</inkml:trace>
   <inkml:trace contextRef="#ctx0" brushRef="#br0" timeOffset="509940.5997">29369 14376 0,'0'-18'15,"17"-17"1,19 17 0,-1-17-1,-35 17-15,18 1 0,-1-1 16,1 18-16,-18-18 0,18 18 15,-18 18 1,0 0-16,-18-18 0,18 53 16,0-36-16,0 1 15,35 17-15,-17-17 16,17-18-16,-17 0 16,35 0-16,-36-18 15,19 0 1,-36 1-16,0-1 15,-18 18 1,0 18 15,18-1-15,0 1-16,0 0 16,18-1-16,17 19 15,-17-36 1,-1 17-1,1-17-15,0 0 16,-18-17 0,17-1-1,1 18 1,-18-18-16,18 1 0,-1 17 16,-17-18-1,18 18-15,-18-18 16,0 1-16,18-1 15,-1 1-15</inkml:trace>
@@ -474,31 +477,31 @@
   <inkml:trace contextRef="#ctx0" brushRef="#br2" timeOffset="519604.8356">18415 10636 0,'18'-35'0,"-1"17"15,-17 36 16,0 53-15,0-36-16,0 88 16,18-52-16,0 88 15,-1-71-15,-17 106 16,18-88-16,-18 123 16,0-123-16,0 105 15,0-87-15,-18 105 16,18-123-16,0 0 15,0 88 1,0-88-16,18-18 0,-18 18 16,17-18-16,1 0 0,0 89 15,17-19 1,0 1-16,-17-88 16,0-1-16,-18 1 0,35 52 15,-17-70-15,-18 53 16,0-71-1,0 18-15,0-18 0,0 36 16,0 17 0,0-53-16,0 1 0,-18 17 15,0 35 1,18-53-16,-17 0 0,17 1 16,0-1-16,0 18 15,0-35-15,0 17 0,0-18 16,0 19-16,0-1 15,0-17-15,0-1 16,0 19 0,0-1-16,17-35 15,-17 17-15,18 1 16,0 0-16,-1-1 16,1-17-1,17 18 1,-17-18-16,35 0 15,-18 18-15,18-18 16,-18 17-16,53 1 16,-52 0-16,69-1 15,-52 1-15,0-18 0,71 17 16,17 1 0,-53 0-16,-17-18 15,87 35-15,19-17 16,-89-1-16,18 1 15,-18-18-15,124 35 16,-107-17-16,1-18 16,0 18-16,0-1 0,141 1 15,-124-18-15,124 17 16,-123 1 0,-1-18-16,124 18 15,-106-1-15,106-17 16,-106 18-16,124 0 15,-142-18-15,160 0 16,-160 17-16,159-17 16,-158 0-16,140 18 15,-140-18-15,-1 18 16,1-18-16,-1 17 0,1 1 16,-1-1-16,107 1 15,-125-18-15,19 18 0,-18-1 16,17-17-16,89 18 15,-106-18-15,-1 18 0,1-1 16,0-17-16,106 18 16,-124-18-16,18 18 15,88-18-15,-106 17 16,0-17-16,0 0 0,18 18 16,71-18-1,-89 17-15,106-17 16,-106 0-16,106 0 15,-88 0-15,88 0 16,-88 0-16,-18 18 0,124 0 16,17-1-1,-123-17-15,17 0 16,1 18-16,123-18 16,-106 0-16,-18 0 0,1 0 15,17 0-15,123 0 16,-122 0-16,-1 0 0,-18 0 15,1 0-15,123 0 16,-124 0-16,0 0 16,89 18-16,-106-18 15,88 17-15,-106 1 16,89-18-16,-89 0 16,88 0-1,-88 0-15,71 0 16,-88 0-16,52 0 15,-52 0-15,-18 0 0,-18 0 16,35-18-16,-52 1 16,0 17-16,-1-18 0,-17 0 15,0-17 1,0 17-16,-17-17 0,17 18 16,-18-19-16,0-52 15,1 53-15,17-18 0,0-18 16,0 18-16,0-105 15,0 69-15,0 1 16,0 0-16,0-18 0,0-105 16,0 105-16,-18-141 15,18 106 1,-17 0-16,-1-124 0,0 142 16,1-107-1,-1 107-15,-17-89 16,17 106-16,-17-105 15,17 105-15,1-18 0,-1 18 16,0 1-16,1-1 16,-1 0-16,-17 0 0,-36-70 15,53 88-15,-17 17 16,-35-70-16,34 88 16,1 0-16,0 18 0,-18-1 15,18 1-15,-71-18 16,71 36-16,-18-1 15,0 0-15,0 1 0,-53-36 16,53 35-16,-18 1 16,-70-19-16,53 19 15,18-1-15,-19 0 0,-87 1 16,70-1-16,-70 0 16,70 1-1,18-1-15,-124-17 16,106 17-16,0 1 0,1-1 15,-107-35-15,106 35 16,-123-17 0,105 17-16,1-17 0,-1 18 15,-17-1-15,-123-17 16,140 17-16,-17 0 0,0 1 16,18 17-16,-160-36 15,160 19-15,-1 17 0,-17-18 16,18 18-16,-124-35 15,123 35-15,1-18 16,-1 18-16,1-17 0,-124-1 16,124 0-16,-1 18 15,-123-35-15,124 35 16,-107-35 0,107 35-16,-106-18 15,105 1-15,-123 17 16,124-18-16,-124 18 15,123-18-15,-105 1 16,105 17-16,-105-18 16,106 0-16,-124 1 15,123 17-15,1 0 16,-18 0-16,-106 0 16,106 0-16,17 0 0,-17 17 15,18-17-15,-1 0 16,-17 0-16,18 0 0,-1 0 15,1 18-15,-19-18 0,-122 18 16,140-18-16,1 0 16,-124 17-16,124 1 15,-1-18-15,-123 18 16,141-1-16,-17-17 0,17 18 16,-123-1-1,105 1-15,-87 17 16,105-35-16,-71 18 15,89 0-15,-71-18 16,89 0-16,-54 17 16,89-17-16,-53 36 15</inkml:trace>
   <inkml:trace contextRef="#ctx0" brushRef="#br2" timeOffset="544911.5884">25488 7020 0,'35'0'15,"-17"-17"-15,0 17 0,-1 0 0,19 17 16,-19 1-16,19 52 15,-19-34 1,36 87 0,-35-70-16,17 18 0,18 17 0,-18-18 15,18 1-15,0-18 16,0 17-16,53 19 16,-71-54-16,-17 0 0,17 1 15,-17-19 1</inkml:trace>
   <inkml:trace contextRef="#ctx0" brushRef="#br2" timeOffset="545282.0378">25453 7585 0,'-18'17'15,"18"1"-15,-17-53 16,17 17 0,0-17-16,0-71 15,0 53-15,0-17 0,17-54 16,1-17-1,-18 88-15,0 0 16,18 18-16,-1-18 16,1 53-16,-1 18 15,1-1-15,53 54 16,-36-18-16,88 17 16,-70-52-16,71 17 15</inkml:trace>
-  <inkml:trace contextRef="#ctx0" brushRef="#br1" timeOffset="571832.4703">20549 14781 0,'0'18'62,"18"35"-46,-18-18-16,0 18 15,0 0-15,0 53 16,0-36-16,0 54 16,0-54-16,0 19 15,18-54-15,-18 0 0,17 1 16,1-19-1,0-17-15,-1 0 16,-17-17-16</inkml:trace>
+  <inkml:trace contextRef="#ctx0" brushRef="#br1" timeOffset="571832.4702">20549 14781 0,'0'18'62,"18"35"-46,-18-18-16,0 18 15,0 0-15,0 53 16,0-36-16,0 54 16,0-54-16,0 19 15,18-54-15,-18 0 0,17 1 16,1-19-1,0-17-15,-1 0 16,-17-17-16</inkml:trace>
   <inkml:trace contextRef="#ctx0" brushRef="#br1" timeOffset="572299.1037">20249 15028 0,'18'0'47,"0"-35"-31,-18 0-16,17 0 15,1 17 1,-18-17-16,35-1 0,-35 19 15,18 17-15,-18-18 0,18 18 16,-1 0-16,1 0 16,-1 0-16,19 0 15,-19 0-15,1 0 16,17 18-16,1-18 16,-19 17-16,1 19 15,0-1-15,17 0 16,-18 0-16</inkml:trace>
   <inkml:trace contextRef="#ctx0" brushRef="#br1" timeOffset="584679.2032">23495 16140 0,'0'-18'46,"-18"18"48,1 0-78,17 18-1,-18-18-15,0 17 0,1 1 0,-1 0 16,-17-1-16,17 1 16,-35 35-16,18-36 15,-18 36 1,18-17-16,0-1 0,-18 18 16,17-18-16,1 0 0,-18 18 15,18-18 1,0 18-16,-18 18 15,17-18-15,-16 17 16,16-34-16,-34 34 16,52-52-16,-35 35 15,18-18-15,0 18 16,-1-18-16,1 1 16,17-1-16,-17-18 15,0 36-15,0-17 16,-1-1-16,19-17 15,-36 35 1,17-1-16,19-16 16,-18-1-16,17-17 0,0 35 15,1-36 1,-1 1-16,0 17 0,18-17 16,-17 17-1,-1-35-15,18 18 16,-18-1-16,1-17 15,-1 18 1,1-18 15,17 18-15,-18-1 0,18 1-1,0-1-15,18-17 16</inkml:trace>
   <inkml:trace contextRef="#ctx0" brushRef="#br1" timeOffset="585467.8981">19720 17992 0,'18'17'31,"0"-17"-15</inkml:trace>
-  <inkml:trace contextRef="#ctx0" brushRef="#br1" timeOffset="585656.7883">20020 17974 0,'18'0'0,"-1"0"16,19-18-1</inkml:trace>
-  <inkml:trace contextRef="#ctx0" brushRef="#br1" timeOffset="585840.2905">20338 18027 0,'17'18'15,"1"-18"1,0 17 0,-1-17-16</inkml:trace>
+  <inkml:trace contextRef="#ctx0" brushRef="#br1" timeOffset="585656.7882">20020 17974 0,'18'0'0,"-1"0"16,19-18-1</inkml:trace>
+  <inkml:trace contextRef="#ctx0" brushRef="#br1" timeOffset="585840.2904">20338 18027 0,'17'18'15,"1"-18"1,0 17 0,-1-17-16</inkml:trace>
   <inkml:trace contextRef="#ctx0" brushRef="#br1" timeOffset="586017.5158">20549 18045 0,'18'0'15,"0"-18"-15,-1 18 16,1 0 0,0 0-16</inkml:trace>
   <inkml:trace contextRef="#ctx0" brushRef="#br1" timeOffset="586145.13">20761 18062 0,'18'0'16,"-1"0"-16,1 0 16,0 0-16,-1 0 15</inkml:trace>
   <inkml:trace contextRef="#ctx0" brushRef="#br1" timeOffset="586296.233">21026 18027 0,'17'0'15,"18"0"1</inkml:trace>
-  <inkml:trace contextRef="#ctx0" brushRef="#br1" timeOffset="586467.3943">21343 17956 0,'18'0'16,"17"0"-1,-17 0 1,-1 0 0,1 0-16</inkml:trace>
+  <inkml:trace contextRef="#ctx0" brushRef="#br1" timeOffset="586467.3942">21343 17956 0,'18'0'16,"17"0"-1,-17 0 1,-1 0 0,1 0-16</inkml:trace>
   <inkml:trace contextRef="#ctx0" brushRef="#br1" timeOffset="586585.3464">21643 17956 0,'18'0'16</inkml:trace>
-  <inkml:trace contextRef="#ctx0" brushRef="#br1" timeOffset="586735.2146">21802 17956 0,'17'0'16,"1"0"-1</inkml:trace>
+  <inkml:trace contextRef="#ctx0" brushRef="#br1" timeOffset="586735.2145">21802 17956 0,'17'0'16,"1"0"-1</inkml:trace>
   <inkml:trace contextRef="#ctx0" brushRef="#br1" timeOffset="589227.7448">21837 18009 0,'-18'0'109,"1"0"-93,-1 18-1,0-18-15,1 0 16,-1 18 0,0-18-16,1 0 15,17 17 1,-18-17-1,1 0-15,-1 0 16,0 0 0,-17 18-1,17-18-15,-17 0 16,17 0-16,1 18 16,-1-18-16,1 0 15,-19 17 1,19 1-1,-1-18 17,-17 0-32,17 17 15,-17-17 1,17 0 0,1 18-16,-1-18 15,0 0-15,1 0 16,-1 0-1,0 0-15,1 18 16,-1-18 0,-17 0-16,17 0 15,0 0-15,1 0 16,-1 17-16,1-17 0,-1 0 0,0 18 16,1-18-1,-1 0-15,0 0 16,18 18-16,-35-18 15,17 0-15,1 0 16,-1 0-16,-17 0 16,17 17-16,-17-17 15,17 0 1,-17 18-16,17-18 16,1 0-16,-1 0 15,-17 18 1,17-18-16,1 0 15,-1 0-15,0 0 0,1 0 16,-1 0-16,0 0 0,-17 0 16,17 0-1,1 17-15,-1-17 0,1 18 16,-1-18-16,-17 17 0,17-17 16,-35 18-16,18-18 15,17 18-15,1-18 16,-19 0-16,19 17 0,-19-17 15,-17 0-15,36 18 16,-1-18-16,-35 0 16,36 0-16,-19 0 0,19 0 15,-1 0-15,-17 18 0,-18-18 16,35 17 0,-17-17-16,0 18 15,-18-18-15,17 18 16,-16-1-1,16-17-15,-17 18 16,36-18-16,-19 17 16,19-17-16,-1-17 15</inkml:trace>
-  <inkml:trace contextRef="#ctx0" brushRef="#br1" timeOffset="590428.4899">24589 17004 0,'0'-18'0</inkml:trace>
-  <inkml:trace contextRef="#ctx0" brushRef="#br1" timeOffset="590641.7704">24624 16810 0,'0'0'0,"18"-35"0,-1 17 15,-17-17-15,18 17 16,-18 0-16,17 18 16,-17 18-16,0 17 15,0 18-15,-17-17 0,17 69 16,0-52-16,-18 53 15,18-53-15,0 18 16,0-36-16,0-18 16,0 19-16,18-19 15,-1 1-15,19-18 0,34 18 16,-34-18-16,-1-18 16,0 0-16</inkml:trace>
+  <inkml:trace contextRef="#ctx0" brushRef="#br1" timeOffset="590428.4898">24589 17004 0,'0'-18'0</inkml:trace>
+  <inkml:trace contextRef="#ctx0" brushRef="#br1" timeOffset="590641.7703">24624 16810 0,'0'0'0,"18"-35"0,-1 17 15,-17-17-15,18 17 16,-18 0-16,17 18 16,-17 18-16,0 17 15,0 18-15,-17-17 0,17 69 16,0-52-16,-18 53 15,18-53-15,0 18 16,0-36-16,0-18 16,0 19-16,18-19 15,-1 1-15,19-18 0,34 18 16,-34-18-16,-1-18 16,0 0-16</inkml:trace>
   <inkml:trace contextRef="#ctx0" brushRef="#br1" timeOffset="590945.2134">25012 17198 0,'18'-18'0,"17"1"15,-17-1-15,17 0 16,0-35-16,-17 53 15,-18-17-15,0-1 16,0 1-16,-18 17 0,0 0 16,-34 17-1,-1 18-15,17 1 16,1 17 0,35-18-16,0-17 0,0-1 0,71 18 15,-18-17-15,-18-18 16,53 0-1,-35-18-15,17-17 16</inkml:trace>
   <inkml:trace contextRef="#ctx0" brushRef="#br1" timeOffset="591262.1109">25329 17163 0,'-52'35'15,"16"0"1,36-17-16,-17 35 15,17-36-15,17-17 16,19 18-16,-19-18 16,36 0-16,-53-18 15,35 1-15,-35-1 16,18-17-16,-18 17 16,18-35-1,-18 36-15,17 17 0,1 17 31,0 1-31,-1 17 16,1 0-16,-1-35 16,19 18-16,-19-18 15,1 0-15,-18-18 16,0 1 0</inkml:trace>
   <inkml:trace contextRef="#ctx0" brushRef="#br1" timeOffset="591456.581">25559 16722 0,'17'106'16,"-17"-54"-16,36 72 15,-19-1 1,1-70-16,0 18 0,-1-36 15,1 53 1,0-70-16,-1-18 0,1 0 0</inkml:trace>
   <inkml:trace contextRef="#ctx0" brushRef="#br1" timeOffset="591663.8026">25718 17145 0,'-36'35'16,"1"18"-16,17-53 15,18 18-15,36 17 16,-19-35-16,1 18 16,0-18-16,34 17 15,-16-17-15,-19 0 0,1 0 16</inkml:trace>
   <inkml:trace contextRef="#ctx0" brushRef="#br1" timeOffset="592068.8618">25929 17180 0,'0'18'0,"0"0"15,0 17 1,18-18-16,-1-17 0,19 18 15,-19-18-15,19 18 16,-19-18-16,36-36 16,-35 19-1,-1-1 1,1 18-16,0 0 16,-18 18-16,0-1 0,17 72 15,1-54-15,0 18 0,-1 70 16,-17-70-1,0-17-15,0-1 16,-17-18-16,17 19 0,-18-36 0,-35 0 16,35-18-1,1-17-15,-1 0 16,18-18-16,0-53 16,18 71-16,35-54 15,-36 54-15,19 17 0,34-17 16,-52 17-16,17 18 15,0-35 1</inkml:trace>
   <inkml:trace contextRef="#ctx0" brushRef="#br1" timeOffset="592692.4171">27446 17268 0,'-18'0'0,"1"0"15,-18 0 1,17-17-16,0-18 0,1-54 16,17-16-1,0 52-15,0-18 16,17 1-16,19-54 16,-1 89-16,18-18 15,-18 35-15,0 1 0,36 34 16,-53 1-16,-1 52 15,-17-17-15,-35 36 16,17-54 0,-52 18-16,34-36 15,-34 19-15,52-36 16,1 17-16,34-17 16,1 18-16,17-18 0,36 18 15,-18-1 1,-18 1-16,53-18 15,-53 17-15,1-17 0</inkml:trace>
-  <inkml:trace contextRef="#ctx0" brushRef="#br1" timeOffset="593003.1752">27781 17074 0,'18'0'15,"35"0"1,-18-17-16,0 17 16,-17-18-1,0 1-15,-18-19 16,-36 36 0,19-17-16,-19 17 0,-16 17 15,34 1-15,0 0 16,18-1-16,-17 1 0,34 17 15,1-17-15,0-1 0,17 1 16,18 0-16,-18-18 0,18 17 16,35-17-1,-53-17-15,-17 17 0,17-18 16,-17 18-16,-18-18 16</inkml:trace>
+  <inkml:trace contextRef="#ctx0" brushRef="#br1" timeOffset="593003.1751">27781 17074 0,'18'0'15,"35"0"1,-18-17-16,0 17 16,-17-18-1,0 1-15,-18-19 16,-36 36 0,19-17-16,-19 17 0,-16 17 15,34 1-15,0 0 16,18-1-16,-17 1 0,34 17 15,1-17-15,0-1 0,17 1 16,18 0-16,-18-18 0,18 17 16,35-17-1,-53-17-15,-17 17 0,17-18 16,-17 18-16,-18-18 16</inkml:trace>
   <inkml:trace contextRef="#ctx0" brushRef="#br1" timeOffset="593313.8544">28293 16581 0,'0'35'16,"0"0"-16,17 36 15,-17-36-15,0 71 16,0-71-16,0 53 16,18-52-16,-18-1 0,18 18 15,-1-18 1,1-35-16,0 0 16,17 0-16,0 0 15,-17 0-15,35 0 16,-36 0-16,1 0 0,0 0 15</inkml:trace>
   <inkml:trace contextRef="#ctx0" brushRef="#br1" timeOffset="593774.8183">28769 16739 0,'-18'18'16,"18"0"-16,18 17 16,-18 0-16,18 18 0,17 53 15,-17-53-15,17 35 16,-17-53-16,17-17 15,18 35 1,-36-36-16,19-17 0,17 0 16,-36-17-1,1-1-15,17-35 16,-17 18-16,-18 0 0,0-1 0,0-34 16,0 17-1,0 0-15,-18 18 0,0-18 16,1 18-16,-1 52 15,18 1-15,0 70 16,-17 18 0,34-71-16,1 18 15,-1 0-15,19 35 16,-19-53-16,19 18 16,-19-35-16,1 0 0</inkml:trace>
-  <inkml:trace contextRef="#ctx0" brushRef="#br2" timeOffset="630174.2872">23795 13141 0,'0'18'15,"0"-1"-15,0 19 0,0-19 0,18 71 16,-18-52 0,17-1-16,-17 18 0,18-18 15,-1 18-15,-17-18 0,18 1 16,-18-1-16,18 0 0,-18-17 16,0 17-16,0-17 15,0-1-15,-18-17 16,18 18-1</inkml:trace>
+  <inkml:trace contextRef="#ctx0" brushRef="#br2" timeOffset="630174.2871">23795 13141 0,'0'18'15,"0"-1"-15,0 19 0,0-19 0,18 71 16,-18-52 0,17-1-16,-17 18 0,18-18 15,-1 18-15,-17-18 0,18 1 16,-18-1-16,18 0 0,-18-17 16,0 17-16,0-17 15,0-1-15,-18-17 16,18 18-1</inkml:trace>
   <inkml:trace contextRef="#ctx0" brushRef="#br2" timeOffset="630620.0229">23530 13476 0,'-17'0'0,"34"0"16,-17-18-1,18 1-15,17-36 16,-17 35-16,-1 1 0,-17-1 16,18-17-16,0-1 15,-18 19-15,17-18 16,1-1-16,-18 19 16,18-1-16,-1 0 0,1 1 15,0 17-15,-1 0 16,1 0-16,17 17 15,-17 1 1,-1 0-16,1-1 16,0 1-16,-1 0 0,19-1 15,-19 1 1</inkml:trace>
   <inkml:trace contextRef="#ctx0" brushRef="#br2" timeOffset="631281.6019">23001 17057 0,'18'53'16,"-1"0"-16,1 35 16,0-18-16,17-17 15,0 71-15,-17-71 16,0 0-16,-1-18 0,18 18 16,-35-36-16,18-17 15</inkml:trace>
   <inkml:trace contextRef="#ctx0" brushRef="#br2" timeOffset="631616.9657">22789 17515 0,'0'-17'16,"18"-1"-16,0 1 0,17-72 16,-17 54-16,17-71 15,-17 71 1,17-53-16,-35 70 16,17-17-16,1-18 15,0 18-15,-18 17 0,0 0 16,17 18-1,1 36 1,-18-19-16,18 1 0,17 17 16,0-17-1,-17-1-15,0 1 0,17 0 16</inkml:trace>
@@ -506,7 +509,7 @@
   <inkml:trace contextRef="#ctx0" brushRef="#br2" timeOffset="670614.9987">20567 13899 0,'35'36'15,"-17"-1"-15,0 18 16,-1-35-16,-17 17 0,18 0 16,-1 0-16,1-17 15,0-18-15,-1 0 16,1 0-16,17 0 15,-17-18-15,52-35 16,-34 18-16,34-35 16,-52 34-16,17 1 0,-17 17 15,-1 1-15</inkml:trace>
   <inkml:trace contextRef="#ctx0" brushRef="#br2" timeOffset="690062.1008">25418 10989 0,'-18'0'16,"0"0"-16,1 0 16,-1 0-16,36 0 31,17 0-15,-17 0-16,52 18 15,-52-18-15,17 17 16,-17-17-16,-1 18 15,1 17-15,-18-17 16,-18 0-16,1 17 0,-19-18 16,-16 54-16,34-53 15,0-1-15,1 1 0,17 0 16,0-1 0,17 1-16,36-18 15,-35-18-15,35 18 16,-53-17-16,17-1 15</inkml:trace>
   <inkml:trace contextRef="#ctx0" brushRef="#br2" timeOffset="690208.0716">25312 11183 0,'53'0'16,"-36"0"-16,19 0 15,34 0-15,-35 0 16,1 0-16,-19 0 16</inkml:trace>
-  <inkml:trace contextRef="#ctx0" brushRef="#br2" timeOffset="690531.1839">25770 10971 0,'18'18'0,"17"-18"16,1 0-16,17 18 16,-1-18-16,-16 0 15,-1 17-15,18 1 16,-18 0-16,-35-1 0,18 19 15,-18-19 1,-18 1-16,1-1 0,-19 1 16,-17 17-16,18-17 15,0 0-15,17-18 0,-17 17 16,17 1 0,18 0-1,18-18-15</inkml:trace>
+  <inkml:trace contextRef="#ctx0" brushRef="#br2" timeOffset="690531.1838">25770 10971 0,'18'18'0,"17"-18"16,1 0-16,17 18 16,-1-18-16,-16 0 15,-1 17-15,18 1 16,-18 0-16,-35-1 0,18 19 15,-18-19 1,-18 1-16,1-1 0,-19 1 16,-17 17-16,18-17 15,0 0-15,17-18 0,-17 17 16,17 1 0,18 0-1,18-18-15</inkml:trace>
   <inkml:trace contextRef="#ctx0" brushRef="#br2" timeOffset="690835.9574">26582 11095 0,'-35'35'0,"-36"36"15,53-1 1,18-17-16,18 0 16,53-18-1,-19-35-15,1 0 0,53-17 16,-53-19-16,53-16 16,-71 16-16,18-52 15,-53 53-15,-53-53 16,18 52-16,-71 1 15,53 35-15,-53 18 16,53-1 0</inkml:trace>
 </inkml:ink>
 </file>
@@ -537,10 +540,10 @@
   </inkml:definitions>
   <inkml:trace contextRef="#ctx0" brushRef="#br0">21678 9666 0,'18'0'0,"35"-18"16,0 18-16,17-17 15,-17 17-15,53-35 16,-71 35-16,36-36 16</inkml:trace>
   <inkml:trace contextRef="#ctx0" brushRef="#br0" timeOffset="200.2853">21943 9172 0,'0'18'0,"0"88"16,17 17-1,-17-52-15,36 52 16,-19-52-16,19 35 15,-19-71-15,54 35 16,-36-52-16,18-18 16</inkml:trace>
-  <inkml:trace contextRef="#ctx0" brushRef="#br0" timeOffset="668.5528">22313 9701 0,'-35'36'16,"17"-1"-16,-17 36 16,35-19-1,0-34-15,18 0 0,-1-18 0,54 0 16,-54 0 0,19-18-16,-1-17 0,-17 17 15,17-35-15,-35 18 16,0 17-16,0-17 0,0 17 15,0 1-15,0-1 16,0 36 0,0 17-16,0 0 15,0 1-15,18-1 0,-1-17 16,-17-1-16,36 1 0,-19-1 16,1-17-16,-1 0 15,-17-17 1,0-18-1,0-1-15,0 19 0,0-1 16,18 0-16,-18 1 0,18-1 16,17 18-16,-17 0 15,17 35-15,-17-17 16,17 35 0,-18-35-16,1 34 15,0-34-15,-1 17 16,-17-17-16,18 0 15</inkml:trace>
+  <inkml:trace contextRef="#ctx0" brushRef="#br0" timeOffset="668.5527">22313 9701 0,'-35'36'16,"17"-1"-16,-17 36 16,35-19-1,0-34-15,18 0 0,-1-18 0,54 0 16,-54 0 0,19-18-16,-1-17 0,-17 17 15,17-35-15,-35 18 16,0 17-16,0-17 0,0 17 15,0 1-15,0-1 16,0 36 0,0 17-16,0 0 15,0 1-15,18-1 0,-1-17 16,-17-1-16,36 1 0,-19-1 16,1-17-16,-1 0 15,-17-17 1,0-18-1,0-1-15,0 19 0,0-1 16,18 0-16,-18 1 0,18-1 16,17 18-16,-17 0 15,17 35-15,-17-17 16,17 35 0,-18-35-16,1 34 15,0-34-15,-1 17 16,-17-17-16,18 0 15</inkml:trace>
   <inkml:trace contextRef="#ctx0" brushRef="#br0" timeOffset="1052.2672">22789 9155 0,'18'70'15,"0"-17"-15,-1 18 0,1-1 16,17 71 0,-35-70-16,36 52 15,-36-70-15,17 18 16,-17-54-16,0 1 15,18-36 1,-18-34 0,17 34-16,1-17 15,0 17-15,-1 18 0,19-18 16,-1 36-16,0 0 16,-17 17-16,0-17 15,-1 34 1,-17-34-16,0 0 0,18-1 15,-18 1-15</inkml:trace>
   <inkml:trace contextRef="#ctx0" brushRef="#br0" timeOffset="1535.497">23601 9402 0,'17'17'15,"1"1"-15,-18-1 16,18 1-16</inkml:trace>
-  <inkml:trace contextRef="#ctx0" brushRef="#br0" timeOffset="1665.8102">23689 9754 0,'18'0'15</inkml:trace>
+  <inkml:trace contextRef="#ctx0" brushRef="#br0" timeOffset="1665.8101">23689 9754 0,'18'0'15</inkml:trace>
   <inkml:trace contextRef="#ctx0" brushRef="#br0" timeOffset="2614.9343">24924 9560 0,'0'-17'15,"0"-1"-15,0 0 16,-18 1 0,0 17-16,1-18 15,-18 18-15,-1 18 16,19-1-16,-19 1 0,1 17 15,-18 36 1,36-54-16,17 19 0,0-19 16,0 1-16,35 17 15,-18-35-15,36 0 16,-17 0-16,-19-17 0,19-19 16,-19 19-16,1-19 15,-1 36 1,-17-17-16,18 34 31,0 19-31,-1-1 16,19 0-1,-1-17-15,36 0 16,-36-1-16,0-17 16</inkml:trace>
   <inkml:trace contextRef="#ctx0" brushRef="#br0" timeOffset="2771.6704">25312 9437 0,'17'0'16,"1"0"-16,35 17 16,-35 1-1,-1-18 1</inkml:trace>
   <inkml:trace contextRef="#ctx0" brushRef="#br0" timeOffset="2886.9071">25347 9631 0,'18'17'0,"35"1"16,-36-18 0,19 0-16,16 0 15</inkml:trace>
@@ -551,9 +554,9 @@
   <inkml:trace contextRef="#ctx0" brushRef="#br0" timeOffset="4577.7621">28328 8961 0,'71'-18'16,"-36"0"-16,35-17 15,-52 17-15,35-35 16,-53 36-16,0-1 0,-18 18 16,-17-17-16,-35 17 15,34 17-15,19-17 0,-19 35 16,19-17-16,-1 17 16,0-17-16,18 70 15,18-70-15,0 17 0,52 18 16,-17-53-1,0 18-15,35-18 0,-52 0 16,34-36 0,-35 19-16</inkml:trace>
   <inkml:trace contextRef="#ctx0" brushRef="#br0" timeOffset="4902.4051">28875 8573 0,'18'-18'16,"-1"18"0,1 0-16,-1-18 0,1 18 15,17 0-15</inkml:trace>
   <inkml:trace contextRef="#ctx0" brushRef="#br0" timeOffset="5156.2626">29175 8431 0,'35'18'15,"-17"-18"1,-18 35-1,0-17-15,-18 17 16,0 18-16,1-35 16,17 17-16,17 18 15,1-35-15,0-1 0,-1 1 16,1 0-16,0-18 16,-1 17-16,18-17 15,-35-17-15,0-1 16,-17 0-16</inkml:trace>
-  <inkml:trace contextRef="#ctx0" brushRef="#br0" timeOffset="5286.0387">29157 8608 0,'53'17'16,"-18"-17"-16,18 0 0,18 18 16,-18-18-16,0 0 15,-53 18 1,-18-1-1</inkml:trace>
+  <inkml:trace contextRef="#ctx0" brushRef="#br0" timeOffset="5286.0386">29157 8608 0,'53'17'16,"-18"-17"-16,18 0 0,18 18 16,-18-18-16,0 0 15,-53 18 1,-18-1-1</inkml:trace>
   <inkml:trace contextRef="#ctx0" brushRef="#br0" timeOffset="5712.1329">26511 9419 0,'106'0'16,"159"-17"0,229 17-1,-318-18-15,36 18 0,229-18 16,-230 1-16,213-1 15,-230 0-15,-18-17 16,-53 35-16,54-35 16,-159 35-16</inkml:trace>
-  <inkml:trace contextRef="#ctx0" brushRef="#br0" timeOffset="6134.7793">26846 10072 0,'36'0'16,"34"0"-1,-17-18-15,-35 1 16,-1-1 0,-17 0-16,-17 1 0,-1-1 15,-17 18-15,0 0 16,-18 53-1,53-35-15,-18 52 16,18-35-16,35 18 16,1-35-16,34 17 15,-17-35-15,35 0 16,-52-17-16,34-19 16,-52 19-16,-1-1 15</inkml:trace>
+  <inkml:trace contextRef="#ctx0" brushRef="#br0" timeOffset="6134.7792">26846 10072 0,'36'0'16,"34"0"-1,-17-18-15,-35 1 16,-1-1 0,-17 0-16,-17 1 0,-1-1 15,-17 18-15,0 0 16,-18 53-1,53-35-15,-18 52 16,18-35-16,35 18 16,1-35-16,34 17 15,-17-35-15,35 0 16,-52-17-16,34-19 16,-52 19-16,-1-1 15</inkml:trace>
   <inkml:trace contextRef="#ctx0" brushRef="#br0" timeOffset="6391.3154">27287 9666 0,'53'-18'16,"35"1"-16,-35 34 15,-17 19 1,-36 17-1,-18 17-15,0-34 16,18-19-16,-17 36 16,17-35-16,0-1 15,17-17-15,-17-17 32,0-36-17,0 35-15</inkml:trace>
   <inkml:trace contextRef="#ctx0" brushRef="#br0" timeOffset="6507.1691">27393 9754 0,'18'0'31,"35"18"-31,-18-18 16,18 0-16,-18 0 16,18-18-1</inkml:trace>
   <inkml:trace contextRef="#ctx0" brushRef="#br0" timeOffset="6696.6102">27764 9913 0,'53'0'16,"-1"18"-16,19-36 15,-36 18-15,1-18 0,-1 18 0,-18-17 16,1-1-16,-18 1 16</inkml:trace>
@@ -564,10 +567,10 @@
   <inkml:trace contextRef="#ctx0" brushRef="#br0" timeOffset="12191.7448">1711 17815 0,'71'141'15,"-54"-70"-15,36 70 16,0-17-1,-35-107-15,-18 1 0,0-36 16,-36-88 0,-34-52-1,52 69-15,-17 19 0,17-18 16,-17-1-16,35-52 16,0 88-16,53 1 15,-35 34-15,34 18 16,-16 18-16,-19-1 15,36 54 1,-53-18-16,0 0 0,0-1 0,-17 37 16,-1-36-16,-35 35 15,35-53-15,1 18 16,17-35 0,17 17-16,19-35 15,17 18-15,-18-18 16,18 0-16,-18 0 15,18 17-15,-35-17 16,-1 18 0</inkml:trace>
   <inkml:trace contextRef="#ctx0" brushRef="#br0" timeOffset="12486.9482">2293 18133 0,'18'0'0,"-1"-18"16,1 1-16,-18-19 16,18 19-16,-18-1 15,-18 0-15,0-17 16,-17 17-16,0 18 16,0 18-16,17 0 15,-17 17-15,35 0 16,0-17-16,17 52 15,19-52-15,-1 0 0,0-1 16,71-17 0,-53-17-16,-18-1 15,18-17-15,-18 17 0,1 1 0,-19-19 16,1 19-16</inkml:trace>
   <inkml:trace contextRef="#ctx0" brushRef="#br0" timeOffset="12730.7221">2593 17463 0,'0'52'16,"0"19"-1,18 35 1,-1-53-16,1 70 15,35-17-15,-36-71 0,19 1 16,34 17 0,-34-53-16,-1 0 0,0 0 15,36-18-15,-54 0 16</inkml:trace>
-  <inkml:trace contextRef="#ctx0" brushRef="#br0" timeOffset="13114.0719">3069 17551 0,'0'88'16,"0"-35"-16,35 106 15,-35-107 1,18 1-16,17 0 0,1 0 15,-1-35 1,0-18-16,-17 0 0,17-18 16,0-35-16,-35 18 15,18-18-15,-18 0 0,18 18 16,-18-71 0,0 53-16,-18-35 15,18 53-15,0 17 0,0 36 16,0-1-16,18 72 15,-1-19-15,1 1 16,0 52 0,-1-88-16,1 18 0,0-35 0,-1 35 15,1-53 1,-1 18-16</inkml:trace>
+  <inkml:trace contextRef="#ctx0" brushRef="#br0" timeOffset="13114.0718">3069 17551 0,'0'88'16,"0"-35"-16,35 106 15,-35-107 1,18 1-16,17 0 0,1 0 15,-1-35 1,0-18-16,-17 0 0,17-18 16,0-35-16,-35 18 15,18-18-15,-18 0 0,18 18 16,-18-71 0,0 53-16,-18-35 15,18 53-15,0 17 0,0 36 16,0-1-16,18 72 15,-1-19-15,1 1 16,0 52 0,-1-88-16,1 18 0,0-35 0,-1 35 15,1-53 1,-1 18-16</inkml:trace>
   <inkml:trace contextRef="#ctx0" brushRef="#br0" timeOffset="13943.0238">5380 17815 0,'-18'-17'0,"-35"17"15,36 17 1,-1-17-16,0 36 16,18-1-16,-17-18 0,17 1 15,0 17-15,0-17 0,17 0 16,1-1-16,0-17 15,-1 0-15,19-17 16,-19-1-16,-17 0 16,0 1-16,18-1 0,-18 0 15,0 1 1,0 34 0,35 19-1,18-1-15,-18-17 16,36-18-1,-36 0-15,36 0 16,-36-18-16,-17 0 16</inkml:trace>
   <inkml:trace contextRef="#ctx0" brushRef="#br0" timeOffset="14092.1057">5750 17586 0,'0'0'0,"18"0"0,0 0 0,34 18 16,-34-18-16,35 0 16,-35 0-1</inkml:trace>
-  <inkml:trace contextRef="#ctx0" brushRef="#br0" timeOffset="14205.3756">5821 17745 0,'17'17'15,"19"1"-15,17-36 16,-36 1-16,19 17 16,-1-18-16</inkml:trace>
+  <inkml:trace contextRef="#ctx0" brushRef="#br0" timeOffset="14205.3755">5821 17745 0,'17'17'15,"19"1"-15,17-36 16,-36 1-16,19 17 16,-1-18-16</inkml:trace>
   <inkml:trace contextRef="#ctx0" brushRef="#br0" timeOffset="14844.7508">6544 17621 0,'18'88'16,"-18"-35"-16,35 36 15,-35-54-15,18 0 0,-1-35 16,-17-18 0,0-52-1,0 17-15,0 0 0,-17-53 16,-1 53 0,18 18-16,-18 0 0,18 52 31,18 54-31,0-18 15,-1 0-15,-17-36 0,18 19 16,17-19-16,0-17 16,-17 0-16,17-35 15,-17-18 1,-18 36-16,18-1 16,-1 18-1,19 18-15,-19-18 16,1 35-16,-1-18 15,19 54-15,-19-36 0,1 1 16,0-19-16,17 36 16,-17-53-16,34 0 15</inkml:trace>
   <inkml:trace contextRef="#ctx0" brushRef="#br0" timeOffset="15172.5021">7179 17568 0,'-35'36'16,"-1"69"-1,36-69-15,18 52 16,0-70 0,-1-1-16,1-17 0,0 0 15,17 0-15,-17-17 16,-1-1-16,-17-17 15,0 17-15,0-17 16,-17-1-16,-1 19 0,18-1 16,-18 18-1,18 18-15,18-1 16,35 72 0,-35-54-16,17-17 15,0-18-15,18 17 16,-18-17-16,-17 0 0,0 0 15,-1-17-15</inkml:trace>
   <inkml:trace contextRef="#ctx0" brushRef="#br0" timeOffset="15789.0794">7602 17498 0,'-17'0'16,"34"17"-16,-17 19 15,36-1-15,17 53 16,-1-53-16,19 36 16,-36-53-16,18 17 15,-17-35-15,16-18 16,-52 1-16</inkml:trace>
@@ -580,13 +583,13 @@
   <inkml:trace contextRef="#ctx0" brushRef="#br0" timeOffset="17329.8966">9984 17145 0,'88'88'15,"-53"-35"-15,36 53 16,-1-18-16,-52-17 15,-1-18-15,1 17 0,-18 1 16,0 17-16,-18 53 16,-17-88-16</inkml:trace>
   <inkml:trace contextRef="#ctx0" brushRef="#br0" timeOffset="22294.9867">20567 17515 0,'0'0'0,"0"-35"0,0 0 16,0 70 15,18 71-15,-1 53-16,1-71 15,0 53-15,-1-70 16,18 34-16,-17-69 16,0-1-16,17-17 15,0-1-15,1 1 0,16 0 16,-16-36-16,-1 18 15,0-18-15</inkml:trace>
   <inkml:trace contextRef="#ctx0" brushRef="#br0" timeOffset="22585.0753">21061 18133 0,'17'0'0,"1"17"16,0 1-1,-1-18-15,19 0 0,-19 0 0,36-35 16,-35 17-16,0 18 16,-18-53-1,0 36-15,-18-1 16,0 0-16,-17 18 0,17-17 0,-17 17 16,-36 17-16,36 1 15,18 53 1,17-36-16,0-18 0,35 19 15,35 17-15,-17-36 16,71 1-16,-54-18 16,-17-18-16,0 1 15</inkml:trace>
-  <inkml:trace contextRef="#ctx0" brushRef="#br0" timeOffset="22896.6405">21537 18098 0,'-53'52'15,"0"54"1,53-70 0,18-19-16,0 1 15,52-36-15,-17 1 16,-18-19-16,-17 19 16,0-36-16,-1 17 15,-17-16 1,-17 52-16,17-18 15,0 36 1,0 17-16,0 0 16,17-17-16,1 35 15,17-36-15,-17-17 0,35 18 16,-36-18 0,1-18-16,0 1 15,-18-36-15</inkml:trace>
+  <inkml:trace contextRef="#ctx0" brushRef="#br0" timeOffset="22896.6404">21537 18098 0,'-53'52'15,"0"54"1,53-70 0,18-19-16,0 1 15,52-36-15,-17 1 16,-18-19-16,-17 19 16,0-36-16,-1 17 15,-17-16 1,-17 52-16,17-18 15,0 36 1,0 17-16,0 0 16,17-17-16,1 35 15,17-36-15,-17-17 0,35 18 16,-36-18 0,1-18-16,0 1 15,-18-36-15</inkml:trace>
   <inkml:trace contextRef="#ctx0" brushRef="#br0" timeOffset="23080.2566">21731 17551 0,'35'106'16,"-17"-36"-16,17 54 15,-17-54-15,17-17 0,1 88 16,-19-88-1,18 0-15,1 0 16,-19-35-16,19-1 16,-19-34-16</inkml:trace>
   <inkml:trace contextRef="#ctx0" brushRef="#br0" timeOffset="23253.9544">22031 18027 0,'-18'35'15,"-17"-17"1,17 0-16,18-1 16,0 1-16,36-1 15,-19 1-15,19 0 0,-1-1 16,35 1-16,-34-18 16,-19 0-1</inkml:trace>
   <inkml:trace contextRef="#ctx0" brushRef="#br0" timeOffset="23619.2281">22260 18150 0,'-17'18'16,"17"0"-1,17-18 1,1 17-16,17-17 16,0 0-16,-17 0 0,0 0 15,17-17-15,-17 17 16,-18 17 15,17 36-31,1-35 16,35 70-16,-35-53 15,34 54-15,-34-72 16,0 36 0,-18-35-16,-18-18 15,-35 0 1,36-36-16,-36-16 15,53 16-15,-18-52 16,18 35-16,18 18 0,35-36 16,-18 54-1,0-1-15,53 0 16,-52 18-16,-19 0 0,1 0 16</inkml:trace>
   <inkml:trace contextRef="#ctx0" brushRef="#br0" timeOffset="24343.0445">23495 17568 0,'18'89'16,"-1"-19"-16,19 36 15,-19-36-15,1-17 16,-18 0-16,17-17 0,-17-19 16,0 1-16,0-36 15,0 1-15,0-19 16,-17-17-16,-1-52 16,18 52-16,-17-36 15,34 37-15,1-1 0,-1 0 16,19 17-16,-1 19 0,36 17 15,-36 0 1,-17 0-16,-1 70 16,-17-17-16,0 0 15,-17-18-15,-19 36 0,19-36 16,-1 1-16,-35-1 16,35-18-16,18 1 15,0 0 1,18-18-16,35 35 15,-18-17-15,18 17 16,-18-17-16,1-1 16,-1-17-16,-17 0 15</inkml:trace>
   <inkml:trace contextRef="#ctx0" brushRef="#br0" timeOffset="24614.8761">23989 17974 0,'18'0'16,"-1"-18"-16,1-17 15,-18 17 1,0 1 0,-18 17-1,1 0-15,-1 17 16,0 19-16,1 17 15,17-18-15,17 18 16,1-35-16,17-1 0,36 1 16,-36-18-1,0 0-15,53-35 16,-70-1-16,17 19 0</inkml:trace>
-  <inkml:trace contextRef="#ctx0" brushRef="#br0" timeOffset="24852.6013">24271 17445 0,'0'53'16,"35"88"0,-35-35-1,18-36-15,-18-17 16,18 0-16,17 35 15,18-35 1,-35-35-16,52 17 16,-52-35-16,52 18 15,-52-18-15,17 0 0,-17 0 16</inkml:trace>
+  <inkml:trace contextRef="#ctx0" brushRef="#br0" timeOffset="24852.6012">24271 17445 0,'0'53'16,"35"88"0,-35-35-1,18-36-15,-18-17 16,18 0-16,17 35 15,18-35 1,-35-35-16,52 17 16,-52-35-16,52 18 15,-52-18-15,17 0 0,-17 0 16</inkml:trace>
   <inkml:trace contextRef="#ctx0" brushRef="#br0" timeOffset="25349.5547">24783 17621 0,'0'18'16,"0"17"0,0 0-16,17 1 0,1 70 15,0-54-15,34 37 16,-16-54-16,17 0 16,-18-17-16,18-18 15,-35-18 1,17 1-16,-18-19 0,1-34 15,-18 34-15,0 1 16,0-35-16,0 34 16,0-52-1,-18 53-15,18 0 0,-17 17 0,-1 0 16,18 1-16,0-1 16,0 36-16,-17 35 15,17-18-15,17 18 0,1 35 16,-1-35-16,1 0 15,17 35-15,-17-53 16,0 1-16,-1 17 16,1-36-16,-18 1 15,0-1-15</inkml:trace>
   <inkml:trace contextRef="#ctx0" brushRef="#br0" timeOffset="26923.4244">26494 17798 0,'-18'-18'16,"18"0"-16,-35 1 15,17 17-15,0 0 16,-34 0-16,34 35 16,-35 53-1,35-53-15,1 71 16,17-70-16,17-1 0,36 0 16,-17-35-16,-1 0 15,0 0-15,0-17 16,1-19-16,-1 1 0,-17 0 15,-1-18-15,-17 17 0,0-34 16,0 35-16,-17-1 16,-1 36-16,0 0 15,-17 18-15,35 17 16,0 1-16,0-1 16,0 0-16,18 0 0,17 1 15,0-1-15,0-17 0,54-1 16,-54-17-16,0 0 15,-17-17-15</inkml:trace>
   <inkml:trace contextRef="#ctx0" brushRef="#br0" timeOffset="27055.0163">26793 17745 0,'0'0'0,"18"0"15,35-18-15,-35 18 16,35-18-1,-36 18-15,1 18 0</inkml:trace>
@@ -607,24 +610,458 @@
   <inkml:trace contextRef="#ctx0" brushRef="#br0" timeOffset="32566.062">31344 17198 0,'89'53'0,"16"0"16,-34 0-16,88 53 16,-106-54-16,-1 19 15,-16 0-15,-19 52 16,-17-70-16,-70 70 15,35-70-15,-18 0 16,-53 35-16</inkml:trace>
   <inkml:trace contextRef="#ctx0" brushRef="#br0" timeOffset="43623.3348">29457 18062 0,'0'18'16,"0"-36"31,0 36 31,0-36-47,-18 18 1,1 0 30,17-17-46,-18 17-1,0 0 32,36 0 0,-18-18-16,0 0-15,-18 18 0,18 18-1,0 0 1,0-1-1,18-17 1,0 0 0,-18-17-16,0-1 15,0 0 1,0 1 15,0 34-15,-18-17-1,18 18 1,18 0 0,-36-1 31</inkml:trace>
   <inkml:trace contextRef="#ctx0" brushRef="#br0" timeOffset="50231.8339">29580 17233 0,'0'-17'16,"36"-54"-1,-19 18 1,1 0-16,17-17 0,-17-1 0,35-123 16,-18 88-1,-17-17-15,-1-1 16,19 1-16,-36-1 0,17-105 15,-17 123-15,18-17 16,-18 87-16,-18 19 16,1 34-1,-1 54-15</inkml:trace>
-  <inkml:trace contextRef="#ctx0" brushRef="#br0" timeOffset="50629.8917">29492 17216 0,'0'0'0,"18"17"31,0 18-15,-1-17-16,1 35 15,-1-35 1,-17-1-16,36 1 0,-36 0 16,17-18-16,1-18 0,35-35 15,-35 18 1,52-36-16,-35 36 16,-17 0-16,17-1 0</inkml:trace>
+  <inkml:trace contextRef="#ctx0" brushRef="#br0" timeOffset="50629.8916">29492 17216 0,'0'0'0,"18"17"31,0 18-15,-1-17-16,1 35 15,-1-35 1,-17-1-16,36 1 0,-36 0 16,17-18-16,1-18 0,35-35 15,-35 18 1,52-36-16,-35 36 16,-17 0-16,17-1 0</inkml:trace>
   <inkml:trace contextRef="#ctx0" brushRef="#br0" timeOffset="51275.8557">29386 14640 0,'0'-17'15,"0"-19"-15,-17 19 16,17-19-16,0 19 16,-18 17-16,0 17 31,1 72-31,-1-36 16,18-1-16,18 19 15,-1-36-15,1-17 0,17 0 16,-17-1-1,0-17-15,-1-17 0,1-1 16,0-17-16,-1-18 16,-17 17-16,0 1 0,-17 0 15,-1 17-15,-17-35 16,17 36-16,0-1 16,1 18-1,17 18-15,17-1 0,-17 1 16</inkml:trace>
-  <inkml:trace contextRef="#ctx0" brushRef="#br0" timeOffset="51433.0287">29722 14728 0,'-18'0'15,"18"18"1,-18-18-16,36 0 15</inkml:trace>
+  <inkml:trace contextRef="#ctx0" brushRef="#br0" timeOffset="51433.0286">29722 14728 0,'-18'0'15,"18"18"1,-18-18-16,36 0 15</inkml:trace>
   <inkml:trace contextRef="#ctx0" brushRef="#br0" timeOffset="51725.7308">29898 14587 0,'-35'0'0,"17"36"16,-17-1 0,35 0-16,0 18 15,17-18-15,36-17 16,-35 0-16,35-18 16,-18-18-16,0 0 15,1 1-15,-19-1 0,1-17 0,-18 17 16,0-35-1,-18 36-15,1-1 0,-1 0 16,0 18-16,-35-17 16,18 17-16,18 0 0,-1 17 15,18 1-15</inkml:trace>
   <inkml:trace contextRef="#ctx0" brushRef="#br0" timeOffset="52036.3421">30321 14464 0,'0'-18'0,"0"36"31,0 52-15,0-17-16,0 0 0,0-17 0,18 69 16,0-52-1,-1 0-15,1-17 16,-1-36-16</inkml:trace>
-  <inkml:trace contextRef="#ctx0" brushRef="#br0" timeOffset="52927.7777">30674 14587 0,'0'0'16,"0"-17"-16,0 34 31,35-17-15,-17 18-16,0-18 0,35 18 15,-36-1 1,1 19-16,-18-19 15,0 36 1,-18-35-16,1 35 16,17-36-16,0 19 15,0-19 1,35 1 0,-18-18-16,1 0 0,17 0 15,-17 0 1,-18-18-16,18 18 15,-36 0-15</inkml:trace>
-  <inkml:trace contextRef="#ctx0" brushRef="#br0" timeOffset="53083.7517">30727 14728 0,'18'0'0,"70"-17"15,-53 17-15,36 0 16,-54 17 0,1-17-16</inkml:trace>
+  <inkml:trace contextRef="#ctx0" brushRef="#br0" timeOffset="52927.7776">30674 14587 0,'0'0'16,"0"-17"-16,0 34 31,35-17-15,-17 18-16,0-18 0,35 18 15,-36-1 1,1 19-16,-18-19 15,0 36 1,-18-35-16,1 35 16,17-36-16,0 19 15,0-19 1,35 1 0,-18-18-16,1 0 0,17 0 15,-17 0 1,-18-18-16,18 18 15,-36 0-15</inkml:trace>
+  <inkml:trace contextRef="#ctx0" brushRef="#br0" timeOffset="53083.7516">30727 14728 0,'18'0'0,"70"-17"15,-53 17-15,36 0 16,-54 17 0,1-17-16</inkml:trace>
   <inkml:trace contextRef="#ctx0" brushRef="#br0" timeOffset="53661.4809">31238 14852 0,'0'0'0,"0"18"0,0-1 16,0 19 0,-17-1-16,17-18 0,-18 36 15,18-35-15,-17 0 16,17-1-16</inkml:trace>
-  <inkml:trace contextRef="#ctx0" brushRef="#br0" timeOffset="66902.9452">31609 14623 0,'0'-18'16,"0"0"0,18 1-1,-36 17 32,18 17 0,18-17-31,-1 18-1,1-18-15,17 18 16,-17-1-16,-1-17 16,-17 18-16,18-18 15,-18 18-15,0-1 16,0 1-16,-18-1 15,-17 19-15,35-1 16,-18 18-16,18-35 16,0 35-16,18-18 15,35 0 1,-35-17-16,-1-18 16,1 17-16,17-17 0,-17 0 0,17-35 15,-35 17-15,0 1 16</inkml:trace>
+  <inkml:trace contextRef="#ctx0" brushRef="#br0" timeOffset="66902.9451">31609 14623 0,'0'-18'16,"0"0"0,18 1-1,-36 17 32,18 17 0,18-17-31,-1 18-1,1-18-15,17 18 16,-17-1-16,-1-17 16,-17 18-16,18-18 15,-18 18-15,0-1 16,0 1-16,-18-1 15,-17 19-15,35-1 16,-18 18-16,18-35 16,0 35-16,18-18 15,35 0 1,-35-17-16,-1-18 16,1 17-16,17-17 0,-17 0 0,17-35 15,-35 17-15,0 1 16</inkml:trace>
   <inkml:trace contextRef="#ctx0" brushRef="#br0" timeOffset="67042.1376">31556 14817 0,'35'17'16,"18"-17"-16,18 18 15,-36-18-15,0-18 0,36 18 16,-54 0-1</inkml:trace>
   <inkml:trace contextRef="#ctx0" brushRef="#br0" timeOffset="67252.1266">32068 14323 0,'70'88'16,"-35"-35"-16,1 17 0,-19-17 0,1 18 15,-18 52 1,-35-17-16,-36 0 16,18-53-16</inkml:trace>
-  <inkml:trace contextRef="#ctx0" brushRef="#br0" timeOffset="68170.7226">29069 14129 0,'-35'0'16,"17"17"-16,-17 1 15,-1 53-15,19-18 16,-1-1-16,1 19 0,17 0 16,0 52-16,17-70 15,1 0-15,-1-18 0,1 18 16,17 0-1,-17-35-15</inkml:trace>
-  <inkml:trace contextRef="#ctx0" brushRef="#br0" timeOffset="68826.8129">27693 14605 0,'0'18'0,"18"-1"0,-18 1 16,0 0-16,-18 17 15,18-18-15,0 19 0,0-19 16,-18-17-1,18-17 1,0-36 0,18 18-16,-18-1 0,18-17 15,-1 18-15,1 17 16,0 1-16,-1 17 0,1 0 16,0 0-16,-1 17 15,-17 1-15,0 0 0,18 17 16,-18-17-1,0-36 17,17 0-17,-17 1-15,18-1 0,17 0 16,-17 1 0,0 17-16,-1 35 15,-17-17-15,0 52 16,0-52-1,0 17-15,0 18 0,18-35 16,0-1 0</inkml:trace>
+  <inkml:trace contextRef="#ctx0" brushRef="#br0" timeOffset="68170.7225">29069 14129 0,'-35'0'16,"17"17"-16,-17 1 15,-1 53-15,19-18 16,-1-1-16,1 19 0,17 0 16,0 52-16,17-70 15,1 0-15,-1-18 0,1 18 16,17 0-1,-17-35-15</inkml:trace>
+  <inkml:trace contextRef="#ctx0" brushRef="#br0" timeOffset="68826.8128">27693 14605 0,'0'18'0,"18"-1"0,-18 1 16,0 0-16,-18 17 15,18-18-15,0 19 0,0-19 16,-18-17-1,18-17 1,0-36 0,18 18-16,-18-1 0,18-17 15,-1 18-15,1 17 16,0 1-16,-1 17 0,1 0 16,0 0-16,-1 17 15,-17 1-15,0 0 0,18 17 16,-18-17-1,0-36 17,17 0-17,-17 1-15,18-1 0,17 0 16,-17 1 0,0 17-16,-1 35 15,-17-17-15,0 52 16,0-52-1,0 17-15,0 18 0,18-35 16,0-1 0</inkml:trace>
   <inkml:trace contextRef="#ctx0" brushRef="#br0" timeOffset="69304.5382">28116 14517 0,'-35'35'16,"-18"36"0,53-36-1,-17 0-15,34 18 0,18-18 16,-17-35 0,0 0-16,17 0 0,-17 0 15,-1-17-15,1-19 0,0 1 16,-18 0-16,-18-18 15,0 35 1,18 1-16,-17-1 16,34 36-1,1-1 1,0-17-16,-1 18 16,1 0-1,0-18-15,-18 17 0,17-17 16,1 0 15,-18-17-31,0-1 16,17 18-1,1 18 1,17 17-16,-17-35 16,0 18-16,-1-1 0,19 18 15,-19-17 1,1 0-16</inkml:trace>
   <inkml:trace contextRef="#ctx0" brushRef="#br0" timeOffset="69443.9904">28469 14570 0,'0'0'0,"0"17"0,-35 36 16,0-17-1,17-1-15,0 18 16,18-18-16,18-17 0</inkml:trace>
-  <inkml:trace contextRef="#ctx0" brushRef="#br0" timeOffset="69939.5402">29880 13317 0,'0'18'0,"-17"35"16,-1 53 0,0-36-16,18 1 0,0-18 15,-17 53-15,17-36 16,0-52-16,0-1 15,0 1-15,-18-18 16</inkml:trace>
+  <inkml:trace contextRef="#ctx0" brushRef="#br0" timeOffset="69939.5401">29880 13317 0,'0'18'0,"-17"35"16,-1 53 0,0-36-16,18 1 0,0-18 15,-17 53-15,17-36 16,0-52-16,0-1 15,0 1-15,-18-18 16</inkml:trace>
   <inkml:trace contextRef="#ctx0" brushRef="#br0" timeOffset="70161.1139">29722 13670 0,'0'35'16,"0"-17"-16,0 35 0,0 35 15,0-53-15,17 1 16,1-1-16,-1 0 16,19-17-16,17 0 15,-18-18-15,0 0 0,18 0 16,-35-18-16,17 0 16,0-17-1,-17 17-15,0 1 0,-1-1 16,1 0-16,-18-17 15</inkml:trace>
 </inkml:ink>
+</file>
+
+<file path=ppt/notesMasters/notesMaster1.xml><?xml version="1.0" encoding="utf-8"?>
+<p:notesMaster xmlns:a="http://schemas.openxmlformats.org/drawingml/2006/main" xmlns:r="http://schemas.openxmlformats.org/officeDocument/2006/relationships" xmlns:p="http://schemas.openxmlformats.org/presentationml/2006/main">
+  <p:cSld>
+    <p:bg>
+      <p:bgRef idx="1001">
+        <a:schemeClr val="bg1"/>
+      </p:bgRef>
+    </p:bg>
+    <p:spTree>
+      <p:nvGrpSpPr>
+        <p:cNvPr id="1" name=""/>
+        <p:cNvGrpSpPr/>
+        <p:nvPr/>
+      </p:nvGrpSpPr>
+      <p:grpSpPr>
+        <a:xfrm>
+          <a:off x="0" y="0"/>
+          <a:ext cx="0" cy="0"/>
+          <a:chOff x="0" y="0"/>
+          <a:chExt cx="0" cy="0"/>
+        </a:xfrm>
+      </p:grpSpPr>
+      <p:sp>
+        <p:nvSpPr>
+          <p:cNvPr id="2" name="页眉占位符 1"/>
+          <p:cNvSpPr>
+            <a:spLocks noGrp="1"/>
+          </p:cNvSpPr>
+          <p:nvPr>
+            <p:ph type="hdr" sz="quarter"/>
+          </p:nvPr>
+        </p:nvSpPr>
+        <p:spPr>
+          <a:xfrm>
+            <a:off x="0" y="0"/>
+            <a:ext cx="2971800" cy="458788"/>
+          </a:xfrm>
+          <a:prstGeom prst="rect">
+            <a:avLst/>
+          </a:prstGeom>
+        </p:spPr>
+        <p:txBody>
+          <a:bodyPr vert="horz" lIns="91440" tIns="45720" rIns="91440" bIns="45720" rtlCol="0"/>
+          <a:lstStyle>
+            <a:lvl1pPr algn="l">
+              <a:defRPr sz="1200"/>
+            </a:lvl1pPr>
+          </a:lstStyle>
+          <a:p>
+            <a:endParaRPr lang="zh-CN" altLang="en-US"/>
+          </a:p>
+        </p:txBody>
+      </p:sp>
+      <p:sp>
+        <p:nvSpPr>
+          <p:cNvPr id="3" name="日期占位符 2"/>
+          <p:cNvSpPr>
+            <a:spLocks noGrp="1"/>
+          </p:cNvSpPr>
+          <p:nvPr>
+            <p:ph type="dt" idx="1"/>
+          </p:nvPr>
+        </p:nvSpPr>
+        <p:spPr>
+          <a:xfrm>
+            <a:off x="3884613" y="0"/>
+            <a:ext cx="2971800" cy="458788"/>
+          </a:xfrm>
+          <a:prstGeom prst="rect">
+            <a:avLst/>
+          </a:prstGeom>
+        </p:spPr>
+        <p:txBody>
+          <a:bodyPr vert="horz" lIns="91440" tIns="45720" rIns="91440" bIns="45720" rtlCol="0"/>
+          <a:lstStyle>
+            <a:lvl1pPr algn="r">
+              <a:defRPr sz="1200"/>
+            </a:lvl1pPr>
+          </a:lstStyle>
+          <a:p>
+            <a:fld id="{FB0AE51B-ECE9-4C2A-B919-633CEAFB7F67}" type="datetimeFigureOut">
+              <a:rPr lang="zh-CN" altLang="en-US" smtClean="0"/>
+              <a:t>2017/11/1</a:t>
+            </a:fld>
+            <a:endParaRPr lang="zh-CN" altLang="en-US"/>
+          </a:p>
+        </p:txBody>
+      </p:sp>
+      <p:sp>
+        <p:nvSpPr>
+          <p:cNvPr id="4" name="幻灯片图像占位符 3"/>
+          <p:cNvSpPr>
+            <a:spLocks noGrp="1" noRot="1" noChangeAspect="1"/>
+          </p:cNvSpPr>
+          <p:nvPr>
+            <p:ph type="sldImg" idx="2"/>
+          </p:nvPr>
+        </p:nvSpPr>
+        <p:spPr>
+          <a:xfrm>
+            <a:off x="685800" y="1143000"/>
+            <a:ext cx="5486400" cy="3086100"/>
+          </a:xfrm>
+          <a:prstGeom prst="rect">
+            <a:avLst/>
+          </a:prstGeom>
+          <a:noFill/>
+          <a:ln w="12700">
+            <a:solidFill>
+              <a:prstClr val="black"/>
+            </a:solidFill>
+          </a:ln>
+        </p:spPr>
+        <p:txBody>
+          <a:bodyPr vert="horz" lIns="91440" tIns="45720" rIns="91440" bIns="45720" rtlCol="0" anchor="ctr"/>
+          <a:lstStyle/>
+          <a:p>
+            <a:endParaRPr lang="zh-CN" altLang="en-US"/>
+          </a:p>
+        </p:txBody>
+      </p:sp>
+      <p:sp>
+        <p:nvSpPr>
+          <p:cNvPr id="5" name="备注占位符 4"/>
+          <p:cNvSpPr>
+            <a:spLocks noGrp="1"/>
+          </p:cNvSpPr>
+          <p:nvPr>
+            <p:ph type="body" sz="quarter" idx="3"/>
+          </p:nvPr>
+        </p:nvSpPr>
+        <p:spPr>
+          <a:xfrm>
+            <a:off x="685800" y="4400550"/>
+            <a:ext cx="5486400" cy="3600450"/>
+          </a:xfrm>
+          <a:prstGeom prst="rect">
+            <a:avLst/>
+          </a:prstGeom>
+        </p:spPr>
+        <p:txBody>
+          <a:bodyPr vert="horz" lIns="91440" tIns="45720" rIns="91440" bIns="45720" rtlCol="0"/>
+          <a:lstStyle/>
+          <a:p>
+            <a:pPr lvl="0"/>
+            <a:r>
+              <a:rPr lang="zh-CN" altLang="en-US" smtClean="0"/>
+              <a:t>编辑母版文本样式</a:t>
+            </a:r>
+          </a:p>
+          <a:p>
+            <a:pPr lvl="1"/>
+            <a:r>
+              <a:rPr lang="zh-CN" altLang="en-US" smtClean="0"/>
+              <a:t>第二级</a:t>
+            </a:r>
+          </a:p>
+          <a:p>
+            <a:pPr lvl="2"/>
+            <a:r>
+              <a:rPr lang="zh-CN" altLang="en-US" smtClean="0"/>
+              <a:t>第三级</a:t>
+            </a:r>
+          </a:p>
+          <a:p>
+            <a:pPr lvl="3"/>
+            <a:r>
+              <a:rPr lang="zh-CN" altLang="en-US" smtClean="0"/>
+              <a:t>第四级</a:t>
+            </a:r>
+          </a:p>
+          <a:p>
+            <a:pPr lvl="4"/>
+            <a:r>
+              <a:rPr lang="zh-CN" altLang="en-US" smtClean="0"/>
+              <a:t>第五级</a:t>
+            </a:r>
+            <a:endParaRPr lang="zh-CN" altLang="en-US"/>
+          </a:p>
+        </p:txBody>
+      </p:sp>
+      <p:sp>
+        <p:nvSpPr>
+          <p:cNvPr id="6" name="页脚占位符 5"/>
+          <p:cNvSpPr>
+            <a:spLocks noGrp="1"/>
+          </p:cNvSpPr>
+          <p:nvPr>
+            <p:ph type="ftr" sz="quarter" idx="4"/>
+          </p:nvPr>
+        </p:nvSpPr>
+        <p:spPr>
+          <a:xfrm>
+            <a:off x="0" y="8685213"/>
+            <a:ext cx="2971800" cy="458787"/>
+          </a:xfrm>
+          <a:prstGeom prst="rect">
+            <a:avLst/>
+          </a:prstGeom>
+        </p:spPr>
+        <p:txBody>
+          <a:bodyPr vert="horz" lIns="91440" tIns="45720" rIns="91440" bIns="45720" rtlCol="0" anchor="b"/>
+          <a:lstStyle>
+            <a:lvl1pPr algn="l">
+              <a:defRPr sz="1200"/>
+            </a:lvl1pPr>
+          </a:lstStyle>
+          <a:p>
+            <a:endParaRPr lang="zh-CN" altLang="en-US"/>
+          </a:p>
+        </p:txBody>
+      </p:sp>
+      <p:sp>
+        <p:nvSpPr>
+          <p:cNvPr id="7" name="灯片编号占位符 6"/>
+          <p:cNvSpPr>
+            <a:spLocks noGrp="1"/>
+          </p:cNvSpPr>
+          <p:nvPr>
+            <p:ph type="sldNum" sz="quarter" idx="5"/>
+          </p:nvPr>
+        </p:nvSpPr>
+        <p:spPr>
+          <a:xfrm>
+            <a:off x="3884613" y="8685213"/>
+            <a:ext cx="2971800" cy="458787"/>
+          </a:xfrm>
+          <a:prstGeom prst="rect">
+            <a:avLst/>
+          </a:prstGeom>
+        </p:spPr>
+        <p:txBody>
+          <a:bodyPr vert="horz" lIns="91440" tIns="45720" rIns="91440" bIns="45720" rtlCol="0" anchor="b"/>
+          <a:lstStyle>
+            <a:lvl1pPr algn="r">
+              <a:defRPr sz="1200"/>
+            </a:lvl1pPr>
+          </a:lstStyle>
+          <a:p>
+            <a:fld id="{5AFB05B2-FAA3-4EFD-8A3C-DC82C3FB0E40}" type="slidenum">
+              <a:rPr lang="zh-CN" altLang="en-US" smtClean="0"/>
+              <a:t>‹#›</a:t>
+            </a:fld>
+            <a:endParaRPr lang="zh-CN" altLang="en-US"/>
+          </a:p>
+        </p:txBody>
+      </p:sp>
+    </p:spTree>
+    <p:extLst>
+      <p:ext uri="{BB962C8B-B14F-4D97-AF65-F5344CB8AC3E}">
+        <p14:creationId xmlns:p14="http://schemas.microsoft.com/office/powerpoint/2010/main" val="3863923299"/>
+      </p:ext>
+    </p:extLst>
+  </p:cSld>
+  <p:clrMap bg1="lt1" tx1="dk1" bg2="lt2" tx2="dk2" accent1="accent1" accent2="accent2" accent3="accent3" accent4="accent4" accent5="accent5" accent6="accent6" hlink="hlink" folHlink="folHlink"/>
+  <p:notesStyle>
+    <a:lvl1pPr marL="0" algn="l" defTabSz="914400" rtl="0" eaLnBrk="1" latinLnBrk="0" hangingPunct="1">
+      <a:defRPr sz="1200" kern="1200">
+        <a:solidFill>
+          <a:schemeClr val="tx1"/>
+        </a:solidFill>
+        <a:latin typeface="+mn-lt"/>
+        <a:ea typeface="+mn-ea"/>
+        <a:cs typeface="+mn-cs"/>
+      </a:defRPr>
+    </a:lvl1pPr>
+    <a:lvl2pPr marL="457200" algn="l" defTabSz="914400" rtl="0" eaLnBrk="1" latinLnBrk="0" hangingPunct="1">
+      <a:defRPr sz="1200" kern="1200">
+        <a:solidFill>
+          <a:schemeClr val="tx1"/>
+        </a:solidFill>
+        <a:latin typeface="+mn-lt"/>
+        <a:ea typeface="+mn-ea"/>
+        <a:cs typeface="+mn-cs"/>
+      </a:defRPr>
+    </a:lvl2pPr>
+    <a:lvl3pPr marL="914400" algn="l" defTabSz="914400" rtl="0" eaLnBrk="1" latinLnBrk="0" hangingPunct="1">
+      <a:defRPr sz="1200" kern="1200">
+        <a:solidFill>
+          <a:schemeClr val="tx1"/>
+        </a:solidFill>
+        <a:latin typeface="+mn-lt"/>
+        <a:ea typeface="+mn-ea"/>
+        <a:cs typeface="+mn-cs"/>
+      </a:defRPr>
+    </a:lvl3pPr>
+    <a:lvl4pPr marL="1371600" algn="l" defTabSz="914400" rtl="0" eaLnBrk="1" latinLnBrk="0" hangingPunct="1">
+      <a:defRPr sz="1200" kern="1200">
+        <a:solidFill>
+          <a:schemeClr val="tx1"/>
+        </a:solidFill>
+        <a:latin typeface="+mn-lt"/>
+        <a:ea typeface="+mn-ea"/>
+        <a:cs typeface="+mn-cs"/>
+      </a:defRPr>
+    </a:lvl4pPr>
+    <a:lvl5pPr marL="1828800" algn="l" defTabSz="914400" rtl="0" eaLnBrk="1" latinLnBrk="0" hangingPunct="1">
+      <a:defRPr sz="1200" kern="1200">
+        <a:solidFill>
+          <a:schemeClr val="tx1"/>
+        </a:solidFill>
+        <a:latin typeface="+mn-lt"/>
+        <a:ea typeface="+mn-ea"/>
+        <a:cs typeface="+mn-cs"/>
+      </a:defRPr>
+    </a:lvl5pPr>
+    <a:lvl6pPr marL="2286000" algn="l" defTabSz="914400" rtl="0" eaLnBrk="1" latinLnBrk="0" hangingPunct="1">
+      <a:defRPr sz="1200" kern="1200">
+        <a:solidFill>
+          <a:schemeClr val="tx1"/>
+        </a:solidFill>
+        <a:latin typeface="+mn-lt"/>
+        <a:ea typeface="+mn-ea"/>
+        <a:cs typeface="+mn-cs"/>
+      </a:defRPr>
+    </a:lvl6pPr>
+    <a:lvl7pPr marL="2743200" algn="l" defTabSz="914400" rtl="0" eaLnBrk="1" latinLnBrk="0" hangingPunct="1">
+      <a:defRPr sz="1200" kern="1200">
+        <a:solidFill>
+          <a:schemeClr val="tx1"/>
+        </a:solidFill>
+        <a:latin typeface="+mn-lt"/>
+        <a:ea typeface="+mn-ea"/>
+        <a:cs typeface="+mn-cs"/>
+      </a:defRPr>
+    </a:lvl7pPr>
+    <a:lvl8pPr marL="3200400" algn="l" defTabSz="914400" rtl="0" eaLnBrk="1" latinLnBrk="0" hangingPunct="1">
+      <a:defRPr sz="1200" kern="1200">
+        <a:solidFill>
+          <a:schemeClr val="tx1"/>
+        </a:solidFill>
+        <a:latin typeface="+mn-lt"/>
+        <a:ea typeface="+mn-ea"/>
+        <a:cs typeface="+mn-cs"/>
+      </a:defRPr>
+    </a:lvl8pPr>
+    <a:lvl9pPr marL="3657600" algn="l" defTabSz="914400" rtl="0" eaLnBrk="1" latinLnBrk="0" hangingPunct="1">
+      <a:defRPr sz="1200" kern="1200">
+        <a:solidFill>
+          <a:schemeClr val="tx1"/>
+        </a:solidFill>
+        <a:latin typeface="+mn-lt"/>
+        <a:ea typeface="+mn-ea"/>
+        <a:cs typeface="+mn-cs"/>
+      </a:defRPr>
+    </a:lvl9pPr>
+  </p:notesStyle>
+</p:notesMaster>
+</file>
+
+<file path=ppt/notesSlides/notesSlide1.xml><?xml version="1.0" encoding="utf-8"?>
+<p:notes xmlns:a="http://schemas.openxmlformats.org/drawingml/2006/main" xmlns:r="http://schemas.openxmlformats.org/officeDocument/2006/relationships" xmlns:p="http://schemas.openxmlformats.org/presentationml/2006/main">
+  <p:cSld>
+    <p:spTree>
+      <p:nvGrpSpPr>
+        <p:cNvPr id="1" name=""/>
+        <p:cNvGrpSpPr/>
+        <p:nvPr/>
+      </p:nvGrpSpPr>
+      <p:grpSpPr>
+        <a:xfrm>
+          <a:off x="0" y="0"/>
+          <a:ext cx="0" cy="0"/>
+          <a:chOff x="0" y="0"/>
+          <a:chExt cx="0" cy="0"/>
+        </a:xfrm>
+      </p:grpSpPr>
+      <p:sp>
+        <p:nvSpPr>
+          <p:cNvPr id="2" name="幻灯片图像占位符 1"/>
+          <p:cNvSpPr>
+            <a:spLocks noGrp="1" noRot="1" noChangeAspect="1"/>
+          </p:cNvSpPr>
+          <p:nvPr>
+            <p:ph type="sldImg"/>
+          </p:nvPr>
+        </p:nvSpPr>
+        <p:spPr/>
+      </p:sp>
+      <p:sp>
+        <p:nvSpPr>
+          <p:cNvPr id="3" name="备注占位符 2"/>
+          <p:cNvSpPr>
+            <a:spLocks noGrp="1"/>
+          </p:cNvSpPr>
+          <p:nvPr>
+            <p:ph type="body" idx="1"/>
+          </p:nvPr>
+        </p:nvSpPr>
+        <p:spPr/>
+        <p:txBody>
+          <a:bodyPr/>
+          <a:lstStyle/>
+          <a:p>
+            <a:endParaRPr lang="zh-CN" altLang="en-US" dirty="0"/>
+          </a:p>
+        </p:txBody>
+      </p:sp>
+      <p:sp>
+        <p:nvSpPr>
+          <p:cNvPr id="4" name="灯片编号占位符 3"/>
+          <p:cNvSpPr>
+            <a:spLocks noGrp="1"/>
+          </p:cNvSpPr>
+          <p:nvPr>
+            <p:ph type="sldNum" sz="quarter" idx="10"/>
+          </p:nvPr>
+        </p:nvSpPr>
+        <p:spPr/>
+        <p:txBody>
+          <a:bodyPr/>
+          <a:lstStyle/>
+          <a:p>
+            <a:fld id="{5AFB05B2-FAA3-4EFD-8A3C-DC82C3FB0E40}" type="slidenum">
+              <a:rPr lang="zh-CN" altLang="en-US" smtClean="0"/>
+              <a:t>3</a:t>
+            </a:fld>
+            <a:endParaRPr lang="zh-CN" altLang="en-US"/>
+          </a:p>
+        </p:txBody>
+      </p:sp>
+    </p:spTree>
+    <p:extLst>
+      <p:ext uri="{BB962C8B-B14F-4D97-AF65-F5344CB8AC3E}">
+        <p14:creationId xmlns:p14="http://schemas.microsoft.com/office/powerpoint/2010/main" val="1893811867"/>
+      </p:ext>
+    </p:extLst>
+  </p:cSld>
+  <p:clrMapOvr>
+    <a:masterClrMapping/>
+  </p:clrMapOvr>
+</p:notes>
 </file>
 
 <file path=ppt/slideLayouts/slideLayout1.xml><?xml version="1.0" encoding="utf-8"?>
@@ -756,7 +1193,7 @@
           <a:p>
             <a:fld id="{ADBC2646-9AC3-1A45-9703-65106AFC89CB}" type="datetimeFigureOut">
               <a:rPr lang="en-US" smtClean="0"/>
-              <a:t>7/8/2017</a:t>
+              <a:t>11/1/2017</a:t>
             </a:fld>
             <a:endParaRPr lang="en-US"/>
           </a:p>
@@ -958,7 +1395,7 @@
           <a:p>
             <a:fld id="{ADBC2646-9AC3-1A45-9703-65106AFC89CB}" type="datetimeFigureOut">
               <a:rPr lang="en-US" smtClean="0"/>
-              <a:t>7/8/2017</a:t>
+              <a:t>11/1/2017</a:t>
             </a:fld>
             <a:endParaRPr lang="en-US"/>
           </a:p>
@@ -1136,7 +1573,7 @@
           <a:p>
             <a:fld id="{ADBC2646-9AC3-1A45-9703-65106AFC89CB}" type="datetimeFigureOut">
               <a:rPr lang="en-US" smtClean="0"/>
-              <a:t>7/8/2017</a:t>
+              <a:t>11/1/2017</a:t>
             </a:fld>
             <a:endParaRPr lang="en-US"/>
           </a:p>
@@ -1231,7 +1668,7 @@
           <a:p>
             <a:fld id="{2A85B99E-DD35-5942-AA9D-E7AED0CBF221}" type="datetimeFigureOut">
               <a:rPr lang="en-US" smtClean="0"/>
-              <a:t>7/8/2017</a:t>
+              <a:t>11/1/2017</a:t>
             </a:fld>
             <a:endParaRPr lang="en-US"/>
           </a:p>
@@ -1526,7 +1963,7 @@
           <a:p>
             <a:fld id="{ADBC2646-9AC3-1A45-9703-65106AFC89CB}" type="datetimeFigureOut">
               <a:rPr lang="en-US" smtClean="0"/>
-              <a:t>7/8/2017</a:t>
+              <a:t>11/1/2017</a:t>
             </a:fld>
             <a:endParaRPr lang="en-US"/>
           </a:p>
@@ -1805,7 +2242,7 @@
           <a:p>
             <a:fld id="{ADBC2646-9AC3-1A45-9703-65106AFC89CB}" type="datetimeFigureOut">
               <a:rPr lang="en-US" smtClean="0"/>
-              <a:t>7/8/2017</a:t>
+              <a:t>11/1/2017</a:t>
             </a:fld>
             <a:endParaRPr lang="en-US"/>
           </a:p>
@@ -2068,7 +2505,7 @@
           <a:p>
             <a:fld id="{ADBC2646-9AC3-1A45-9703-65106AFC89CB}" type="datetimeFigureOut">
               <a:rPr lang="en-US" smtClean="0"/>
-              <a:t>7/8/2017</a:t>
+              <a:t>11/1/2017</a:t>
             </a:fld>
             <a:endParaRPr lang="en-US"/>
           </a:p>
@@ -2466,7 +2903,7 @@
           <a:p>
             <a:fld id="{ADBC2646-9AC3-1A45-9703-65106AFC89CB}" type="datetimeFigureOut">
               <a:rPr lang="en-US" smtClean="0"/>
-              <a:t>7/8/2017</a:t>
+              <a:t>11/1/2017</a:t>
             </a:fld>
             <a:endParaRPr lang="en-US"/>
           </a:p>
@@ -2617,7 +3054,7 @@
           <a:p>
             <a:fld id="{ADBC2646-9AC3-1A45-9703-65106AFC89CB}" type="datetimeFigureOut">
               <a:rPr lang="en-US" smtClean="0"/>
-              <a:t>7/8/2017</a:t>
+              <a:t>11/1/2017</a:t>
             </a:fld>
             <a:endParaRPr lang="en-US"/>
           </a:p>
@@ -2746,7 +3183,7 @@
           <a:p>
             <a:fld id="{ADBC2646-9AC3-1A45-9703-65106AFC89CB}" type="datetimeFigureOut">
               <a:rPr lang="en-US" smtClean="0"/>
-              <a:t>7/8/2017</a:t>
+              <a:t>11/1/2017</a:t>
             </a:fld>
             <a:endParaRPr lang="en-US"/>
           </a:p>
@@ -3021,7 +3458,7 @@
           <a:p>
             <a:fld id="{ADBC2646-9AC3-1A45-9703-65106AFC89CB}" type="datetimeFigureOut">
               <a:rPr lang="en-US" smtClean="0"/>
-              <a:t>7/8/2017</a:t>
+              <a:t>11/1/2017</a:t>
             </a:fld>
             <a:endParaRPr lang="en-US"/>
           </a:p>
@@ -3273,7 +3710,7 @@
           <a:p>
             <a:fld id="{ADBC2646-9AC3-1A45-9703-65106AFC89CB}" type="datetimeFigureOut">
               <a:rPr lang="en-US" smtClean="0"/>
-              <a:t>7/8/2017</a:t>
+              <a:t>11/1/2017</a:t>
             </a:fld>
             <a:endParaRPr lang="en-US"/>
           </a:p>
@@ -3484,7 +3921,7 @@
           <a:p>
             <a:fld id="{ADBC2646-9AC3-1A45-9703-65106AFC89CB}" type="datetimeFigureOut">
               <a:rPr lang="en-US" smtClean="0"/>
-              <a:t>7/8/2017</a:t>
+              <a:t>11/1/2017</a:t>
             </a:fld>
             <a:endParaRPr lang="en-US"/>
           </a:p>
@@ -6002,8 +6439,8 @@
           </a:p>
         </p:txBody>
       </p:sp>
-      <mc:AlternateContent xmlns:mc="http://schemas.openxmlformats.org/markup-compatibility/2006">
-        <mc:Choice xmlns:p14="http://schemas.microsoft.com/office/powerpoint/2010/main" Requires="p14">
+      <mc:AlternateContent xmlns:mc="http://schemas.openxmlformats.org/markup-compatibility/2006" xmlns:p14="http://schemas.microsoft.com/office/powerpoint/2010/main">
+        <mc:Choice Requires="p14">
           <p:contentPart p14:bwMode="auto" r:id="rId10">
             <p14:nvContentPartPr>
               <p14:cNvPr id="3" name="Ink 2">
@@ -6022,7 +6459,7 @@
             </p14:xfrm>
           </p:contentPart>
         </mc:Choice>
-        <mc:Fallback>
+        <mc:Fallback xmlns="">
           <p:pic>
             <p:nvPicPr>
               <p:cNvPr id="3" name="Ink 2">
@@ -6158,7 +6595,7 @@
             <p:nvPr/>
           </p:nvPicPr>
           <p:blipFill>
-            <a:blip r:embed="rId2">
+            <a:blip r:embed="rId3">
               <a:extLst>
                 <a:ext uri="{28A0092B-C50C-407E-A947-70E740481C1C}">
                   <a14:useLocalDpi xmlns:a14="http://schemas.microsoft.com/office/drawing/2010/main" val="0"/>
@@ -6506,7 +6943,7 @@
                     <a:avLst/>
                   </a:prstGeom>
                   <a:blipFill rotWithShape="0">
-                    <a:blip r:embed="rId3"/>
+                    <a:blip r:embed="rId4"/>
                     <a:stretch>
                       <a:fillRect b="-5556"/>
                     </a:stretch>
@@ -6901,7 +7338,7 @@
               <p:nvPr/>
             </p:nvPicPr>
             <p:blipFill>
-              <a:blip r:embed="rId2">
+              <a:blip r:embed="rId3">
                 <a:extLst>
                   <a:ext uri="{28A0092B-C50C-407E-A947-70E740481C1C}">
                     <a14:useLocalDpi xmlns:a14="http://schemas.microsoft.com/office/drawing/2010/main" val="0"/>
@@ -7332,9 +7769,9 @@
           </p:style>
         </p:cxnSp>
       </p:grpSp>
-      <mc:AlternateContent xmlns:mc="http://schemas.openxmlformats.org/markup-compatibility/2006">
-        <mc:Choice xmlns:p14="http://schemas.microsoft.com/office/powerpoint/2010/main" Requires="p14">
-          <p:contentPart p14:bwMode="auto" r:id="rId4">
+      <mc:AlternateContent xmlns:mc="http://schemas.openxmlformats.org/markup-compatibility/2006" xmlns:p14="http://schemas.microsoft.com/office/powerpoint/2010/main">
+        <mc:Choice Requires="p14">
+          <p:contentPart p14:bwMode="auto" r:id="rId5">
             <p14:nvContentPartPr>
               <p14:cNvPr id="5" name="Ink 4">
                 <a:extLst>
@@ -7352,7 +7789,7 @@
             </p14:xfrm>
           </p:contentPart>
         </mc:Choice>
-        <mc:Fallback>
+        <mc:Fallback xmlns="">
           <p:pic>
             <p:nvPicPr>
               <p:cNvPr id="5" name="Ink 4">
@@ -7366,7 +7803,7 @@
               <p:nvPr/>
             </p:nvPicPr>
             <p:blipFill>
-              <a:blip r:embed="rId5"/>
+              <a:blip r:embed="rId6"/>
               <a:stretch>
                 <a:fillRect/>
               </a:stretch>
@@ -7383,6 +7820,170 @@
           </p:pic>
         </mc:Fallback>
       </mc:AlternateContent>
+      <p:sp>
+        <p:nvSpPr>
+          <p:cNvPr id="10" name="文本框 9"/>
+          <p:cNvSpPr txBox="1"/>
+          <p:nvPr/>
+        </p:nvSpPr>
+        <p:spPr>
+          <a:xfrm>
+            <a:off x="4422710" y="1543132"/>
+            <a:ext cx="2071396" cy="1200329"/>
+          </a:xfrm>
+          <a:prstGeom prst="rect">
+            <a:avLst/>
+          </a:prstGeom>
+          <a:noFill/>
+        </p:spPr>
+        <p:txBody>
+          <a:bodyPr wrap="square" rtlCol="0">
+            <a:spAutoFit/>
+          </a:bodyPr>
+          <a:lstStyle/>
+          <a:p>
+            <a:r>
+              <a:rPr lang="zh-CN" altLang="en-US" dirty="0" smtClean="0"/>
+              <a:t>一般只在输出层使用</a:t>
+            </a:r>
+            <a:r>
+              <a:rPr lang="en-US" altLang="zh-CN" dirty="0" smtClean="0"/>
+              <a:t>sigmoid</a:t>
+            </a:r>
+            <a:r>
+              <a:rPr lang="zh-CN" altLang="en-US" dirty="0" smtClean="0"/>
+              <a:t>，因为随着</a:t>
+            </a:r>
+            <a:r>
+              <a:rPr lang="en-US" altLang="zh-CN" dirty="0" smtClean="0"/>
+              <a:t>z</a:t>
+            </a:r>
+            <a:r>
+              <a:rPr lang="zh-CN" altLang="en-US" dirty="0" smtClean="0"/>
+              <a:t>趋向两端，梯度下降会非常缓慢</a:t>
+            </a:r>
+            <a:endParaRPr lang="zh-CN" altLang="en-US" dirty="0"/>
+          </a:p>
+        </p:txBody>
+      </p:sp>
+      <p:sp>
+        <p:nvSpPr>
+          <p:cNvPr id="17" name="文本框 16"/>
+          <p:cNvSpPr txBox="1"/>
+          <p:nvPr/>
+        </p:nvSpPr>
+        <p:spPr>
+          <a:xfrm>
+            <a:off x="3924702" y="5001208"/>
+            <a:ext cx="2065551" cy="369332"/>
+          </a:xfrm>
+          <a:prstGeom prst="rect">
+            <a:avLst/>
+          </a:prstGeom>
+          <a:noFill/>
+        </p:spPr>
+        <p:txBody>
+          <a:bodyPr wrap="square" rtlCol="0">
+            <a:spAutoFit/>
+          </a:bodyPr>
+          <a:lstStyle/>
+          <a:p>
+            <a:r>
+              <a:rPr lang="zh-CN" altLang="en-US" dirty="0" smtClean="0"/>
+              <a:t>大多数是用这个</a:t>
+            </a:r>
+            <a:endParaRPr lang="zh-CN" altLang="en-US" dirty="0"/>
+          </a:p>
+        </p:txBody>
+      </p:sp>
+      <p:sp>
+        <p:nvSpPr>
+          <p:cNvPr id="18" name="文本框 17"/>
+          <p:cNvSpPr txBox="1"/>
+          <p:nvPr/>
+        </p:nvSpPr>
+        <p:spPr>
+          <a:xfrm>
+            <a:off x="10537594" y="3841287"/>
+            <a:ext cx="2202844" cy="923330"/>
+          </a:xfrm>
+          <a:prstGeom prst="rect">
+            <a:avLst/>
+          </a:prstGeom>
+          <a:noFill/>
+        </p:spPr>
+        <p:txBody>
+          <a:bodyPr wrap="square" rtlCol="0">
+            <a:spAutoFit/>
+          </a:bodyPr>
+          <a:lstStyle/>
+          <a:p>
+            <a:r>
+              <a:rPr lang="zh-CN" altLang="en-US" dirty="0" smtClean="0"/>
+              <a:t>效果比</a:t>
+            </a:r>
+            <a:r>
+              <a:rPr lang="en-US" altLang="zh-CN" dirty="0" err="1" smtClean="0"/>
+              <a:t>Relu</a:t>
+            </a:r>
+            <a:r>
+              <a:rPr lang="zh-CN" altLang="en-US" dirty="0" smtClean="0"/>
+              <a:t>还好，但是多一个参数（</a:t>
+            </a:r>
+            <a:r>
+              <a:rPr lang="en-US" altLang="zh-CN" dirty="0" smtClean="0"/>
+              <a:t>0.01</a:t>
+            </a:r>
+            <a:r>
+              <a:rPr lang="zh-CN" altLang="en-US" dirty="0" smtClean="0"/>
+              <a:t>是一个参数）</a:t>
+            </a:r>
+            <a:endParaRPr lang="zh-CN" altLang="en-US" dirty="0"/>
+          </a:p>
+        </p:txBody>
+      </p:sp>
+      <p:sp>
+        <p:nvSpPr>
+          <p:cNvPr id="20" name="文本框 19"/>
+          <p:cNvSpPr txBox="1"/>
+          <p:nvPr/>
+        </p:nvSpPr>
+        <p:spPr>
+          <a:xfrm>
+            <a:off x="10379145" y="873303"/>
+            <a:ext cx="1489394" cy="923330"/>
+          </a:xfrm>
+          <a:prstGeom prst="rect">
+            <a:avLst/>
+          </a:prstGeom>
+          <a:noFill/>
+        </p:spPr>
+        <p:txBody>
+          <a:bodyPr wrap="square" rtlCol="0">
+            <a:spAutoFit/>
+          </a:bodyPr>
+          <a:lstStyle/>
+          <a:p>
+            <a:r>
+              <a:rPr lang="zh-CN" altLang="en-US" dirty="0" smtClean="0"/>
+              <a:t>输出在</a:t>
+            </a:r>
+            <a:r>
+              <a:rPr lang="en-US" altLang="zh-CN" dirty="0" smtClean="0"/>
+              <a:t>(-1,1)</a:t>
+            </a:r>
+            <a:r>
+              <a:rPr lang="zh-CN" altLang="en-US" dirty="0" smtClean="0"/>
+              <a:t>，不方便用在输出层</a:t>
+            </a:r>
+            <a:r>
+              <a:rPr lang="en-US" altLang="zh-CN" dirty="0" smtClean="0"/>
+              <a:t>y=(0,1)</a:t>
+            </a:r>
+            <a:endParaRPr lang="zh-CN" altLang="en-US" dirty="0"/>
+          </a:p>
+        </p:txBody>
+      </p:sp>
     </p:spTree>
     <p:extLst>
       <p:ext uri="{BB962C8B-B14F-4D97-AF65-F5344CB8AC3E}">
@@ -7820,4 +8421,265 @@
     </a:ext>
   </a:extLst>
 </a:theme>
+</file>
+
+<file path=ppt/theme/theme2.xml><?xml version="1.0" encoding="utf-8"?>
+<a:theme xmlns:a="http://schemas.openxmlformats.org/drawingml/2006/main" name="Office 主题​​">
+  <a:themeElements>
+    <a:clrScheme name="Office">
+      <a:dk1>
+        <a:sysClr val="windowText" lastClr="000000"/>
+      </a:dk1>
+      <a:lt1>
+        <a:sysClr val="window" lastClr="FFFFFF"/>
+      </a:lt1>
+      <a:dk2>
+        <a:srgbClr val="44546A"/>
+      </a:dk2>
+      <a:lt2>
+        <a:srgbClr val="E7E6E6"/>
+      </a:lt2>
+      <a:accent1>
+        <a:srgbClr val="5B9BD5"/>
+      </a:accent1>
+      <a:accent2>
+        <a:srgbClr val="ED7D31"/>
+      </a:accent2>
+      <a:accent3>
+        <a:srgbClr val="A5A5A5"/>
+      </a:accent3>
+      <a:accent4>
+        <a:srgbClr val="FFC000"/>
+      </a:accent4>
+      <a:accent5>
+        <a:srgbClr val="4472C4"/>
+      </a:accent5>
+      <a:accent6>
+        <a:srgbClr val="70AD47"/>
+      </a:accent6>
+      <a:hlink>
+        <a:srgbClr val="0563C1"/>
+      </a:hlink>
+      <a:folHlink>
+        <a:srgbClr val="954F72"/>
+      </a:folHlink>
+    </a:clrScheme>
+    <a:fontScheme name="Office">
+      <a:majorFont>
+        <a:latin typeface="等线 Light" panose="020F0302020204030204"/>
+        <a:ea typeface=""/>
+        <a:cs typeface=""/>
+        <a:font script="Jpan" typeface="游ゴシック Light"/>
+        <a:font script="Hang" typeface="맑은 고딕"/>
+        <a:font script="Hans" typeface="等线 Light"/>
+        <a:font script="Hant" typeface="新細明體"/>
+        <a:font script="Arab" typeface="Times New Roman"/>
+        <a:font script="Hebr" typeface="Times New Roman"/>
+        <a:font script="Thai" typeface="Angsana New"/>
+        <a:font script="Ethi" typeface="Nyala"/>
+        <a:font script="Beng" typeface="Vrinda"/>
+        <a:font script="Gujr" typeface="Shruti"/>
+        <a:font script="Khmr" typeface="MoolBoran"/>
+        <a:font script="Knda" typeface="Tunga"/>
+        <a:font script="Guru" typeface="Raavi"/>
+        <a:font script="Cans" typeface="Euphemia"/>
+        <a:font script="Cher" typeface="Plantagenet Cherokee"/>
+        <a:font script="Yiii" typeface="Microsoft Yi Baiti"/>
+        <a:font script="Tibt" typeface="Microsoft Himalaya"/>
+        <a:font script="Thaa" typeface="MV Boli"/>
+        <a:font script="Deva" typeface="Mangal"/>
+        <a:font script="Telu" typeface="Gautami"/>
+        <a:font script="Taml" typeface="Latha"/>
+        <a:font script="Syrc" typeface="Estrangelo Edessa"/>
+        <a:font script="Orya" typeface="Kalinga"/>
+        <a:font script="Mlym" typeface="Kartika"/>
+        <a:font script="Laoo" typeface="DokChampa"/>
+        <a:font script="Sinh" typeface="Iskoola Pota"/>
+        <a:font script="Mong" typeface="Mongolian Baiti"/>
+        <a:font script="Viet" typeface="Times New Roman"/>
+        <a:font script="Uigh" typeface="Microsoft Uighur"/>
+        <a:font script="Geor" typeface="Sylfaen"/>
+      </a:majorFont>
+      <a:minorFont>
+        <a:latin typeface="等线" panose="020F0502020204030204"/>
+        <a:ea typeface=""/>
+        <a:cs typeface=""/>
+        <a:font script="Jpan" typeface="游ゴシック"/>
+        <a:font script="Hang" typeface="맑은 고딕"/>
+        <a:font script="Hans" typeface="等线"/>
+        <a:font script="Hant" typeface="新細明體"/>
+        <a:font script="Arab" typeface="Arial"/>
+        <a:font script="Hebr" typeface="Arial"/>
+        <a:font script="Thai" typeface="Cordia New"/>
+        <a:font script="Ethi" typeface="Nyala"/>
+        <a:font script="Beng" typeface="Vrinda"/>
+        <a:font script="Gujr" typeface="Shruti"/>
+        <a:font script="Khmr" typeface="DaunPenh"/>
+        <a:font script="Knda" typeface="Tunga"/>
+        <a:font script="Guru" typeface="Raavi"/>
+        <a:font script="Cans" typeface="Euphemia"/>
+        <a:font script="Cher" typeface="Plantagenet Cherokee"/>
+        <a:font script="Yiii" typeface="Microsoft Yi Baiti"/>
+        <a:font script="Tibt" typeface="Microsoft Himalaya"/>
+        <a:font script="Thaa" typeface="MV Boli"/>
+        <a:font script="Deva" typeface="Mangal"/>
+        <a:font script="Telu" typeface="Gautami"/>
+        <a:font script="Taml" typeface="Latha"/>
+        <a:font script="Syrc" typeface="Estrangelo Edessa"/>
+        <a:font script="Orya" typeface="Kalinga"/>
+        <a:font script="Mlym" typeface="Kartika"/>
+        <a:font script="Laoo" typeface="DokChampa"/>
+        <a:font script="Sinh" typeface="Iskoola Pota"/>
+        <a:font script="Mong" typeface="Mongolian Baiti"/>
+        <a:font script="Viet" typeface="Arial"/>
+        <a:font script="Uigh" typeface="Microsoft Uighur"/>
+        <a:font script="Geor" typeface="Sylfaen"/>
+      </a:minorFont>
+    </a:fontScheme>
+    <a:fmtScheme name="Office">
+      <a:fillStyleLst>
+        <a:solidFill>
+          <a:schemeClr val="phClr"/>
+        </a:solidFill>
+        <a:gradFill rotWithShape="1">
+          <a:gsLst>
+            <a:gs pos="0">
+              <a:schemeClr val="phClr">
+                <a:lumMod val="110000"/>
+                <a:satMod val="105000"/>
+                <a:tint val="67000"/>
+              </a:schemeClr>
+            </a:gs>
+            <a:gs pos="50000">
+              <a:schemeClr val="phClr">
+                <a:lumMod val="105000"/>
+                <a:satMod val="103000"/>
+                <a:tint val="73000"/>
+              </a:schemeClr>
+            </a:gs>
+            <a:gs pos="100000">
+              <a:schemeClr val="phClr">
+                <a:lumMod val="105000"/>
+                <a:satMod val="109000"/>
+                <a:tint val="81000"/>
+              </a:schemeClr>
+            </a:gs>
+          </a:gsLst>
+          <a:lin ang="5400000" scaled="0"/>
+        </a:gradFill>
+        <a:gradFill rotWithShape="1">
+          <a:gsLst>
+            <a:gs pos="0">
+              <a:schemeClr val="phClr">
+                <a:satMod val="103000"/>
+                <a:lumMod val="102000"/>
+                <a:tint val="94000"/>
+              </a:schemeClr>
+            </a:gs>
+            <a:gs pos="50000">
+              <a:schemeClr val="phClr">
+                <a:satMod val="110000"/>
+                <a:lumMod val="100000"/>
+                <a:shade val="100000"/>
+              </a:schemeClr>
+            </a:gs>
+            <a:gs pos="100000">
+              <a:schemeClr val="phClr">
+                <a:lumMod val="99000"/>
+                <a:satMod val="120000"/>
+                <a:shade val="78000"/>
+              </a:schemeClr>
+            </a:gs>
+          </a:gsLst>
+          <a:lin ang="5400000" scaled="0"/>
+        </a:gradFill>
+      </a:fillStyleLst>
+      <a:lnStyleLst>
+        <a:ln w="6350" cap="flat" cmpd="sng" algn="ctr">
+          <a:solidFill>
+            <a:schemeClr val="phClr"/>
+          </a:solidFill>
+          <a:prstDash val="solid"/>
+          <a:miter lim="800000"/>
+        </a:ln>
+        <a:ln w="12700" cap="flat" cmpd="sng" algn="ctr">
+          <a:solidFill>
+            <a:schemeClr val="phClr"/>
+          </a:solidFill>
+          <a:prstDash val="solid"/>
+          <a:miter lim="800000"/>
+        </a:ln>
+        <a:ln w="19050" cap="flat" cmpd="sng" algn="ctr">
+          <a:solidFill>
+            <a:schemeClr val="phClr"/>
+          </a:solidFill>
+          <a:prstDash val="solid"/>
+          <a:miter lim="800000"/>
+        </a:ln>
+      </a:lnStyleLst>
+      <a:effectStyleLst>
+        <a:effectStyle>
+          <a:effectLst/>
+        </a:effectStyle>
+        <a:effectStyle>
+          <a:effectLst/>
+        </a:effectStyle>
+        <a:effectStyle>
+          <a:effectLst>
+            <a:outerShdw blurRad="57150" dist="19050" dir="5400000" algn="ctr" rotWithShape="0">
+              <a:srgbClr val="000000">
+                <a:alpha val="63000"/>
+              </a:srgbClr>
+            </a:outerShdw>
+          </a:effectLst>
+        </a:effectStyle>
+      </a:effectStyleLst>
+      <a:bgFillStyleLst>
+        <a:solidFill>
+          <a:schemeClr val="phClr"/>
+        </a:solidFill>
+        <a:solidFill>
+          <a:schemeClr val="phClr">
+            <a:tint val="95000"/>
+            <a:satMod val="170000"/>
+          </a:schemeClr>
+        </a:solidFill>
+        <a:gradFill rotWithShape="1">
+          <a:gsLst>
+            <a:gs pos="0">
+              <a:schemeClr val="phClr">
+                <a:tint val="93000"/>
+                <a:satMod val="150000"/>
+                <a:shade val="98000"/>
+                <a:lumMod val="102000"/>
+              </a:schemeClr>
+            </a:gs>
+            <a:gs pos="50000">
+              <a:schemeClr val="phClr">
+                <a:tint val="98000"/>
+                <a:satMod val="130000"/>
+                <a:shade val="90000"/>
+                <a:lumMod val="103000"/>
+              </a:schemeClr>
+            </a:gs>
+            <a:gs pos="100000">
+              <a:schemeClr val="phClr">
+                <a:shade val="63000"/>
+                <a:satMod val="120000"/>
+              </a:schemeClr>
+            </a:gs>
+          </a:gsLst>
+          <a:lin ang="5400000" scaled="0"/>
+        </a:gradFill>
+      </a:bgFillStyleLst>
+    </a:fmtScheme>
+  </a:themeElements>
+  <a:objectDefaults/>
+  <a:extraClrSchemeLst/>
+  <a:extLst>
+    <a:ext uri="{05A4C25C-085E-4340-85A3-A5531E510DB2}">
+      <thm15:themeFamily xmlns:thm15="http://schemas.microsoft.com/office/thememl/2012/main" name="Office Theme" id="{62F939B6-93AF-4DB8-9C6B-D6C7DFDC589F}" vid="{4A3C46E8-61CC-4603-A589-7422A47A8E4A}"/>
+    </a:ext>
+  </a:extLst>
+</a:theme>
 </file>
</xml_diff>